<commit_message>
Chat Server By React
Chat Server By React
Aka. About..
</commit_message>
<xml_diff>
--- a/How to Sociket_io.pptx
+++ b/How to Sociket_io.pptx
@@ -10,6 +10,7 @@
     <p:sldId id="258" r:id="rId4"/>
     <p:sldId id="260" r:id="rId5"/>
     <p:sldId id="259" r:id="rId6"/>
+    <p:sldId id="261" r:id="rId7"/>
   </p:sldIdLst>
   <p:sldSz cx="12192000" cy="6858000"/>
   <p:notesSz cx="6858000" cy="9144000"/>
@@ -3524,7 +3525,6 @@
               <a:rPr lang="en-US" dirty="0" smtClean="0"/>
               <a:t>)</a:t>
             </a:r>
-            <a:endParaRPr lang="en-US" dirty="0" smtClean="0"/>
           </a:p>
           <a:p>
             <a:pPr marL="342900" indent="-342900">
@@ -3561,23 +3561,7 @@
                   <a:srgbClr val="FF0000"/>
                 </a:solidFill>
               </a:rPr>
-              <a:t>Project Chat-</a:t>
-            </a:r>
-            <a:r>
-              <a:rPr lang="en-US" dirty="0" smtClean="0">
-                <a:solidFill>
-                  <a:srgbClr val="FF0000"/>
-                </a:solidFill>
-              </a:rPr>
-              <a:t>Server</a:t>
-            </a:r>
-            <a:r>
-              <a:rPr lang="en-US" dirty="0" smtClean="0">
-                <a:solidFill>
-                  <a:srgbClr val="FF0000"/>
-                </a:solidFill>
-              </a:rPr>
-              <a:t>)</a:t>
+              <a:t>Project Chat-Server)</a:t>
             </a:r>
           </a:p>
         </p:txBody>
@@ -9274,6 +9258,1008 @@
     <p:extLst>
       <p:ext uri="{BB962C8B-B14F-4D97-AF65-F5344CB8AC3E}">
         <p14:creationId xmlns:p14="http://schemas.microsoft.com/office/powerpoint/2010/main" val="1921765369"/>
+      </p:ext>
+    </p:extLst>
+  </p:cSld>
+  <p:clrMapOvr>
+    <a:masterClrMapping/>
+  </p:clrMapOvr>
+</p:sld>
+</file>
+
+<file path=ppt/slides/slide6.xml><?xml version="1.0" encoding="utf-8"?>
+<p:sld xmlns:a="http://schemas.openxmlformats.org/drawingml/2006/main" xmlns:r="http://schemas.openxmlformats.org/officeDocument/2006/relationships" xmlns:p="http://schemas.openxmlformats.org/presentationml/2006/main">
+  <p:cSld>
+    <p:spTree>
+      <p:nvGrpSpPr>
+        <p:cNvPr id="1" name=""/>
+        <p:cNvGrpSpPr/>
+        <p:nvPr/>
+      </p:nvGrpSpPr>
+      <p:grpSpPr>
+        <a:xfrm>
+          <a:off x="0" y="0"/>
+          <a:ext cx="0" cy="0"/>
+          <a:chOff x="0" y="0"/>
+          <a:chExt cx="0" cy="0"/>
+        </a:xfrm>
+      </p:grpSpPr>
+      <p:sp>
+        <p:nvSpPr>
+          <p:cNvPr id="5" name="สี่เหลี่ยมผืนผ้า 4"/>
+          <p:cNvSpPr/>
+          <p:nvPr/>
+        </p:nvSpPr>
+        <p:spPr>
+          <a:xfrm>
+            <a:off x="205648" y="109224"/>
+            <a:ext cx="6096000" cy="3046988"/>
+          </a:xfrm>
+          <a:prstGeom prst="rect">
+            <a:avLst/>
+          </a:prstGeom>
+        </p:spPr>
+        <p:txBody>
+          <a:bodyPr>
+            <a:spAutoFit/>
+          </a:bodyPr>
+          <a:lstStyle/>
+          <a:p>
+            <a:r>
+              <a:rPr lang="en-US" sz="1200" b="0" dirty="0" smtClean="0">
+                <a:solidFill>
+                  <a:srgbClr val="569CD6"/>
+                </a:solidFill>
+                <a:effectLst/>
+                <a:latin typeface="Consolas" panose="020B0609020204030204" pitchFamily="49" charset="0"/>
+              </a:rPr>
+              <a:t>#server.js</a:t>
+            </a:r>
+          </a:p>
+          <a:p>
+            <a:r>
+              <a:rPr lang="en-US" sz="1200" b="0" dirty="0" err="1" smtClean="0">
+                <a:solidFill>
+                  <a:srgbClr val="569CD6"/>
+                </a:solidFill>
+                <a:effectLst/>
+                <a:latin typeface="Consolas" panose="020B0609020204030204" pitchFamily="49" charset="0"/>
+              </a:rPr>
+              <a:t>const</a:t>
+            </a:r>
+            <a:r>
+              <a:rPr lang="en-US" sz="1200" b="0" dirty="0" smtClean="0">
+                <a:solidFill>
+                  <a:srgbClr val="D4D4D4"/>
+                </a:solidFill>
+                <a:effectLst/>
+                <a:latin typeface="Consolas" panose="020B0609020204030204" pitchFamily="49" charset="0"/>
+              </a:rPr>
+              <a:t> </a:t>
+            </a:r>
+            <a:r>
+              <a:rPr lang="en-US" sz="1200" b="0" dirty="0" smtClean="0">
+                <a:solidFill>
+                  <a:srgbClr val="9CDCFE"/>
+                </a:solidFill>
+                <a:effectLst/>
+                <a:latin typeface="Consolas" panose="020B0609020204030204" pitchFamily="49" charset="0"/>
+              </a:rPr>
+              <a:t>server</a:t>
+            </a:r>
+            <a:r>
+              <a:rPr lang="en-US" sz="1200" b="0" dirty="0" smtClean="0">
+                <a:solidFill>
+                  <a:srgbClr val="D4D4D4"/>
+                </a:solidFill>
+                <a:effectLst/>
+                <a:latin typeface="Consolas" panose="020B0609020204030204" pitchFamily="49" charset="0"/>
+              </a:rPr>
+              <a:t> = </a:t>
+            </a:r>
+            <a:r>
+              <a:rPr lang="en-US" sz="1200" b="0" dirty="0" smtClean="0">
+                <a:solidFill>
+                  <a:srgbClr val="DCDCAA"/>
+                </a:solidFill>
+                <a:effectLst/>
+                <a:latin typeface="Consolas" panose="020B0609020204030204" pitchFamily="49" charset="0"/>
+              </a:rPr>
+              <a:t>require</a:t>
+            </a:r>
+            <a:r>
+              <a:rPr lang="en-US" sz="1200" b="0" dirty="0" smtClean="0">
+                <a:solidFill>
+                  <a:srgbClr val="D4D4D4"/>
+                </a:solidFill>
+                <a:effectLst/>
+                <a:latin typeface="Consolas" panose="020B0609020204030204" pitchFamily="49" charset="0"/>
+              </a:rPr>
+              <a:t>(</a:t>
+            </a:r>
+            <a:r>
+              <a:rPr lang="en-US" sz="1200" b="0" dirty="0" smtClean="0">
+                <a:solidFill>
+                  <a:srgbClr val="CE9178"/>
+                </a:solidFill>
+                <a:effectLst/>
+                <a:latin typeface="Consolas" panose="020B0609020204030204" pitchFamily="49" charset="0"/>
+              </a:rPr>
+              <a:t>"http"</a:t>
+            </a:r>
+            <a:r>
+              <a:rPr lang="en-US" sz="1200" b="0" dirty="0" smtClean="0">
+                <a:solidFill>
+                  <a:srgbClr val="D4D4D4"/>
+                </a:solidFill>
+                <a:effectLst/>
+                <a:latin typeface="Consolas" panose="020B0609020204030204" pitchFamily="49" charset="0"/>
+              </a:rPr>
+              <a:t>).</a:t>
+            </a:r>
+            <a:r>
+              <a:rPr lang="en-US" sz="1200" b="0" dirty="0" err="1" smtClean="0">
+                <a:solidFill>
+                  <a:srgbClr val="DCDCAA"/>
+                </a:solidFill>
+                <a:effectLst/>
+                <a:latin typeface="Consolas" panose="020B0609020204030204" pitchFamily="49" charset="0"/>
+              </a:rPr>
+              <a:t>createServer</a:t>
+            </a:r>
+            <a:r>
+              <a:rPr lang="en-US" sz="1200" b="0" dirty="0" smtClean="0">
+                <a:solidFill>
+                  <a:srgbClr val="D4D4D4"/>
+                </a:solidFill>
+                <a:effectLst/>
+                <a:latin typeface="Consolas" panose="020B0609020204030204" pitchFamily="49" charset="0"/>
+              </a:rPr>
+              <a:t>();</a:t>
+            </a:r>
+          </a:p>
+          <a:p>
+            <a:r>
+              <a:rPr lang="en-US" sz="1200" b="0" dirty="0" err="1" smtClean="0">
+                <a:solidFill>
+                  <a:srgbClr val="569CD6"/>
+                </a:solidFill>
+                <a:effectLst/>
+                <a:latin typeface="Consolas" panose="020B0609020204030204" pitchFamily="49" charset="0"/>
+              </a:rPr>
+              <a:t>const</a:t>
+            </a:r>
+            <a:r>
+              <a:rPr lang="en-US" sz="1200" b="0" dirty="0" smtClean="0">
+                <a:solidFill>
+                  <a:srgbClr val="D4D4D4"/>
+                </a:solidFill>
+                <a:effectLst/>
+                <a:latin typeface="Consolas" panose="020B0609020204030204" pitchFamily="49" charset="0"/>
+              </a:rPr>
+              <a:t> </a:t>
+            </a:r>
+            <a:r>
+              <a:rPr lang="en-US" sz="1200" b="0" dirty="0" err="1" smtClean="0">
+                <a:solidFill>
+                  <a:srgbClr val="9CDCFE"/>
+                </a:solidFill>
+                <a:effectLst/>
+                <a:latin typeface="Consolas" panose="020B0609020204030204" pitchFamily="49" charset="0"/>
+              </a:rPr>
+              <a:t>io</a:t>
+            </a:r>
+            <a:r>
+              <a:rPr lang="en-US" sz="1200" b="0" dirty="0" smtClean="0">
+                <a:solidFill>
+                  <a:srgbClr val="D4D4D4"/>
+                </a:solidFill>
+                <a:effectLst/>
+                <a:latin typeface="Consolas" panose="020B0609020204030204" pitchFamily="49" charset="0"/>
+              </a:rPr>
+              <a:t> = </a:t>
+            </a:r>
+            <a:r>
+              <a:rPr lang="en-US" sz="1200" b="0" dirty="0" smtClean="0">
+                <a:solidFill>
+                  <a:srgbClr val="DCDCAA"/>
+                </a:solidFill>
+                <a:effectLst/>
+                <a:latin typeface="Consolas" panose="020B0609020204030204" pitchFamily="49" charset="0"/>
+              </a:rPr>
+              <a:t>require</a:t>
+            </a:r>
+            <a:r>
+              <a:rPr lang="en-US" sz="1200" b="0" dirty="0" smtClean="0">
+                <a:solidFill>
+                  <a:srgbClr val="D4D4D4"/>
+                </a:solidFill>
+                <a:effectLst/>
+                <a:latin typeface="Consolas" panose="020B0609020204030204" pitchFamily="49" charset="0"/>
+              </a:rPr>
+              <a:t>(</a:t>
+            </a:r>
+            <a:r>
+              <a:rPr lang="en-US" sz="1200" b="0" dirty="0" smtClean="0">
+                <a:solidFill>
+                  <a:srgbClr val="CE9178"/>
+                </a:solidFill>
+                <a:effectLst/>
+                <a:latin typeface="Consolas" panose="020B0609020204030204" pitchFamily="49" charset="0"/>
+              </a:rPr>
+              <a:t>"socket.io"</a:t>
+            </a:r>
+            <a:r>
+              <a:rPr lang="en-US" sz="1200" b="0" dirty="0" smtClean="0">
+                <a:solidFill>
+                  <a:srgbClr val="D4D4D4"/>
+                </a:solidFill>
+                <a:effectLst/>
+                <a:latin typeface="Consolas" panose="020B0609020204030204" pitchFamily="49" charset="0"/>
+              </a:rPr>
+              <a:t>)(</a:t>
+            </a:r>
+            <a:r>
+              <a:rPr lang="en-US" sz="1200" b="0" dirty="0" smtClean="0">
+                <a:solidFill>
+                  <a:srgbClr val="9CDCFE"/>
+                </a:solidFill>
+                <a:effectLst/>
+                <a:latin typeface="Consolas" panose="020B0609020204030204" pitchFamily="49" charset="0"/>
+              </a:rPr>
+              <a:t>server</a:t>
+            </a:r>
+            <a:r>
+              <a:rPr lang="en-US" sz="1200" b="0" dirty="0" smtClean="0">
+                <a:solidFill>
+                  <a:srgbClr val="D4D4D4"/>
+                </a:solidFill>
+                <a:effectLst/>
+                <a:latin typeface="Consolas" panose="020B0609020204030204" pitchFamily="49" charset="0"/>
+              </a:rPr>
+              <a:t>);</a:t>
+            </a:r>
+          </a:p>
+          <a:p>
+            <a:r>
+              <a:rPr lang="en-US" sz="1200" b="0" dirty="0" smtClean="0">
+                <a:solidFill>
+                  <a:srgbClr val="D4D4D4"/>
+                </a:solidFill>
+                <a:effectLst/>
+                <a:latin typeface="Consolas" panose="020B0609020204030204" pitchFamily="49" charset="0"/>
+              </a:rPr>
+              <a:t/>
+            </a:r>
+            <a:br>
+              <a:rPr lang="en-US" sz="1200" b="0" dirty="0" smtClean="0">
+                <a:solidFill>
+                  <a:srgbClr val="D4D4D4"/>
+                </a:solidFill>
+                <a:effectLst/>
+                <a:latin typeface="Consolas" panose="020B0609020204030204" pitchFamily="49" charset="0"/>
+              </a:rPr>
+            </a:br>
+            <a:r>
+              <a:rPr lang="en-US" sz="1200" b="0" dirty="0" err="1" smtClean="0">
+                <a:solidFill>
+                  <a:srgbClr val="9CDCFE"/>
+                </a:solidFill>
+                <a:effectLst/>
+                <a:latin typeface="Consolas" panose="020B0609020204030204" pitchFamily="49" charset="0"/>
+              </a:rPr>
+              <a:t>io</a:t>
+            </a:r>
+            <a:r>
+              <a:rPr lang="en-US" sz="1200" b="0" dirty="0" err="1" smtClean="0">
+                <a:solidFill>
+                  <a:srgbClr val="D4D4D4"/>
+                </a:solidFill>
+                <a:effectLst/>
+                <a:latin typeface="Consolas" panose="020B0609020204030204" pitchFamily="49" charset="0"/>
+              </a:rPr>
+              <a:t>.</a:t>
+            </a:r>
+            <a:r>
+              <a:rPr lang="en-US" sz="1200" b="0" dirty="0" err="1" smtClean="0">
+                <a:solidFill>
+                  <a:srgbClr val="DCDCAA"/>
+                </a:solidFill>
+                <a:effectLst/>
+                <a:latin typeface="Consolas" panose="020B0609020204030204" pitchFamily="49" charset="0"/>
+              </a:rPr>
+              <a:t>on</a:t>
+            </a:r>
+            <a:r>
+              <a:rPr lang="en-US" sz="1200" b="0" dirty="0" smtClean="0">
+                <a:solidFill>
+                  <a:srgbClr val="D4D4D4"/>
+                </a:solidFill>
+                <a:effectLst/>
+                <a:latin typeface="Consolas" panose="020B0609020204030204" pitchFamily="49" charset="0"/>
+              </a:rPr>
+              <a:t>(</a:t>
+            </a:r>
+            <a:r>
+              <a:rPr lang="en-US" sz="1200" b="0" dirty="0" smtClean="0">
+                <a:solidFill>
+                  <a:srgbClr val="CE9178"/>
+                </a:solidFill>
+                <a:effectLst/>
+                <a:latin typeface="Consolas" panose="020B0609020204030204" pitchFamily="49" charset="0"/>
+              </a:rPr>
+              <a:t>"connection"</a:t>
+            </a:r>
+            <a:r>
+              <a:rPr lang="en-US" sz="1200" b="0" dirty="0" smtClean="0">
+                <a:solidFill>
+                  <a:srgbClr val="D4D4D4"/>
+                </a:solidFill>
+                <a:effectLst/>
+                <a:latin typeface="Consolas" panose="020B0609020204030204" pitchFamily="49" charset="0"/>
+              </a:rPr>
+              <a:t>, </a:t>
+            </a:r>
+            <a:r>
+              <a:rPr lang="en-US" sz="1200" b="0" dirty="0" smtClean="0">
+                <a:solidFill>
+                  <a:srgbClr val="569CD6"/>
+                </a:solidFill>
+                <a:effectLst/>
+                <a:latin typeface="Consolas" panose="020B0609020204030204" pitchFamily="49" charset="0"/>
+              </a:rPr>
+              <a:t>function</a:t>
+            </a:r>
+            <a:r>
+              <a:rPr lang="en-US" sz="1200" b="0" dirty="0" smtClean="0">
+                <a:solidFill>
+                  <a:srgbClr val="D4D4D4"/>
+                </a:solidFill>
+                <a:effectLst/>
+                <a:latin typeface="Consolas" panose="020B0609020204030204" pitchFamily="49" charset="0"/>
+              </a:rPr>
+              <a:t>(</a:t>
+            </a:r>
+            <a:r>
+              <a:rPr lang="en-US" sz="1200" b="0" dirty="0" smtClean="0">
+                <a:solidFill>
+                  <a:srgbClr val="9CDCFE"/>
+                </a:solidFill>
+                <a:effectLst/>
+                <a:latin typeface="Consolas" panose="020B0609020204030204" pitchFamily="49" charset="0"/>
+              </a:rPr>
+              <a:t>socket</a:t>
+            </a:r>
+            <a:r>
+              <a:rPr lang="en-US" sz="1200" b="0" dirty="0" smtClean="0">
+                <a:solidFill>
+                  <a:srgbClr val="D4D4D4"/>
+                </a:solidFill>
+                <a:effectLst/>
+                <a:latin typeface="Consolas" panose="020B0609020204030204" pitchFamily="49" charset="0"/>
+              </a:rPr>
+              <a:t>){</a:t>
+            </a:r>
+          </a:p>
+          <a:p>
+            <a:r>
+              <a:rPr lang="en-US" sz="1200" b="0" dirty="0" err="1" smtClean="0">
+                <a:solidFill>
+                  <a:srgbClr val="9CDCFE"/>
+                </a:solidFill>
+                <a:effectLst/>
+                <a:latin typeface="Consolas" panose="020B0609020204030204" pitchFamily="49" charset="0"/>
+              </a:rPr>
+              <a:t>socket</a:t>
+            </a:r>
+            <a:r>
+              <a:rPr lang="en-US" sz="1200" b="0" dirty="0" err="1" smtClean="0">
+                <a:solidFill>
+                  <a:srgbClr val="D4D4D4"/>
+                </a:solidFill>
+                <a:effectLst/>
+                <a:latin typeface="Consolas" panose="020B0609020204030204" pitchFamily="49" charset="0"/>
+              </a:rPr>
+              <a:t>.</a:t>
+            </a:r>
+            <a:r>
+              <a:rPr lang="en-US" sz="1200" b="0" dirty="0" err="1" smtClean="0">
+                <a:solidFill>
+                  <a:srgbClr val="DCDCAA"/>
+                </a:solidFill>
+                <a:effectLst/>
+                <a:latin typeface="Consolas" panose="020B0609020204030204" pitchFamily="49" charset="0"/>
+              </a:rPr>
+              <a:t>on</a:t>
+            </a:r>
+            <a:r>
+              <a:rPr lang="en-US" sz="1200" b="0" dirty="0" smtClean="0">
+                <a:solidFill>
+                  <a:srgbClr val="D4D4D4"/>
+                </a:solidFill>
+                <a:effectLst/>
+                <a:latin typeface="Consolas" panose="020B0609020204030204" pitchFamily="49" charset="0"/>
+              </a:rPr>
+              <a:t>(</a:t>
+            </a:r>
+            <a:r>
+              <a:rPr lang="en-US" sz="1200" b="0" dirty="0" smtClean="0">
+                <a:solidFill>
+                  <a:srgbClr val="CE9178"/>
+                </a:solidFill>
+                <a:effectLst/>
+                <a:latin typeface="Consolas" panose="020B0609020204030204" pitchFamily="49" charset="0"/>
+              </a:rPr>
+              <a:t>"emit"</a:t>
+            </a:r>
+            <a:r>
+              <a:rPr lang="en-US" sz="1200" b="0" dirty="0" smtClean="0">
+                <a:solidFill>
+                  <a:srgbClr val="D4D4D4"/>
+                </a:solidFill>
+                <a:effectLst/>
+                <a:latin typeface="Consolas" panose="020B0609020204030204" pitchFamily="49" charset="0"/>
+              </a:rPr>
+              <a:t>, </a:t>
+            </a:r>
+            <a:r>
+              <a:rPr lang="en-US" sz="1200" b="0" dirty="0" smtClean="0">
+                <a:solidFill>
+                  <a:srgbClr val="569CD6"/>
+                </a:solidFill>
+                <a:effectLst/>
+                <a:latin typeface="Consolas" panose="020B0609020204030204" pitchFamily="49" charset="0"/>
+              </a:rPr>
+              <a:t>function</a:t>
+            </a:r>
+            <a:r>
+              <a:rPr lang="en-US" sz="1200" b="0" dirty="0" smtClean="0">
+                <a:solidFill>
+                  <a:srgbClr val="D4D4D4"/>
+                </a:solidFill>
+                <a:effectLst/>
+                <a:latin typeface="Consolas" panose="020B0609020204030204" pitchFamily="49" charset="0"/>
+              </a:rPr>
+              <a:t>(</a:t>
+            </a:r>
+            <a:r>
+              <a:rPr lang="en-US" sz="1200" b="0" dirty="0" smtClean="0">
+                <a:solidFill>
+                  <a:srgbClr val="9CDCFE"/>
+                </a:solidFill>
+                <a:effectLst/>
+                <a:latin typeface="Consolas" panose="020B0609020204030204" pitchFamily="49" charset="0"/>
+              </a:rPr>
+              <a:t>Data</a:t>
+            </a:r>
+            <a:r>
+              <a:rPr lang="en-US" sz="1200" b="0" dirty="0" smtClean="0">
+                <a:solidFill>
+                  <a:srgbClr val="D4D4D4"/>
+                </a:solidFill>
+                <a:effectLst/>
+                <a:latin typeface="Consolas" panose="020B0609020204030204" pitchFamily="49" charset="0"/>
+              </a:rPr>
+              <a:t>){</a:t>
+            </a:r>
+          </a:p>
+          <a:p>
+            <a:r>
+              <a:rPr lang="en-US" sz="1200" b="0" dirty="0" smtClean="0">
+                <a:solidFill>
+                  <a:srgbClr val="6A9955"/>
+                </a:solidFill>
+                <a:effectLst/>
+                <a:latin typeface="Consolas" panose="020B0609020204030204" pitchFamily="49" charset="0"/>
+              </a:rPr>
+              <a:t>// console.log("Receive Data");</a:t>
+            </a:r>
+            <a:endParaRPr lang="en-US" sz="1200" b="0" dirty="0" smtClean="0">
+              <a:solidFill>
+                <a:srgbClr val="D4D4D4"/>
+              </a:solidFill>
+              <a:effectLst/>
+              <a:latin typeface="Consolas" panose="020B0609020204030204" pitchFamily="49" charset="0"/>
+            </a:endParaRPr>
+          </a:p>
+          <a:p>
+            <a:r>
+              <a:rPr lang="en-US" sz="1200" b="0" dirty="0" smtClean="0">
+                <a:solidFill>
+                  <a:srgbClr val="4EC9B0"/>
+                </a:solidFill>
+                <a:effectLst/>
+                <a:latin typeface="Consolas" panose="020B0609020204030204" pitchFamily="49" charset="0"/>
+              </a:rPr>
+              <a:t>console</a:t>
+            </a:r>
+            <a:r>
+              <a:rPr lang="en-US" sz="1200" b="0" dirty="0" smtClean="0">
+                <a:solidFill>
+                  <a:srgbClr val="D4D4D4"/>
+                </a:solidFill>
+                <a:effectLst/>
+                <a:latin typeface="Consolas" panose="020B0609020204030204" pitchFamily="49" charset="0"/>
+              </a:rPr>
+              <a:t>.</a:t>
+            </a:r>
+            <a:r>
+              <a:rPr lang="en-US" sz="1200" b="0" dirty="0" smtClean="0">
+                <a:solidFill>
+                  <a:srgbClr val="DCDCAA"/>
+                </a:solidFill>
+                <a:effectLst/>
+                <a:latin typeface="Consolas" panose="020B0609020204030204" pitchFamily="49" charset="0"/>
+              </a:rPr>
+              <a:t>log</a:t>
+            </a:r>
+            <a:r>
+              <a:rPr lang="en-US" sz="1200" b="0" dirty="0" smtClean="0">
+                <a:solidFill>
+                  <a:srgbClr val="D4D4D4"/>
+                </a:solidFill>
+                <a:effectLst/>
+                <a:latin typeface="Consolas" panose="020B0609020204030204" pitchFamily="49" charset="0"/>
+              </a:rPr>
+              <a:t>(</a:t>
+            </a:r>
+            <a:r>
+              <a:rPr lang="en-US" sz="1200" b="0" dirty="0" smtClean="0">
+                <a:solidFill>
+                  <a:srgbClr val="9CDCFE"/>
+                </a:solidFill>
+                <a:effectLst/>
+                <a:latin typeface="Consolas" panose="020B0609020204030204" pitchFamily="49" charset="0"/>
+              </a:rPr>
+              <a:t>Data</a:t>
+            </a:r>
+            <a:r>
+              <a:rPr lang="en-US" sz="1200" b="0" dirty="0" smtClean="0">
+                <a:solidFill>
+                  <a:srgbClr val="D4D4D4"/>
+                </a:solidFill>
+                <a:effectLst/>
+                <a:latin typeface="Consolas" panose="020B0609020204030204" pitchFamily="49" charset="0"/>
+              </a:rPr>
+              <a:t>);</a:t>
+            </a:r>
+          </a:p>
+          <a:p>
+            <a:r>
+              <a:rPr lang="en-US" sz="1200" b="0" dirty="0" err="1" smtClean="0">
+                <a:solidFill>
+                  <a:srgbClr val="9CDCFE"/>
+                </a:solidFill>
+                <a:effectLst/>
+                <a:latin typeface="Consolas" panose="020B0609020204030204" pitchFamily="49" charset="0"/>
+              </a:rPr>
+              <a:t>socket</a:t>
+            </a:r>
+            <a:r>
+              <a:rPr lang="en-US" sz="1200" b="0" dirty="0" err="1" smtClean="0">
+                <a:solidFill>
+                  <a:srgbClr val="D4D4D4"/>
+                </a:solidFill>
+                <a:effectLst/>
+                <a:latin typeface="Consolas" panose="020B0609020204030204" pitchFamily="49" charset="0"/>
+              </a:rPr>
+              <a:t>.</a:t>
+            </a:r>
+            <a:r>
+              <a:rPr lang="en-US" sz="1200" b="0" dirty="0" err="1" smtClean="0">
+                <a:solidFill>
+                  <a:srgbClr val="9CDCFE"/>
+                </a:solidFill>
+                <a:effectLst/>
+                <a:latin typeface="Consolas" panose="020B0609020204030204" pitchFamily="49" charset="0"/>
+              </a:rPr>
+              <a:t>broadcast</a:t>
+            </a:r>
+            <a:r>
+              <a:rPr lang="en-US" sz="1200" b="0" dirty="0" err="1" smtClean="0">
+                <a:solidFill>
+                  <a:srgbClr val="D4D4D4"/>
+                </a:solidFill>
+                <a:effectLst/>
+                <a:latin typeface="Consolas" panose="020B0609020204030204" pitchFamily="49" charset="0"/>
+              </a:rPr>
+              <a:t>.</a:t>
+            </a:r>
+            <a:r>
+              <a:rPr lang="en-US" sz="1200" b="0" dirty="0" err="1" smtClean="0">
+                <a:solidFill>
+                  <a:srgbClr val="DCDCAA"/>
+                </a:solidFill>
+                <a:effectLst/>
+                <a:latin typeface="Consolas" panose="020B0609020204030204" pitchFamily="49" charset="0"/>
+              </a:rPr>
+              <a:t>emit</a:t>
+            </a:r>
+            <a:r>
+              <a:rPr lang="en-US" sz="1200" b="0" dirty="0" smtClean="0">
+                <a:solidFill>
+                  <a:srgbClr val="D4D4D4"/>
+                </a:solidFill>
+                <a:effectLst/>
+                <a:latin typeface="Consolas" panose="020B0609020204030204" pitchFamily="49" charset="0"/>
+              </a:rPr>
+              <a:t>(</a:t>
+            </a:r>
+            <a:r>
+              <a:rPr lang="en-US" sz="1200" b="0" dirty="0" smtClean="0">
+                <a:solidFill>
+                  <a:srgbClr val="CE9178"/>
+                </a:solidFill>
+                <a:effectLst/>
+                <a:latin typeface="Consolas" panose="020B0609020204030204" pitchFamily="49" charset="0"/>
+              </a:rPr>
+              <a:t>"count"</a:t>
+            </a:r>
+            <a:r>
+              <a:rPr lang="en-US" sz="1200" b="0" dirty="0" smtClean="0">
+                <a:solidFill>
+                  <a:srgbClr val="D4D4D4"/>
+                </a:solidFill>
+                <a:effectLst/>
+                <a:latin typeface="Consolas" panose="020B0609020204030204" pitchFamily="49" charset="0"/>
+              </a:rPr>
+              <a:t>, {</a:t>
+            </a:r>
+            <a:r>
+              <a:rPr lang="en-US" sz="1200" b="0" dirty="0" err="1" smtClean="0">
+                <a:solidFill>
+                  <a:srgbClr val="9CDCFE"/>
+                </a:solidFill>
+                <a:effectLst/>
+                <a:latin typeface="Consolas" panose="020B0609020204030204" pitchFamily="49" charset="0"/>
+              </a:rPr>
+              <a:t>count:Data</a:t>
+            </a:r>
+            <a:r>
+              <a:rPr lang="en-US" sz="1200" b="0" dirty="0" err="1" smtClean="0">
+                <a:solidFill>
+                  <a:srgbClr val="D4D4D4"/>
+                </a:solidFill>
+                <a:effectLst/>
+                <a:latin typeface="Consolas" panose="020B0609020204030204" pitchFamily="49" charset="0"/>
+              </a:rPr>
+              <a:t>.</a:t>
+            </a:r>
+            <a:r>
+              <a:rPr lang="en-US" sz="1200" b="0" dirty="0" err="1" smtClean="0">
+                <a:solidFill>
+                  <a:srgbClr val="9CDCFE"/>
+                </a:solidFill>
+                <a:effectLst/>
+                <a:latin typeface="Consolas" panose="020B0609020204030204" pitchFamily="49" charset="0"/>
+              </a:rPr>
+              <a:t>count</a:t>
+            </a:r>
+            <a:r>
+              <a:rPr lang="en-US" sz="1200" b="0" dirty="0" smtClean="0">
+                <a:solidFill>
+                  <a:srgbClr val="D4D4D4"/>
+                </a:solidFill>
+                <a:effectLst/>
+                <a:latin typeface="Consolas" panose="020B0609020204030204" pitchFamily="49" charset="0"/>
+              </a:rPr>
+              <a:t>});</a:t>
+            </a:r>
+          </a:p>
+          <a:p>
+            <a:r>
+              <a:rPr lang="en-US" sz="1200" b="0" dirty="0" smtClean="0">
+                <a:solidFill>
+                  <a:srgbClr val="D4D4D4"/>
+                </a:solidFill>
+                <a:effectLst/>
+                <a:latin typeface="Consolas" panose="020B0609020204030204" pitchFamily="49" charset="0"/>
+              </a:rPr>
+              <a:t>});</a:t>
+            </a:r>
+          </a:p>
+          <a:p>
+            <a:r>
+              <a:rPr lang="en-US" sz="1200" b="0" dirty="0" smtClean="0">
+                <a:solidFill>
+                  <a:srgbClr val="D4D4D4"/>
+                </a:solidFill>
+                <a:effectLst/>
+                <a:latin typeface="Consolas" panose="020B0609020204030204" pitchFamily="49" charset="0"/>
+              </a:rPr>
+              <a:t>});</a:t>
+            </a:r>
+          </a:p>
+          <a:p>
+            <a:r>
+              <a:rPr lang="en-US" sz="1200" b="0" dirty="0" smtClean="0">
+                <a:solidFill>
+                  <a:srgbClr val="D4D4D4"/>
+                </a:solidFill>
+                <a:effectLst/>
+                <a:latin typeface="Consolas" panose="020B0609020204030204" pitchFamily="49" charset="0"/>
+              </a:rPr>
+              <a:t/>
+            </a:r>
+            <a:br>
+              <a:rPr lang="en-US" sz="1200" b="0" dirty="0" smtClean="0">
+                <a:solidFill>
+                  <a:srgbClr val="D4D4D4"/>
+                </a:solidFill>
+                <a:effectLst/>
+                <a:latin typeface="Consolas" panose="020B0609020204030204" pitchFamily="49" charset="0"/>
+              </a:rPr>
+            </a:br>
+            <a:r>
+              <a:rPr lang="en-US" sz="1200" b="0" dirty="0" err="1" smtClean="0">
+                <a:solidFill>
+                  <a:srgbClr val="9CDCFE"/>
+                </a:solidFill>
+                <a:effectLst/>
+                <a:latin typeface="Consolas" panose="020B0609020204030204" pitchFamily="49" charset="0"/>
+              </a:rPr>
+              <a:t>server</a:t>
+            </a:r>
+            <a:r>
+              <a:rPr lang="en-US" sz="1200" b="0" dirty="0" err="1" smtClean="0">
+                <a:solidFill>
+                  <a:srgbClr val="D4D4D4"/>
+                </a:solidFill>
+                <a:effectLst/>
+                <a:latin typeface="Consolas" panose="020B0609020204030204" pitchFamily="49" charset="0"/>
+              </a:rPr>
+              <a:t>.</a:t>
+            </a:r>
+            <a:r>
+              <a:rPr lang="en-US" sz="1200" b="0" dirty="0" err="1" smtClean="0">
+                <a:solidFill>
+                  <a:srgbClr val="DCDCAA"/>
+                </a:solidFill>
+                <a:effectLst/>
+                <a:latin typeface="Consolas" panose="020B0609020204030204" pitchFamily="49" charset="0"/>
+              </a:rPr>
+              <a:t>listen</a:t>
+            </a:r>
+            <a:r>
+              <a:rPr lang="en-US" sz="1200" b="0" dirty="0" smtClean="0">
+                <a:solidFill>
+                  <a:srgbClr val="D4D4D4"/>
+                </a:solidFill>
+                <a:effectLst/>
+                <a:latin typeface="Consolas" panose="020B0609020204030204" pitchFamily="49" charset="0"/>
+              </a:rPr>
+              <a:t>(</a:t>
+            </a:r>
+            <a:r>
+              <a:rPr lang="en-US" sz="1200" b="0" dirty="0" smtClean="0">
+                <a:solidFill>
+                  <a:srgbClr val="B5CEA8"/>
+                </a:solidFill>
+                <a:effectLst/>
+                <a:latin typeface="Consolas" panose="020B0609020204030204" pitchFamily="49" charset="0"/>
+              </a:rPr>
+              <a:t>8080</a:t>
+            </a:r>
+            <a:r>
+              <a:rPr lang="en-US" sz="1200" b="0" dirty="0" smtClean="0">
+                <a:solidFill>
+                  <a:srgbClr val="D4D4D4"/>
+                </a:solidFill>
+                <a:effectLst/>
+                <a:latin typeface="Consolas" panose="020B0609020204030204" pitchFamily="49" charset="0"/>
+              </a:rPr>
+              <a:t>, </a:t>
+            </a:r>
+            <a:r>
+              <a:rPr lang="en-US" sz="1200" b="0" dirty="0" smtClean="0">
+                <a:solidFill>
+                  <a:srgbClr val="569CD6"/>
+                </a:solidFill>
+                <a:effectLst/>
+                <a:latin typeface="Consolas" panose="020B0609020204030204" pitchFamily="49" charset="0"/>
+              </a:rPr>
+              <a:t>function</a:t>
+            </a:r>
+            <a:r>
+              <a:rPr lang="en-US" sz="1200" b="0" dirty="0" smtClean="0">
+                <a:solidFill>
+                  <a:srgbClr val="D4D4D4"/>
+                </a:solidFill>
+                <a:effectLst/>
+                <a:latin typeface="Consolas" panose="020B0609020204030204" pitchFamily="49" charset="0"/>
+              </a:rPr>
+              <a:t>(</a:t>
+            </a:r>
+            <a:r>
+              <a:rPr lang="en-US" sz="1200" b="0" dirty="0" smtClean="0">
+                <a:solidFill>
+                  <a:srgbClr val="9CDCFE"/>
+                </a:solidFill>
+                <a:effectLst/>
+                <a:latin typeface="Consolas" panose="020B0609020204030204" pitchFamily="49" charset="0"/>
+              </a:rPr>
+              <a:t>err</a:t>
+            </a:r>
+            <a:r>
+              <a:rPr lang="en-US" sz="1200" b="0" dirty="0" smtClean="0">
+                <a:solidFill>
+                  <a:srgbClr val="D4D4D4"/>
+                </a:solidFill>
+                <a:effectLst/>
+                <a:latin typeface="Consolas" panose="020B0609020204030204" pitchFamily="49" charset="0"/>
+              </a:rPr>
+              <a:t>) {</a:t>
+            </a:r>
+          </a:p>
+          <a:p>
+            <a:r>
+              <a:rPr lang="en-US" sz="1200" b="0" dirty="0" smtClean="0">
+                <a:solidFill>
+                  <a:srgbClr val="C586C0"/>
+                </a:solidFill>
+                <a:effectLst/>
+                <a:latin typeface="Consolas" panose="020B0609020204030204" pitchFamily="49" charset="0"/>
+              </a:rPr>
+              <a:t>if</a:t>
+            </a:r>
+            <a:r>
+              <a:rPr lang="en-US" sz="1200" b="0" dirty="0" smtClean="0">
+                <a:solidFill>
+                  <a:srgbClr val="D4D4D4"/>
+                </a:solidFill>
+                <a:effectLst/>
+                <a:latin typeface="Consolas" panose="020B0609020204030204" pitchFamily="49" charset="0"/>
+              </a:rPr>
+              <a:t> (</a:t>
+            </a:r>
+            <a:r>
+              <a:rPr lang="en-US" sz="1200" b="0" dirty="0" smtClean="0">
+                <a:solidFill>
+                  <a:srgbClr val="9CDCFE"/>
+                </a:solidFill>
+                <a:effectLst/>
+                <a:latin typeface="Consolas" panose="020B0609020204030204" pitchFamily="49" charset="0"/>
+              </a:rPr>
+              <a:t>err</a:t>
+            </a:r>
+            <a:r>
+              <a:rPr lang="en-US" sz="1200" b="0" dirty="0" smtClean="0">
+                <a:solidFill>
+                  <a:srgbClr val="D4D4D4"/>
+                </a:solidFill>
+                <a:effectLst/>
+                <a:latin typeface="Consolas" panose="020B0609020204030204" pitchFamily="49" charset="0"/>
+              </a:rPr>
+              <a:t>) </a:t>
+            </a:r>
+            <a:r>
+              <a:rPr lang="en-US" sz="1200" b="0" dirty="0" smtClean="0">
+                <a:solidFill>
+                  <a:srgbClr val="C586C0"/>
+                </a:solidFill>
+                <a:effectLst/>
+                <a:latin typeface="Consolas" panose="020B0609020204030204" pitchFamily="49" charset="0"/>
+              </a:rPr>
+              <a:t>throw</a:t>
+            </a:r>
+            <a:r>
+              <a:rPr lang="en-US" sz="1200" b="0" dirty="0" smtClean="0">
+                <a:solidFill>
+                  <a:srgbClr val="D4D4D4"/>
+                </a:solidFill>
+                <a:effectLst/>
+                <a:latin typeface="Consolas" panose="020B0609020204030204" pitchFamily="49" charset="0"/>
+              </a:rPr>
+              <a:t> </a:t>
+            </a:r>
+            <a:r>
+              <a:rPr lang="en-US" sz="1200" b="0" dirty="0" smtClean="0">
+                <a:solidFill>
+                  <a:srgbClr val="9CDCFE"/>
+                </a:solidFill>
+                <a:effectLst/>
+                <a:latin typeface="Consolas" panose="020B0609020204030204" pitchFamily="49" charset="0"/>
+              </a:rPr>
+              <a:t>err</a:t>
+            </a:r>
+            <a:r>
+              <a:rPr lang="en-US" sz="1200" b="0" dirty="0" smtClean="0">
+                <a:solidFill>
+                  <a:srgbClr val="D4D4D4"/>
+                </a:solidFill>
+                <a:effectLst/>
+                <a:latin typeface="Consolas" panose="020B0609020204030204" pitchFamily="49" charset="0"/>
+              </a:rPr>
+              <a:t>;</a:t>
+            </a:r>
+          </a:p>
+          <a:p>
+            <a:r>
+              <a:rPr lang="en-US" sz="1200" b="0" dirty="0" smtClean="0">
+                <a:solidFill>
+                  <a:srgbClr val="4EC9B0"/>
+                </a:solidFill>
+                <a:effectLst/>
+                <a:latin typeface="Consolas" panose="020B0609020204030204" pitchFamily="49" charset="0"/>
+              </a:rPr>
+              <a:t>console</a:t>
+            </a:r>
+            <a:r>
+              <a:rPr lang="en-US" sz="1200" b="0" dirty="0" smtClean="0">
+                <a:solidFill>
+                  <a:srgbClr val="D4D4D4"/>
+                </a:solidFill>
+                <a:effectLst/>
+                <a:latin typeface="Consolas" panose="020B0609020204030204" pitchFamily="49" charset="0"/>
+              </a:rPr>
+              <a:t>.</a:t>
+            </a:r>
+            <a:r>
+              <a:rPr lang="en-US" sz="1200" b="0" dirty="0" smtClean="0">
+                <a:solidFill>
+                  <a:srgbClr val="DCDCAA"/>
+                </a:solidFill>
+                <a:effectLst/>
+                <a:latin typeface="Consolas" panose="020B0609020204030204" pitchFamily="49" charset="0"/>
+              </a:rPr>
+              <a:t>log</a:t>
+            </a:r>
+            <a:r>
+              <a:rPr lang="en-US" sz="1200" b="0" dirty="0" smtClean="0">
+                <a:solidFill>
+                  <a:srgbClr val="D4D4D4"/>
+                </a:solidFill>
+                <a:effectLst/>
+                <a:latin typeface="Consolas" panose="020B0609020204030204" pitchFamily="49" charset="0"/>
+              </a:rPr>
+              <a:t>(</a:t>
+            </a:r>
+            <a:r>
+              <a:rPr lang="en-US" sz="1200" b="0" dirty="0" smtClean="0">
+                <a:solidFill>
+                  <a:srgbClr val="CE9178"/>
+                </a:solidFill>
+                <a:effectLst/>
+                <a:latin typeface="Consolas" panose="020B0609020204030204" pitchFamily="49" charset="0"/>
+              </a:rPr>
+              <a:t>"Server is listening to port 8080"</a:t>
+            </a:r>
+            <a:r>
+              <a:rPr lang="en-US" sz="1200" b="0" dirty="0" smtClean="0">
+                <a:solidFill>
+                  <a:srgbClr val="D4D4D4"/>
+                </a:solidFill>
+                <a:effectLst/>
+                <a:latin typeface="Consolas" panose="020B0609020204030204" pitchFamily="49" charset="0"/>
+              </a:rPr>
+              <a:t>)</a:t>
+            </a:r>
+          </a:p>
+          <a:p>
+            <a:r>
+              <a:rPr lang="en-US" sz="1200" b="0" dirty="0" smtClean="0">
+                <a:solidFill>
+                  <a:srgbClr val="D4D4D4"/>
+                </a:solidFill>
+                <a:effectLst/>
+                <a:latin typeface="Consolas" panose="020B0609020204030204" pitchFamily="49" charset="0"/>
+              </a:rPr>
+              <a:t>});</a:t>
+            </a:r>
+            <a:endParaRPr lang="en-US" sz="1200" b="0" dirty="0">
+              <a:solidFill>
+                <a:srgbClr val="D4D4D4"/>
+              </a:solidFill>
+              <a:effectLst/>
+              <a:latin typeface="Consolas" panose="020B0609020204030204" pitchFamily="49" charset="0"/>
+            </a:endParaRPr>
+          </a:p>
+        </p:txBody>
+      </p:sp>
+    </p:spTree>
+    <p:extLst>
+      <p:ext uri="{BB962C8B-B14F-4D97-AF65-F5344CB8AC3E}">
+        <p14:creationId xmlns:p14="http://schemas.microsoft.com/office/powerpoint/2010/main" val="1835635178"/>
       </p:ext>
     </p:extLst>
   </p:cSld>

</xml_diff>

<commit_message>
Prove Of Concept SocketIO
</commit_message>
<xml_diff>
--- a/How to Sociket_io.pptx
+++ b/How to Sociket_io.pptx
@@ -7,10 +7,13 @@
   <p:sldIdLst>
     <p:sldId id="256" r:id="rId2"/>
     <p:sldId id="257" r:id="rId3"/>
-    <p:sldId id="258" r:id="rId4"/>
-    <p:sldId id="260" r:id="rId5"/>
-    <p:sldId id="259" r:id="rId6"/>
-    <p:sldId id="261" r:id="rId7"/>
+    <p:sldId id="264" r:id="rId4"/>
+    <p:sldId id="258" r:id="rId5"/>
+    <p:sldId id="260" r:id="rId6"/>
+    <p:sldId id="259" r:id="rId7"/>
+    <p:sldId id="261" r:id="rId8"/>
+    <p:sldId id="262" r:id="rId9"/>
+    <p:sldId id="263" r:id="rId10"/>
   </p:sldIdLst>
   <p:sldSz cx="12192000" cy="6858000"/>
   <p:notesSz cx="6858000" cy="9144000"/>
@@ -259,7 +262,7 @@
           <a:p>
             <a:fld id="{3C23688B-E359-401E-845E-68C6F2FC713E}" type="datetimeFigureOut">
               <a:rPr lang="en-US" smtClean="0"/>
-              <a:t>9/16/2019</a:t>
+              <a:t>9/24/2019</a:t>
             </a:fld>
             <a:endParaRPr lang="en-US"/>
           </a:p>
@@ -429,7 +432,7 @@
           <a:p>
             <a:fld id="{3C23688B-E359-401E-845E-68C6F2FC713E}" type="datetimeFigureOut">
               <a:rPr lang="en-US" smtClean="0"/>
-              <a:t>9/16/2019</a:t>
+              <a:t>9/24/2019</a:t>
             </a:fld>
             <a:endParaRPr lang="en-US"/>
           </a:p>
@@ -609,7 +612,7 @@
           <a:p>
             <a:fld id="{3C23688B-E359-401E-845E-68C6F2FC713E}" type="datetimeFigureOut">
               <a:rPr lang="en-US" smtClean="0"/>
-              <a:t>9/16/2019</a:t>
+              <a:t>9/24/2019</a:t>
             </a:fld>
             <a:endParaRPr lang="en-US"/>
           </a:p>
@@ -779,7 +782,7 @@
           <a:p>
             <a:fld id="{3C23688B-E359-401E-845E-68C6F2FC713E}" type="datetimeFigureOut">
               <a:rPr lang="en-US" smtClean="0"/>
-              <a:t>9/16/2019</a:t>
+              <a:t>9/24/2019</a:t>
             </a:fld>
             <a:endParaRPr lang="en-US"/>
           </a:p>
@@ -1025,7 +1028,7 @@
           <a:p>
             <a:fld id="{3C23688B-E359-401E-845E-68C6F2FC713E}" type="datetimeFigureOut">
               <a:rPr lang="en-US" smtClean="0"/>
-              <a:t>9/16/2019</a:t>
+              <a:t>9/24/2019</a:t>
             </a:fld>
             <a:endParaRPr lang="en-US"/>
           </a:p>
@@ -1257,7 +1260,7 @@
           <a:p>
             <a:fld id="{3C23688B-E359-401E-845E-68C6F2FC713E}" type="datetimeFigureOut">
               <a:rPr lang="en-US" smtClean="0"/>
-              <a:t>9/16/2019</a:t>
+              <a:t>9/24/2019</a:t>
             </a:fld>
             <a:endParaRPr lang="en-US"/>
           </a:p>
@@ -1624,7 +1627,7 @@
           <a:p>
             <a:fld id="{3C23688B-E359-401E-845E-68C6F2FC713E}" type="datetimeFigureOut">
               <a:rPr lang="en-US" smtClean="0"/>
-              <a:t>9/16/2019</a:t>
+              <a:t>9/24/2019</a:t>
             </a:fld>
             <a:endParaRPr lang="en-US"/>
           </a:p>
@@ -1742,7 +1745,7 @@
           <a:p>
             <a:fld id="{3C23688B-E359-401E-845E-68C6F2FC713E}" type="datetimeFigureOut">
               <a:rPr lang="en-US" smtClean="0"/>
-              <a:t>9/16/2019</a:t>
+              <a:t>9/24/2019</a:t>
             </a:fld>
             <a:endParaRPr lang="en-US"/>
           </a:p>
@@ -1837,7 +1840,7 @@
           <a:p>
             <a:fld id="{3C23688B-E359-401E-845E-68C6F2FC713E}" type="datetimeFigureOut">
               <a:rPr lang="en-US" smtClean="0"/>
-              <a:t>9/16/2019</a:t>
+              <a:t>9/24/2019</a:t>
             </a:fld>
             <a:endParaRPr lang="en-US"/>
           </a:p>
@@ -2114,7 +2117,7 @@
           <a:p>
             <a:fld id="{3C23688B-E359-401E-845E-68C6F2FC713E}" type="datetimeFigureOut">
               <a:rPr lang="en-US" smtClean="0"/>
-              <a:t>9/16/2019</a:t>
+              <a:t>9/24/2019</a:t>
             </a:fld>
             <a:endParaRPr lang="en-US"/>
           </a:p>
@@ -2367,7 +2370,7 @@
           <a:p>
             <a:fld id="{3C23688B-E359-401E-845E-68C6F2FC713E}" type="datetimeFigureOut">
               <a:rPr lang="en-US" smtClean="0"/>
-              <a:t>9/16/2019</a:t>
+              <a:t>9/24/2019</a:t>
             </a:fld>
             <a:endParaRPr lang="en-US"/>
           </a:p>
@@ -2580,7 +2583,7 @@
           <a:p>
             <a:fld id="{3C23688B-E359-401E-845E-68C6F2FC713E}" type="datetimeFigureOut">
               <a:rPr lang="en-US" smtClean="0"/>
-              <a:t>9/16/2019</a:t>
+              <a:t>9/24/2019</a:t>
             </a:fld>
             <a:endParaRPr lang="en-US"/>
           </a:p>
@@ -3361,18 +3364,14 @@
           <a:lstStyle/>
           <a:p>
             <a:r>
-              <a:rPr lang="en-US" smtClean="0"/>
-              <a:t>B </a:t>
-            </a:r>
-            <a:r>
               <a:rPr lang="en-US" dirty="0" smtClean="0"/>
-              <a:t>: Project Chat Server</a:t>
+              <a:t>B : Project Chat Server</a:t>
             </a:r>
           </a:p>
           <a:p>
             <a:r>
               <a:rPr lang="en-US" dirty="0" smtClean="0"/>
-              <a:t>Library </a:t>
+              <a:t>Library</a:t>
             </a:r>
           </a:p>
           <a:p>
@@ -3384,6 +3383,263 @@
               <a:rPr lang="en-US" dirty="0" smtClean="0"/>
               <a:t>Socket.io</a:t>
             </a:r>
+          </a:p>
+        </p:txBody>
+      </p:sp>
+      <p:sp>
+        <p:nvSpPr>
+          <p:cNvPr id="2" name="สี่เหลี่ยมผืนผ้า 1"/>
+          <p:cNvSpPr/>
+          <p:nvPr/>
+        </p:nvSpPr>
+        <p:spPr>
+          <a:xfrm>
+            <a:off x="5548829" y="357088"/>
+            <a:ext cx="6096000" cy="5632311"/>
+          </a:xfrm>
+          <a:prstGeom prst="rect">
+            <a:avLst/>
+          </a:prstGeom>
+        </p:spPr>
+        <p:txBody>
+          <a:bodyPr>
+            <a:spAutoFit/>
+          </a:bodyPr>
+          <a:lstStyle/>
+          <a:p>
+            <a:r>
+              <a:rPr lang="en-US" dirty="0"/>
+              <a:t>1. Install </a:t>
+            </a:r>
+          </a:p>
+          <a:p>
+            <a:r>
+              <a:rPr lang="en-US" dirty="0"/>
+              <a:t>	- node -v</a:t>
+            </a:r>
+          </a:p>
+          <a:p>
+            <a:r>
+              <a:rPr lang="en-US" dirty="0"/>
+              <a:t>	- npm -v</a:t>
+            </a:r>
+          </a:p>
+          <a:p>
+            <a:r>
+              <a:rPr lang="en-US" dirty="0"/>
+              <a:t>	- npm install -g create-react-app (</a:t>
+            </a:r>
+            <a:r>
+              <a:rPr lang="en-US" dirty="0" err="1"/>
+              <a:t>แบบ</a:t>
+            </a:r>
+            <a:r>
+              <a:rPr lang="en-US" dirty="0"/>
+              <a:t> Global)</a:t>
+            </a:r>
+          </a:p>
+          <a:p>
+            <a:r>
+              <a:rPr lang="en-US" dirty="0"/>
+              <a:t>	- create-react-app --version</a:t>
+            </a:r>
+          </a:p>
+          <a:p>
+            <a:r>
+              <a:rPr lang="en-US" dirty="0"/>
+              <a:t>	- cd </a:t>
+            </a:r>
+            <a:r>
+              <a:rPr lang="en-US" dirty="0" err="1"/>
+              <a:t>myapp</a:t>
+            </a:r>
+            <a:endParaRPr lang="en-US" dirty="0"/>
+          </a:p>
+          <a:p>
+            <a:r>
+              <a:rPr lang="en-US" dirty="0"/>
+              <a:t>	- </a:t>
+            </a:r>
+            <a:r>
+              <a:rPr lang="en-US" dirty="0" err="1"/>
+              <a:t>npx</a:t>
+            </a:r>
+            <a:r>
+              <a:rPr lang="en-US" dirty="0"/>
+              <a:t> create-react-app </a:t>
+            </a:r>
+            <a:r>
+              <a:rPr lang="en-US" dirty="0" err="1"/>
+              <a:t>myapp</a:t>
+            </a:r>
+            <a:endParaRPr lang="en-US" dirty="0"/>
+          </a:p>
+          <a:p>
+            <a:r>
+              <a:rPr lang="en-US" dirty="0"/>
+              <a:t>	- npm start</a:t>
+            </a:r>
+          </a:p>
+          <a:p>
+            <a:r>
+              <a:rPr lang="en-US" dirty="0"/>
+              <a:t>	- *To create a production build, use $npm run build</a:t>
+            </a:r>
+          </a:p>
+          <a:p>
+            <a:r>
+              <a:rPr lang="en-US" dirty="0"/>
+              <a:t>	- Install IDE (Visual Studio Code)</a:t>
+            </a:r>
+          </a:p>
+          <a:p>
+            <a:endParaRPr lang="en-US" dirty="0"/>
+          </a:p>
+          <a:p>
+            <a:r>
+              <a:rPr lang="en-US" dirty="0"/>
+              <a:t>2. </a:t>
+            </a:r>
+            <a:r>
+              <a:rPr lang="en-US" dirty="0" err="1"/>
+              <a:t>เริ่มสร้าง</a:t>
+            </a:r>
+            <a:r>
+              <a:rPr lang="en-US" dirty="0"/>
+              <a:t> React </a:t>
+            </a:r>
+            <a:r>
+              <a:rPr lang="en-US" dirty="0" err="1"/>
+              <a:t>ด้วยคำสั่ง</a:t>
+            </a:r>
+            <a:r>
+              <a:rPr lang="en-US" dirty="0"/>
+              <a:t> create-react-app </a:t>
+            </a:r>
+            <a:r>
+              <a:rPr lang="en-US" dirty="0" err="1"/>
+              <a:t>ชื่อโปรเจค</a:t>
+            </a:r>
+            <a:endParaRPr lang="en-US" dirty="0"/>
+          </a:p>
+          <a:p>
+            <a:r>
+              <a:rPr lang="en-US" dirty="0"/>
+              <a:t>3. </a:t>
+            </a:r>
+            <a:r>
+              <a:rPr lang="en-US" dirty="0" err="1"/>
+              <a:t>เรียน</a:t>
+            </a:r>
+            <a:r>
+              <a:rPr lang="en-US" dirty="0"/>
+              <a:t> </a:t>
+            </a:r>
+            <a:r>
+              <a:rPr lang="en-US" dirty="0" err="1"/>
+              <a:t>โดครงสร้างและการทำงานพื้นฐานของ</a:t>
+            </a:r>
+            <a:r>
+              <a:rPr lang="en-US" dirty="0"/>
+              <a:t> React</a:t>
+            </a:r>
+          </a:p>
+          <a:p>
+            <a:r>
+              <a:rPr lang="en-US" dirty="0"/>
+              <a:t>4. </a:t>
+            </a:r>
+            <a:r>
+              <a:rPr lang="en-US" dirty="0" err="1"/>
+              <a:t>ทดลองสร้าง</a:t>
+            </a:r>
+            <a:r>
+              <a:rPr lang="en-US" dirty="0"/>
+              <a:t> Component </a:t>
+            </a:r>
+            <a:r>
+              <a:rPr lang="en-US" dirty="0" err="1"/>
+              <a:t>แบบ</a:t>
+            </a:r>
+            <a:r>
+              <a:rPr lang="en-US" dirty="0"/>
+              <a:t> Class Component </a:t>
+            </a:r>
+            <a:r>
+              <a:rPr lang="en-US" dirty="0" err="1"/>
+              <a:t>และ</a:t>
+            </a:r>
+            <a:r>
+              <a:rPr lang="en-US" dirty="0"/>
+              <a:t> </a:t>
+            </a:r>
+            <a:r>
+              <a:rPr lang="en-US" dirty="0" err="1"/>
+              <a:t>Functiona</a:t>
+            </a:r>
+            <a:r>
+              <a:rPr lang="en-US" dirty="0"/>
+              <a:t> Component </a:t>
+            </a:r>
+          </a:p>
+          <a:p>
+            <a:r>
+              <a:rPr lang="en-US" dirty="0"/>
+              <a:t>5. </a:t>
+            </a:r>
+            <a:r>
+              <a:rPr lang="en-US" dirty="0" err="1"/>
+              <a:t>รู้จักกับ</a:t>
+            </a:r>
+            <a:r>
+              <a:rPr lang="en-US" dirty="0"/>
+              <a:t> Props </a:t>
+            </a:r>
+            <a:r>
+              <a:rPr lang="en-US" dirty="0" err="1"/>
+              <a:t>และ</a:t>
+            </a:r>
+            <a:r>
+              <a:rPr lang="en-US" dirty="0"/>
+              <a:t> State</a:t>
+            </a:r>
+          </a:p>
+          <a:p>
+            <a:r>
+              <a:rPr lang="en-US" dirty="0"/>
+              <a:t>- babeljs.io</a:t>
+            </a:r>
+          </a:p>
+          <a:p>
+            <a:r>
+              <a:rPr lang="en-US" dirty="0"/>
+              <a:t>------------------------------------------------------</a:t>
+            </a:r>
+          </a:p>
+          <a:p>
+            <a:r>
+              <a:rPr lang="en-US" dirty="0"/>
+              <a:t>#GitHub</a:t>
+            </a:r>
+          </a:p>
+          <a:p>
+            <a:r>
+              <a:rPr lang="en-US" dirty="0"/>
+              <a:t>&gt;</a:t>
+            </a:r>
+            <a:r>
+              <a:rPr lang="en-US" dirty="0" err="1"/>
+              <a:t>npx</a:t>
+            </a:r>
+            <a:r>
+              <a:rPr lang="en-US" dirty="0"/>
+              <a:t> create-react-app </a:t>
+            </a:r>
+            <a:r>
+              <a:rPr lang="en-US" dirty="0" err="1"/>
+              <a:t>myapp</a:t>
+            </a:r>
+            <a:endParaRPr lang="en-US" dirty="0"/>
           </a:p>
         </p:txBody>
       </p:sp>
@@ -3401,6 +3657,738 @@
 </file>
 
 <file path=ppt/slides/slide3.xml><?xml version="1.0" encoding="utf-8"?>
+<p:sld xmlns:a="http://schemas.openxmlformats.org/drawingml/2006/main" xmlns:r="http://schemas.openxmlformats.org/officeDocument/2006/relationships" xmlns:p="http://schemas.openxmlformats.org/presentationml/2006/main">
+  <p:cSld>
+    <p:spTree>
+      <p:nvGrpSpPr>
+        <p:cNvPr id="1" name=""/>
+        <p:cNvGrpSpPr/>
+        <p:nvPr/>
+      </p:nvGrpSpPr>
+      <p:grpSpPr>
+        <a:xfrm>
+          <a:off x="0" y="0"/>
+          <a:ext cx="0" cy="0"/>
+          <a:chOff x="0" y="0"/>
+          <a:chExt cx="0" cy="0"/>
+        </a:xfrm>
+      </p:grpSpPr>
+      <p:sp>
+        <p:nvSpPr>
+          <p:cNvPr id="4" name="สี่เหลี่ยมผืนผ้า 3"/>
+          <p:cNvSpPr/>
+          <p:nvPr/>
+        </p:nvSpPr>
+        <p:spPr>
+          <a:xfrm>
+            <a:off x="591239" y="390138"/>
+            <a:ext cx="6096000" cy="6740307"/>
+          </a:xfrm>
+          <a:prstGeom prst="rect">
+            <a:avLst/>
+          </a:prstGeom>
+        </p:spPr>
+        <p:txBody>
+          <a:bodyPr>
+            <a:spAutoFit/>
+          </a:bodyPr>
+          <a:lstStyle/>
+          <a:p>
+            <a:r>
+              <a:rPr lang="en-US" dirty="0"/>
+              <a:t>1. Install </a:t>
+            </a:r>
+          </a:p>
+          <a:p>
+            <a:r>
+              <a:rPr lang="en-US" dirty="0"/>
+              <a:t>	- node -v</a:t>
+            </a:r>
+          </a:p>
+          <a:p>
+            <a:r>
+              <a:rPr lang="en-US" dirty="0"/>
+              <a:t>	- npm -v</a:t>
+            </a:r>
+          </a:p>
+          <a:p>
+            <a:r>
+              <a:rPr lang="en-US" dirty="0"/>
+              <a:t>	- npm install -g create-react-app (</a:t>
+            </a:r>
+            <a:r>
+              <a:rPr lang="en-US" dirty="0" err="1"/>
+              <a:t>แบบ</a:t>
+            </a:r>
+            <a:r>
+              <a:rPr lang="en-US" dirty="0"/>
+              <a:t> Global)</a:t>
+            </a:r>
+          </a:p>
+          <a:p>
+            <a:r>
+              <a:rPr lang="en-US" dirty="0"/>
+              <a:t>	- create-react-app --version</a:t>
+            </a:r>
+          </a:p>
+          <a:p>
+            <a:r>
+              <a:rPr lang="en-US" dirty="0"/>
+              <a:t>	- cd </a:t>
+            </a:r>
+            <a:r>
+              <a:rPr lang="en-US" dirty="0" err="1"/>
+              <a:t>myapp</a:t>
+            </a:r>
+            <a:endParaRPr lang="en-US" dirty="0"/>
+          </a:p>
+          <a:p>
+            <a:r>
+              <a:rPr lang="en-US" dirty="0"/>
+              <a:t>	- </a:t>
+            </a:r>
+            <a:r>
+              <a:rPr lang="en-US" dirty="0" err="1"/>
+              <a:t>npx</a:t>
+            </a:r>
+            <a:r>
+              <a:rPr lang="en-US" dirty="0"/>
+              <a:t> create-react-app </a:t>
+            </a:r>
+            <a:r>
+              <a:rPr lang="en-US" dirty="0" err="1"/>
+              <a:t>myapp</a:t>
+            </a:r>
+            <a:endParaRPr lang="en-US" dirty="0"/>
+          </a:p>
+          <a:p>
+            <a:r>
+              <a:rPr lang="en-US" dirty="0"/>
+              <a:t>	- npm </a:t>
+            </a:r>
+            <a:r>
+              <a:rPr lang="en-US" dirty="0" smtClean="0"/>
+              <a:t>start</a:t>
+            </a:r>
+          </a:p>
+          <a:p>
+            <a:r>
+              <a:rPr lang="en-US" dirty="0"/>
+              <a:t>	</a:t>
+            </a:r>
+            <a:r>
+              <a:rPr lang="en-US" dirty="0" smtClean="0"/>
+              <a:t>- npm run build</a:t>
+            </a:r>
+            <a:endParaRPr lang="en-US" dirty="0"/>
+          </a:p>
+          <a:p>
+            <a:r>
+              <a:rPr lang="en-US" dirty="0"/>
+              <a:t>	- *To create a production build, use $npm run build</a:t>
+            </a:r>
+          </a:p>
+          <a:p>
+            <a:r>
+              <a:rPr lang="en-US" dirty="0"/>
+              <a:t>	- Install IDE (Visual Studio Code)</a:t>
+            </a:r>
+          </a:p>
+          <a:p>
+            <a:endParaRPr lang="en-US" dirty="0"/>
+          </a:p>
+          <a:p>
+            <a:r>
+              <a:rPr lang="en-US" dirty="0"/>
+              <a:t>2. </a:t>
+            </a:r>
+            <a:r>
+              <a:rPr lang="en-US" dirty="0" err="1" smtClean="0"/>
+              <a:t>Chatserver</a:t>
+            </a:r>
+            <a:endParaRPr lang="en-US" dirty="0" smtClean="0"/>
+          </a:p>
+          <a:p>
+            <a:r>
+              <a:rPr lang="en-US" dirty="0" smtClean="0"/>
+              <a:t>	- </a:t>
+            </a:r>
+            <a:r>
+              <a:rPr lang="th-TH" dirty="0" smtClean="0"/>
+              <a:t>เก็บไฟล์ของ </a:t>
+            </a:r>
+            <a:r>
+              <a:rPr lang="en-US" dirty="0" smtClean="0"/>
+              <a:t>Socket </a:t>
+            </a:r>
+            <a:r>
+              <a:rPr lang="th-TH" dirty="0" smtClean="0"/>
+              <a:t>สำหรับ </a:t>
+            </a:r>
+            <a:r>
+              <a:rPr lang="en-US" dirty="0" smtClean="0"/>
+              <a:t>Broadcast </a:t>
+            </a:r>
+            <a:r>
+              <a:rPr lang="th-TH" dirty="0" smtClean="0"/>
+              <a:t>ข้อความไปหา </a:t>
+            </a:r>
+            <a:r>
+              <a:rPr lang="en-US" dirty="0" smtClean="0"/>
+              <a:t>Clients</a:t>
+            </a:r>
+          </a:p>
+          <a:p>
+            <a:r>
+              <a:rPr lang="en-US" dirty="0"/>
+              <a:t>	</a:t>
+            </a:r>
+            <a:r>
+              <a:rPr lang="en-US" dirty="0" smtClean="0"/>
+              <a:t>- </a:t>
+            </a:r>
+            <a:r>
+              <a:rPr lang="th-TH" dirty="0" smtClean="0"/>
+              <a:t>เปิดพอร์ท </a:t>
+            </a:r>
+            <a:r>
+              <a:rPr lang="en-US" dirty="0" smtClean="0"/>
+              <a:t>http 3001 </a:t>
+            </a:r>
+            <a:r>
+              <a:rPr lang="th-TH" dirty="0" smtClean="0"/>
+              <a:t>ที่</a:t>
+            </a:r>
+            <a:r>
+              <a:rPr lang="en-US" dirty="0" smtClean="0"/>
+              <a:t> Firewall</a:t>
+            </a:r>
+          </a:p>
+          <a:p>
+            <a:r>
+              <a:rPr lang="en-US" dirty="0" smtClean="0"/>
+              <a:t>3. </a:t>
+            </a:r>
+            <a:r>
+              <a:rPr lang="en-US" dirty="0" err="1" smtClean="0"/>
+              <a:t>Chatapps</a:t>
+            </a:r>
+            <a:endParaRPr lang="en-US" dirty="0" smtClean="0"/>
+          </a:p>
+          <a:p>
+            <a:r>
+              <a:rPr lang="en-US" dirty="0"/>
+              <a:t>	</a:t>
+            </a:r>
+            <a:r>
+              <a:rPr lang="en-US" dirty="0" smtClean="0"/>
+              <a:t>- npm install </a:t>
+            </a:r>
+            <a:r>
+              <a:rPr lang="en-US" dirty="0" err="1" smtClean="0"/>
+              <a:t>axios</a:t>
+            </a:r>
+            <a:endParaRPr lang="en-US" dirty="0" smtClean="0"/>
+          </a:p>
+          <a:p>
+            <a:r>
+              <a:rPr lang="en-US" dirty="0"/>
+              <a:t>	</a:t>
+            </a:r>
+            <a:r>
+              <a:rPr lang="en-US" dirty="0" smtClean="0"/>
+              <a:t>- npm install react-router-</a:t>
+            </a:r>
+            <a:r>
+              <a:rPr lang="en-US" dirty="0" err="1" smtClean="0"/>
+              <a:t>dom</a:t>
+            </a:r>
+            <a:endParaRPr lang="en-US" dirty="0" smtClean="0"/>
+          </a:p>
+          <a:p>
+            <a:r>
+              <a:rPr lang="en-US" dirty="0"/>
+              <a:t>	</a:t>
+            </a:r>
+            <a:r>
+              <a:rPr lang="en-US" dirty="0" smtClean="0"/>
+              <a:t>- npm install socket.io-client</a:t>
+            </a:r>
+          </a:p>
+          <a:p>
+            <a:r>
+              <a:rPr lang="en-US" dirty="0"/>
+              <a:t>	</a:t>
+            </a:r>
+            <a:r>
+              <a:rPr lang="en-US" dirty="0" smtClean="0"/>
+              <a:t>- </a:t>
+            </a:r>
+            <a:r>
+              <a:rPr lang="th-TH" dirty="0" smtClean="0"/>
+              <a:t>เก็บไฟล์ </a:t>
+            </a:r>
+            <a:r>
+              <a:rPr lang="en-US" dirty="0" smtClean="0"/>
+              <a:t>react </a:t>
+            </a:r>
+            <a:r>
+              <a:rPr lang="en-US" dirty="0" err="1" smtClean="0"/>
+              <a:t>js</a:t>
+            </a:r>
+            <a:r>
+              <a:rPr lang="en-US" dirty="0" smtClean="0"/>
+              <a:t> </a:t>
+            </a:r>
+            <a:r>
+              <a:rPr lang="th-TH" dirty="0" smtClean="0"/>
+              <a:t>ของ </a:t>
+            </a:r>
+            <a:r>
+              <a:rPr lang="en-US" dirty="0" smtClean="0"/>
+              <a:t>clients </a:t>
+            </a:r>
+            <a:r>
+              <a:rPr lang="th-TH" dirty="0" smtClean="0"/>
+              <a:t>ที่จะเอาไว้ติดต่อ </a:t>
+            </a:r>
+            <a:r>
+              <a:rPr lang="en-US" dirty="0" smtClean="0"/>
+              <a:t>emit </a:t>
+            </a:r>
+            <a:r>
+              <a:rPr lang="th-TH" dirty="0" smtClean="0"/>
+              <a:t>ข้อความไปหา </a:t>
+            </a:r>
+            <a:r>
+              <a:rPr lang="en-US" dirty="0" smtClean="0"/>
+              <a:t>Server </a:t>
+            </a:r>
+            <a:r>
+              <a:rPr lang="th-TH" dirty="0" smtClean="0"/>
+              <a:t>ผ่าน </a:t>
+            </a:r>
+            <a:r>
+              <a:rPr lang="en-US" dirty="0" smtClean="0"/>
+              <a:t>http port 8000</a:t>
+            </a:r>
+          </a:p>
+          <a:p>
+            <a:r>
+              <a:rPr lang="en-US" dirty="0"/>
+              <a:t>	</a:t>
+            </a:r>
+            <a:r>
+              <a:rPr lang="en-US" dirty="0" smtClean="0"/>
+              <a:t>- </a:t>
+            </a:r>
+            <a:r>
+              <a:rPr lang="th-TH" dirty="0" smtClean="0"/>
+              <a:t>เปิด </a:t>
+            </a:r>
+            <a:r>
+              <a:rPr lang="en-US" dirty="0" smtClean="0"/>
+              <a:t>port 8000 </a:t>
+            </a:r>
+            <a:r>
+              <a:rPr lang="th-TH" dirty="0" smtClean="0"/>
+              <a:t>ที่ </a:t>
+            </a:r>
+            <a:r>
+              <a:rPr lang="en-US" dirty="0" smtClean="0"/>
+              <a:t>Firewall </a:t>
+            </a:r>
+            <a:r>
+              <a:rPr lang="th-TH" dirty="0" smtClean="0"/>
+              <a:t>ด้วย</a:t>
+            </a:r>
+            <a:endParaRPr lang="en-US" dirty="0" smtClean="0"/>
+          </a:p>
+          <a:p>
+            <a:r>
+              <a:rPr lang="en-US" dirty="0"/>
+              <a:t>	</a:t>
+            </a:r>
+            <a:r>
+              <a:rPr lang="en-US" dirty="0" smtClean="0"/>
+              <a:t>- * </a:t>
+            </a:r>
+            <a:r>
+              <a:rPr lang="th-TH" dirty="0" smtClean="0"/>
+              <a:t>แก้ไข </a:t>
+            </a:r>
+            <a:r>
+              <a:rPr lang="en-US" dirty="0" smtClean="0"/>
+              <a:t>port</a:t>
+            </a:r>
+            <a:r>
+              <a:rPr lang="th-TH" dirty="0" smtClean="0"/>
+              <a:t> </a:t>
+            </a:r>
+            <a:r>
+              <a:rPr lang="en-US" dirty="0" smtClean="0"/>
+              <a:t>on start </a:t>
+            </a:r>
+            <a:r>
+              <a:rPr lang="th-TH" dirty="0" smtClean="0"/>
+              <a:t>ใน </a:t>
+            </a:r>
+            <a:r>
+              <a:rPr lang="en-US" dirty="0" smtClean="0"/>
+              <a:t>file </a:t>
+            </a:r>
+            <a:r>
+              <a:rPr lang="en-US" dirty="0" err="1" smtClean="0"/>
+              <a:t>package.json</a:t>
+            </a:r>
+            <a:r>
+              <a:rPr lang="en-US" dirty="0" smtClean="0"/>
+              <a:t> </a:t>
+            </a:r>
+          </a:p>
+          <a:p>
+            <a:r>
+              <a:rPr lang="en-US" dirty="0"/>
+              <a:t>	"start": "PORT=8000 react-scripts start</a:t>
+            </a:r>
+            <a:r>
+              <a:rPr lang="en-US" dirty="0" smtClean="0"/>
+              <a:t>",</a:t>
+            </a:r>
+            <a:endParaRPr lang="en-US" dirty="0"/>
+          </a:p>
+        </p:txBody>
+      </p:sp>
+      <p:pic>
+        <p:nvPicPr>
+          <p:cNvPr id="5" name="รูปภาพ 4"/>
+          <p:cNvPicPr>
+            <a:picLocks noChangeAspect="1"/>
+          </p:cNvPicPr>
+          <p:nvPr/>
+        </p:nvPicPr>
+        <p:blipFill>
+          <a:blip r:embed="rId2"/>
+          <a:stretch>
+            <a:fillRect/>
+          </a:stretch>
+        </p:blipFill>
+        <p:spPr>
+          <a:xfrm>
+            <a:off x="2431801" y="3265541"/>
+            <a:ext cx="1533525" cy="276225"/>
+          </a:xfrm>
+          <a:prstGeom prst="rect">
+            <a:avLst/>
+          </a:prstGeom>
+        </p:spPr>
+      </p:pic>
+      <p:pic>
+        <p:nvPicPr>
+          <p:cNvPr id="6" name="รูปภาพ 5"/>
+          <p:cNvPicPr>
+            <a:picLocks noChangeAspect="1"/>
+          </p:cNvPicPr>
+          <p:nvPr/>
+        </p:nvPicPr>
+        <p:blipFill>
+          <a:blip r:embed="rId3"/>
+          <a:stretch>
+            <a:fillRect/>
+          </a:stretch>
+        </p:blipFill>
+        <p:spPr>
+          <a:xfrm>
+            <a:off x="7306593" y="852844"/>
+            <a:ext cx="3219450" cy="2076450"/>
+          </a:xfrm>
+          <a:prstGeom prst="rect">
+            <a:avLst/>
+          </a:prstGeom>
+        </p:spPr>
+      </p:pic>
+      <p:sp>
+        <p:nvSpPr>
+          <p:cNvPr id="7" name="กล่องข้อความ 6"/>
+          <p:cNvSpPr txBox="1"/>
+          <p:nvPr/>
+        </p:nvSpPr>
+        <p:spPr>
+          <a:xfrm>
+            <a:off x="6334700" y="2942375"/>
+            <a:ext cx="5857300" cy="1754326"/>
+          </a:xfrm>
+          <a:prstGeom prst="rect">
+            <a:avLst/>
+          </a:prstGeom>
+          <a:noFill/>
+          <a:ln>
+            <a:solidFill>
+              <a:srgbClr val="00B050"/>
+            </a:solidFill>
+          </a:ln>
+        </p:spPr>
+        <p:txBody>
+          <a:bodyPr wrap="square" rtlCol="0">
+            <a:spAutoFit/>
+          </a:bodyPr>
+          <a:lstStyle/>
+          <a:p>
+            <a:r>
+              <a:rPr lang="en-US" dirty="0" smtClean="0"/>
+              <a:t>Zip </a:t>
+            </a:r>
+            <a:r>
+              <a:rPr lang="th-TH" dirty="0" smtClean="0"/>
+              <a:t>งานจาก </a:t>
+            </a:r>
+            <a:r>
+              <a:rPr lang="en-US" dirty="0" smtClean="0"/>
+              <a:t>React </a:t>
+            </a:r>
+            <a:r>
+              <a:rPr lang="th-TH" dirty="0" smtClean="0"/>
+              <a:t>เพื่ออัพโหลดขึ้น </a:t>
+            </a:r>
+            <a:r>
+              <a:rPr lang="en-US" dirty="0" smtClean="0"/>
+              <a:t>GCP </a:t>
+            </a:r>
+            <a:r>
+              <a:rPr lang="th-TH" dirty="0" smtClean="0"/>
+              <a:t>แล้วตั้งให้ </a:t>
+            </a:r>
+            <a:r>
+              <a:rPr lang="en-US" dirty="0" smtClean="0"/>
+              <a:t>Forever </a:t>
+            </a:r>
+            <a:r>
+              <a:rPr lang="th-TH" dirty="0" smtClean="0"/>
+              <a:t>ทำงานตลอดเวลา</a:t>
+            </a:r>
+            <a:endParaRPr lang="en-US" dirty="0" smtClean="0"/>
+          </a:p>
+          <a:p>
+            <a:endParaRPr lang="en-US" dirty="0"/>
+          </a:p>
+          <a:p>
+            <a:r>
+              <a:rPr lang="en-US" dirty="0" smtClean="0">
+                <a:solidFill>
+                  <a:srgbClr val="FF0000"/>
+                </a:solidFill>
+              </a:rPr>
+              <a:t>sudo forever start --</a:t>
+            </a:r>
+            <a:r>
+              <a:rPr lang="en-US" dirty="0" err="1" smtClean="0">
+                <a:solidFill>
+                  <a:srgbClr val="FF0000"/>
+                </a:solidFill>
+              </a:rPr>
+              <a:t>sourceDir</a:t>
+            </a:r>
+            <a:r>
+              <a:rPr lang="en-US" dirty="0" smtClean="0">
+                <a:solidFill>
+                  <a:srgbClr val="FF0000"/>
+                </a:solidFill>
+              </a:rPr>
+              <a:t> </a:t>
+            </a:r>
+            <a:r>
+              <a:rPr lang="en-US" dirty="0" err="1" smtClean="0">
+                <a:solidFill>
+                  <a:srgbClr val="FF0000"/>
+                </a:solidFill>
+              </a:rPr>
+              <a:t>chatapps</a:t>
+            </a:r>
+            <a:r>
+              <a:rPr lang="en-US" dirty="0" smtClean="0">
+                <a:solidFill>
+                  <a:srgbClr val="FF0000"/>
+                </a:solidFill>
+              </a:rPr>
+              <a:t>/</a:t>
+            </a:r>
+            <a:r>
+              <a:rPr lang="en-US" dirty="0" err="1" smtClean="0">
+                <a:solidFill>
+                  <a:srgbClr val="FF0000"/>
+                </a:solidFill>
+              </a:rPr>
+              <a:t>chatapp</a:t>
+            </a:r>
+            <a:r>
+              <a:rPr lang="en-US" dirty="0" smtClean="0">
+                <a:solidFill>
+                  <a:srgbClr val="FF0000"/>
+                </a:solidFill>
+              </a:rPr>
+              <a:t>/  -c "npm start" /</a:t>
+            </a:r>
+          </a:p>
+          <a:p>
+            <a:r>
+              <a:rPr lang="en-US" dirty="0">
+                <a:solidFill>
+                  <a:srgbClr val="FF0000"/>
+                </a:solidFill>
+              </a:rPr>
+              <a:t>sudo forever </a:t>
+            </a:r>
+            <a:r>
+              <a:rPr lang="en-US" dirty="0" smtClean="0">
+                <a:solidFill>
+                  <a:srgbClr val="FF0000"/>
+                </a:solidFill>
+              </a:rPr>
+              <a:t>stop </a:t>
+            </a:r>
+            <a:r>
+              <a:rPr lang="en-US" dirty="0">
+                <a:solidFill>
+                  <a:srgbClr val="FF0000"/>
+                </a:solidFill>
+              </a:rPr>
+              <a:t>--</a:t>
+            </a:r>
+            <a:r>
+              <a:rPr lang="en-US" dirty="0" err="1">
+                <a:solidFill>
+                  <a:srgbClr val="FF0000"/>
+                </a:solidFill>
+              </a:rPr>
+              <a:t>sourceDir</a:t>
+            </a:r>
+            <a:r>
+              <a:rPr lang="en-US" dirty="0">
+                <a:solidFill>
+                  <a:srgbClr val="FF0000"/>
+                </a:solidFill>
+              </a:rPr>
+              <a:t> </a:t>
+            </a:r>
+            <a:r>
+              <a:rPr lang="en-US" dirty="0" err="1">
+                <a:solidFill>
+                  <a:srgbClr val="FF0000"/>
+                </a:solidFill>
+              </a:rPr>
+              <a:t>chatapps</a:t>
+            </a:r>
+            <a:r>
+              <a:rPr lang="en-US" dirty="0">
+                <a:solidFill>
+                  <a:srgbClr val="FF0000"/>
+                </a:solidFill>
+              </a:rPr>
+              <a:t>/</a:t>
+            </a:r>
+            <a:r>
+              <a:rPr lang="en-US" dirty="0" err="1">
+                <a:solidFill>
+                  <a:srgbClr val="FF0000"/>
+                </a:solidFill>
+              </a:rPr>
+              <a:t>chatapp</a:t>
+            </a:r>
+            <a:r>
+              <a:rPr lang="en-US" dirty="0" smtClean="0">
+                <a:solidFill>
+                  <a:srgbClr val="FF0000"/>
+                </a:solidFill>
+              </a:rPr>
+              <a:t>/</a:t>
+            </a:r>
+            <a:endParaRPr lang="en-US" dirty="0">
+              <a:solidFill>
+                <a:srgbClr val="FF0000"/>
+              </a:solidFill>
+            </a:endParaRPr>
+          </a:p>
+          <a:p>
+            <a:endParaRPr lang="en-US" dirty="0">
+              <a:solidFill>
+                <a:srgbClr val="FF0000"/>
+              </a:solidFill>
+            </a:endParaRPr>
+          </a:p>
+        </p:txBody>
+      </p:sp>
+      <p:sp>
+        <p:nvSpPr>
+          <p:cNvPr id="2" name="สี่เหลี่ยมผืนผ้า 1"/>
+          <p:cNvSpPr/>
+          <p:nvPr/>
+        </p:nvSpPr>
+        <p:spPr>
+          <a:xfrm>
+            <a:off x="6391620" y="5019866"/>
+            <a:ext cx="6096000" cy="923330"/>
+          </a:xfrm>
+          <a:prstGeom prst="rect">
+            <a:avLst/>
+          </a:prstGeom>
+        </p:spPr>
+        <p:txBody>
+          <a:bodyPr>
+            <a:spAutoFit/>
+          </a:bodyPr>
+          <a:lstStyle/>
+          <a:p>
+            <a:r>
+              <a:rPr lang="en-US" dirty="0" smtClean="0">
+                <a:solidFill>
+                  <a:srgbClr val="FF0000"/>
+                </a:solidFill>
+              </a:rPr>
+              <a:t>Build Projects Before </a:t>
+            </a:r>
+            <a:r>
+              <a:rPr lang="en-US" smtClean="0">
+                <a:solidFill>
+                  <a:srgbClr val="FF0000"/>
+                </a:solidFill>
+              </a:rPr>
+              <a:t>Run forever</a:t>
+            </a:r>
+            <a:endParaRPr lang="en-US" dirty="0" smtClean="0">
+              <a:hlinkClick r:id=""/>
+            </a:endParaRPr>
+          </a:p>
+          <a:p>
+            <a:r>
+              <a:rPr lang="en-US" dirty="0" smtClean="0">
+                <a:hlinkClick r:id=""/>
+              </a:rPr>
+              <a:t>https</a:t>
+            </a:r>
+            <a:r>
+              <a:rPr lang="en-US" dirty="0">
+                <a:hlinkClick r:id="rId4"/>
+              </a:rPr>
+              <a:t>://reactjs.org/docs/optimizing-performance.html#use-the-production-build</a:t>
+            </a:r>
+            <a:endParaRPr lang="en-US" dirty="0"/>
+          </a:p>
+        </p:txBody>
+      </p:sp>
+    </p:spTree>
+    <p:extLst>
+      <p:ext uri="{BB962C8B-B14F-4D97-AF65-F5344CB8AC3E}">
+        <p14:creationId xmlns:p14="http://schemas.microsoft.com/office/powerpoint/2010/main" val="613329896"/>
+      </p:ext>
+    </p:extLst>
+  </p:cSld>
+  <p:clrMapOvr>
+    <a:masterClrMapping/>
+  </p:clrMapOvr>
+</p:sld>
+</file>
+
+<file path=ppt/slides/slide4.xml><?xml version="1.0" encoding="utf-8"?>
 <p:sld xmlns:a="http://schemas.openxmlformats.org/drawingml/2006/main" xmlns:r="http://schemas.openxmlformats.org/officeDocument/2006/relationships" xmlns:p="http://schemas.openxmlformats.org/presentationml/2006/main">
   <p:cSld>
     <p:spTree>
@@ -6225,7 +7213,7 @@
         </p:blipFill>
         <p:spPr>
           <a:xfrm>
-            <a:off x="7674547" y="538603"/>
+            <a:off x="8436874" y="357088"/>
             <a:ext cx="3342857" cy="6133333"/>
           </a:xfrm>
           <a:prstGeom prst="rect">
@@ -6233,6 +7221,302 @@
           </a:prstGeom>
         </p:spPr>
       </p:pic>
+      <p:sp>
+        <p:nvSpPr>
+          <p:cNvPr id="6" name="กล่องข้อความ 5"/>
+          <p:cNvSpPr txBox="1"/>
+          <p:nvPr/>
+        </p:nvSpPr>
+        <p:spPr>
+          <a:xfrm>
+            <a:off x="3421655" y="3008256"/>
+            <a:ext cx="4768729" cy="1815882"/>
+          </a:xfrm>
+          <a:prstGeom prst="rect">
+            <a:avLst/>
+          </a:prstGeom>
+          <a:noFill/>
+          <a:ln>
+            <a:solidFill>
+              <a:srgbClr val="FF0000"/>
+            </a:solidFill>
+          </a:ln>
+        </p:spPr>
+        <p:txBody>
+          <a:bodyPr wrap="square" rtlCol="0">
+            <a:spAutoFit/>
+          </a:bodyPr>
+          <a:lstStyle/>
+          <a:p>
+            <a:r>
+              <a:rPr lang="en-US" sz="1400" dirty="0" smtClean="0">
+                <a:solidFill>
+                  <a:srgbClr val="FF0000"/>
+                </a:solidFill>
+              </a:rPr>
+              <a:t>***** </a:t>
+            </a:r>
+            <a:r>
+              <a:rPr lang="th-TH" sz="1400" dirty="0" smtClean="0">
+                <a:solidFill>
+                  <a:srgbClr val="FF0000"/>
+                </a:solidFill>
+              </a:rPr>
+              <a:t>สำคัญมาก ถ้ามีการแก้ไข </a:t>
+            </a:r>
+            <a:r>
+              <a:rPr lang="en-US" sz="1400" dirty="0" err="1" smtClean="0">
+                <a:solidFill>
+                  <a:srgbClr val="FF0000"/>
+                </a:solidFill>
+              </a:rPr>
+              <a:t>src</a:t>
+            </a:r>
+            <a:r>
+              <a:rPr lang="en-US" sz="1400" dirty="0">
+                <a:solidFill>
+                  <a:srgbClr val="FF0000"/>
+                </a:solidFill>
+              </a:rPr>
+              <a:t> </a:t>
+            </a:r>
+            <a:r>
+              <a:rPr lang="th-TH" sz="1400" dirty="0" smtClean="0">
+                <a:solidFill>
+                  <a:srgbClr val="FF0000"/>
+                </a:solidFill>
+              </a:rPr>
+              <a:t>ต้อง </a:t>
+            </a:r>
+            <a:r>
+              <a:rPr lang="en-US" sz="1400" dirty="0" smtClean="0">
+                <a:solidFill>
+                  <a:srgbClr val="FF0000"/>
+                </a:solidFill>
+              </a:rPr>
+              <a:t>stop </a:t>
+            </a:r>
+            <a:r>
+              <a:rPr lang="en-US" sz="1400" dirty="0" err="1" smtClean="0">
+                <a:solidFill>
+                  <a:srgbClr val="FF0000"/>
+                </a:solidFill>
+              </a:rPr>
+              <a:t>servervice</a:t>
+            </a:r>
+            <a:r>
+              <a:rPr lang="en-US" sz="1400" dirty="0" smtClean="0">
+                <a:solidFill>
+                  <a:srgbClr val="FF0000"/>
+                </a:solidFill>
+              </a:rPr>
+              <a:t> </a:t>
+            </a:r>
+            <a:r>
+              <a:rPr lang="th-TH" sz="1400" dirty="0" smtClean="0">
+                <a:solidFill>
+                  <a:srgbClr val="FF0000"/>
+                </a:solidFill>
+              </a:rPr>
+              <a:t>ก่อนเสมอ</a:t>
+            </a:r>
+            <a:endParaRPr lang="en-US" sz="1400" dirty="0" smtClean="0">
+              <a:solidFill>
+                <a:srgbClr val="FF0000"/>
+              </a:solidFill>
+            </a:endParaRPr>
+          </a:p>
+          <a:p>
+            <a:endParaRPr lang="en-US" sz="1400" dirty="0" smtClean="0">
+              <a:solidFill>
+                <a:srgbClr val="FF0000"/>
+              </a:solidFill>
+            </a:endParaRPr>
+          </a:p>
+          <a:p>
+            <a:r>
+              <a:rPr lang="en-US" sz="1400" dirty="0" smtClean="0"/>
+              <a:t>Zip </a:t>
+            </a:r>
+            <a:r>
+              <a:rPr lang="th-TH" sz="1400" dirty="0" smtClean="0"/>
+              <a:t>งานจาก </a:t>
+            </a:r>
+            <a:r>
+              <a:rPr lang="en-US" sz="1400" dirty="0" smtClean="0"/>
+              <a:t>React </a:t>
+            </a:r>
+            <a:r>
+              <a:rPr lang="th-TH" sz="1400" dirty="0" smtClean="0"/>
+              <a:t>เพื่ออัพโหลดขึ้น </a:t>
+            </a:r>
+            <a:r>
+              <a:rPr lang="en-US" sz="1400" dirty="0" smtClean="0"/>
+              <a:t>GCP </a:t>
+            </a:r>
+            <a:r>
+              <a:rPr lang="th-TH" sz="1400" dirty="0" smtClean="0"/>
+              <a:t>แล้วตั้งให้ </a:t>
+            </a:r>
+            <a:r>
+              <a:rPr lang="en-US" sz="1400" dirty="0" smtClean="0"/>
+              <a:t>Forever </a:t>
+            </a:r>
+            <a:r>
+              <a:rPr lang="th-TH" sz="1400" dirty="0" smtClean="0"/>
+              <a:t>ทำงานตลอดเวลา</a:t>
+            </a:r>
+            <a:endParaRPr lang="en-US" sz="1400" dirty="0" smtClean="0"/>
+          </a:p>
+          <a:p>
+            <a:endParaRPr lang="en-US" sz="1400" dirty="0"/>
+          </a:p>
+          <a:p>
+            <a:r>
+              <a:rPr lang="en-US" sz="1400" dirty="0" smtClean="0">
+                <a:solidFill>
+                  <a:srgbClr val="FF0000"/>
+                </a:solidFill>
+              </a:rPr>
+              <a:t>sudo forever start --</a:t>
+            </a:r>
+            <a:r>
+              <a:rPr lang="en-US" sz="1400" dirty="0" err="1" smtClean="0">
+                <a:solidFill>
+                  <a:srgbClr val="FF0000"/>
+                </a:solidFill>
+              </a:rPr>
+              <a:t>sourceDir</a:t>
+            </a:r>
+            <a:r>
+              <a:rPr lang="en-US" sz="1400" dirty="0" smtClean="0">
+                <a:solidFill>
+                  <a:srgbClr val="FF0000"/>
+                </a:solidFill>
+              </a:rPr>
+              <a:t> </a:t>
+            </a:r>
+            <a:r>
+              <a:rPr lang="en-US" sz="1400" dirty="0" err="1" smtClean="0">
+                <a:solidFill>
+                  <a:srgbClr val="FF0000"/>
+                </a:solidFill>
+              </a:rPr>
+              <a:t>chatapps</a:t>
+            </a:r>
+            <a:r>
+              <a:rPr lang="en-US" sz="1400" dirty="0" smtClean="0">
+                <a:solidFill>
+                  <a:srgbClr val="FF0000"/>
+                </a:solidFill>
+              </a:rPr>
+              <a:t>/</a:t>
+            </a:r>
+            <a:r>
+              <a:rPr lang="en-US" sz="1400" dirty="0" err="1" smtClean="0">
+                <a:solidFill>
+                  <a:srgbClr val="FF0000"/>
+                </a:solidFill>
+              </a:rPr>
+              <a:t>chatapp</a:t>
+            </a:r>
+            <a:r>
+              <a:rPr lang="en-US" sz="1400" dirty="0" smtClean="0">
+                <a:solidFill>
+                  <a:srgbClr val="FF0000"/>
+                </a:solidFill>
+              </a:rPr>
+              <a:t>/  -c "npm start" /</a:t>
+            </a:r>
+          </a:p>
+          <a:p>
+            <a:r>
+              <a:rPr lang="en-US" sz="1400" dirty="0">
+                <a:solidFill>
+                  <a:srgbClr val="FF0000"/>
+                </a:solidFill>
+              </a:rPr>
+              <a:t>sudo forever </a:t>
+            </a:r>
+            <a:r>
+              <a:rPr lang="en-US" sz="1400" dirty="0" smtClean="0">
+                <a:solidFill>
+                  <a:srgbClr val="FF0000"/>
+                </a:solidFill>
+              </a:rPr>
+              <a:t>stop </a:t>
+            </a:r>
+            <a:r>
+              <a:rPr lang="en-US" sz="1400" dirty="0">
+                <a:solidFill>
+                  <a:srgbClr val="FF0000"/>
+                </a:solidFill>
+              </a:rPr>
+              <a:t>--</a:t>
+            </a:r>
+            <a:r>
+              <a:rPr lang="en-US" sz="1400" dirty="0" err="1">
+                <a:solidFill>
+                  <a:srgbClr val="FF0000"/>
+                </a:solidFill>
+              </a:rPr>
+              <a:t>sourceDir</a:t>
+            </a:r>
+            <a:r>
+              <a:rPr lang="en-US" sz="1400" dirty="0">
+                <a:solidFill>
+                  <a:srgbClr val="FF0000"/>
+                </a:solidFill>
+              </a:rPr>
+              <a:t> </a:t>
+            </a:r>
+            <a:r>
+              <a:rPr lang="en-US" sz="1400" dirty="0" err="1">
+                <a:solidFill>
+                  <a:srgbClr val="FF0000"/>
+                </a:solidFill>
+              </a:rPr>
+              <a:t>chatapps</a:t>
+            </a:r>
+            <a:r>
+              <a:rPr lang="en-US" sz="1400" dirty="0">
+                <a:solidFill>
+                  <a:srgbClr val="FF0000"/>
+                </a:solidFill>
+              </a:rPr>
+              <a:t>/</a:t>
+            </a:r>
+            <a:r>
+              <a:rPr lang="en-US" sz="1400" dirty="0" err="1">
+                <a:solidFill>
+                  <a:srgbClr val="FF0000"/>
+                </a:solidFill>
+              </a:rPr>
+              <a:t>chatapp</a:t>
+            </a:r>
+            <a:r>
+              <a:rPr lang="en-US" sz="1400" dirty="0" smtClean="0">
+                <a:solidFill>
+                  <a:srgbClr val="FF0000"/>
+                </a:solidFill>
+              </a:rPr>
+              <a:t>/</a:t>
+            </a:r>
+            <a:endParaRPr lang="en-US" sz="1400" dirty="0">
+              <a:solidFill>
+                <a:srgbClr val="FF0000"/>
+              </a:solidFill>
+            </a:endParaRPr>
+          </a:p>
+          <a:p>
+            <a:endParaRPr lang="en-US" sz="1400" dirty="0">
+              <a:solidFill>
+                <a:srgbClr val="FF0000"/>
+              </a:solidFill>
+            </a:endParaRPr>
+          </a:p>
+        </p:txBody>
+      </p:sp>
     </p:spTree>
     <p:extLst>
       <p:ext uri="{BB962C8B-B14F-4D97-AF65-F5344CB8AC3E}">
@@ -6246,7 +7530,7 @@
 </p:sld>
 </file>
 
-<file path=ppt/slides/slide4.xml><?xml version="1.0" encoding="utf-8"?>
+<file path=ppt/slides/slide5.xml><?xml version="1.0" encoding="utf-8"?>
 <p:sld xmlns:a="http://schemas.openxmlformats.org/drawingml/2006/main" xmlns:r="http://schemas.openxmlformats.org/officeDocument/2006/relationships" xmlns:p="http://schemas.openxmlformats.org/presentationml/2006/main">
   <p:cSld>
     <p:spTree>
@@ -8256,1008 +9540,6 @@
     <p:extLst>
       <p:ext uri="{BB962C8B-B14F-4D97-AF65-F5344CB8AC3E}">
         <p14:creationId xmlns:p14="http://schemas.microsoft.com/office/powerpoint/2010/main" val="4098123915"/>
-      </p:ext>
-    </p:extLst>
-  </p:cSld>
-  <p:clrMapOvr>
-    <a:masterClrMapping/>
-  </p:clrMapOvr>
-</p:sld>
-</file>
-
-<file path=ppt/slides/slide5.xml><?xml version="1.0" encoding="utf-8"?>
-<p:sld xmlns:a="http://schemas.openxmlformats.org/drawingml/2006/main" xmlns:r="http://schemas.openxmlformats.org/officeDocument/2006/relationships" xmlns:p="http://schemas.openxmlformats.org/presentationml/2006/main">
-  <p:cSld>
-    <p:spTree>
-      <p:nvGrpSpPr>
-        <p:cNvPr id="1" name=""/>
-        <p:cNvGrpSpPr/>
-        <p:nvPr/>
-      </p:nvGrpSpPr>
-      <p:grpSpPr>
-        <a:xfrm>
-          <a:off x="0" y="0"/>
-          <a:ext cx="0" cy="0"/>
-          <a:chOff x="0" y="0"/>
-          <a:chExt cx="0" cy="0"/>
-        </a:xfrm>
-      </p:grpSpPr>
-      <p:sp>
-        <p:nvSpPr>
-          <p:cNvPr id="5" name="สี่เหลี่ยมผืนผ้า 4"/>
-          <p:cNvSpPr/>
-          <p:nvPr/>
-        </p:nvSpPr>
-        <p:spPr>
-          <a:xfrm>
-            <a:off x="205648" y="109224"/>
-            <a:ext cx="6096000" cy="3046988"/>
-          </a:xfrm>
-          <a:prstGeom prst="rect">
-            <a:avLst/>
-          </a:prstGeom>
-        </p:spPr>
-        <p:txBody>
-          <a:bodyPr>
-            <a:spAutoFit/>
-          </a:bodyPr>
-          <a:lstStyle/>
-          <a:p>
-            <a:r>
-              <a:rPr lang="en-US" sz="1200" b="0" dirty="0" smtClean="0">
-                <a:solidFill>
-                  <a:srgbClr val="569CD6"/>
-                </a:solidFill>
-                <a:effectLst/>
-                <a:latin typeface="Consolas" panose="020B0609020204030204" pitchFamily="49" charset="0"/>
-              </a:rPr>
-              <a:t>#server.js</a:t>
-            </a:r>
-          </a:p>
-          <a:p>
-            <a:r>
-              <a:rPr lang="en-US" sz="1200" b="0" dirty="0" err="1" smtClean="0">
-                <a:solidFill>
-                  <a:srgbClr val="569CD6"/>
-                </a:solidFill>
-                <a:effectLst/>
-                <a:latin typeface="Consolas" panose="020B0609020204030204" pitchFamily="49" charset="0"/>
-              </a:rPr>
-              <a:t>const</a:t>
-            </a:r>
-            <a:r>
-              <a:rPr lang="en-US" sz="1200" b="0" dirty="0" smtClean="0">
-                <a:solidFill>
-                  <a:srgbClr val="D4D4D4"/>
-                </a:solidFill>
-                <a:effectLst/>
-                <a:latin typeface="Consolas" panose="020B0609020204030204" pitchFamily="49" charset="0"/>
-              </a:rPr>
-              <a:t> </a:t>
-            </a:r>
-            <a:r>
-              <a:rPr lang="en-US" sz="1200" b="0" dirty="0" smtClean="0">
-                <a:solidFill>
-                  <a:srgbClr val="9CDCFE"/>
-                </a:solidFill>
-                <a:effectLst/>
-                <a:latin typeface="Consolas" panose="020B0609020204030204" pitchFamily="49" charset="0"/>
-              </a:rPr>
-              <a:t>server</a:t>
-            </a:r>
-            <a:r>
-              <a:rPr lang="en-US" sz="1200" b="0" dirty="0" smtClean="0">
-                <a:solidFill>
-                  <a:srgbClr val="D4D4D4"/>
-                </a:solidFill>
-                <a:effectLst/>
-                <a:latin typeface="Consolas" panose="020B0609020204030204" pitchFamily="49" charset="0"/>
-              </a:rPr>
-              <a:t> = </a:t>
-            </a:r>
-            <a:r>
-              <a:rPr lang="en-US" sz="1200" b="0" dirty="0" smtClean="0">
-                <a:solidFill>
-                  <a:srgbClr val="DCDCAA"/>
-                </a:solidFill>
-                <a:effectLst/>
-                <a:latin typeface="Consolas" panose="020B0609020204030204" pitchFamily="49" charset="0"/>
-              </a:rPr>
-              <a:t>require</a:t>
-            </a:r>
-            <a:r>
-              <a:rPr lang="en-US" sz="1200" b="0" dirty="0" smtClean="0">
-                <a:solidFill>
-                  <a:srgbClr val="D4D4D4"/>
-                </a:solidFill>
-                <a:effectLst/>
-                <a:latin typeface="Consolas" panose="020B0609020204030204" pitchFamily="49" charset="0"/>
-              </a:rPr>
-              <a:t>(</a:t>
-            </a:r>
-            <a:r>
-              <a:rPr lang="en-US" sz="1200" b="0" dirty="0" smtClean="0">
-                <a:solidFill>
-                  <a:srgbClr val="CE9178"/>
-                </a:solidFill>
-                <a:effectLst/>
-                <a:latin typeface="Consolas" panose="020B0609020204030204" pitchFamily="49" charset="0"/>
-              </a:rPr>
-              <a:t>"http"</a:t>
-            </a:r>
-            <a:r>
-              <a:rPr lang="en-US" sz="1200" b="0" dirty="0" smtClean="0">
-                <a:solidFill>
-                  <a:srgbClr val="D4D4D4"/>
-                </a:solidFill>
-                <a:effectLst/>
-                <a:latin typeface="Consolas" panose="020B0609020204030204" pitchFamily="49" charset="0"/>
-              </a:rPr>
-              <a:t>).</a:t>
-            </a:r>
-            <a:r>
-              <a:rPr lang="en-US" sz="1200" b="0" dirty="0" err="1" smtClean="0">
-                <a:solidFill>
-                  <a:srgbClr val="DCDCAA"/>
-                </a:solidFill>
-                <a:effectLst/>
-                <a:latin typeface="Consolas" panose="020B0609020204030204" pitchFamily="49" charset="0"/>
-              </a:rPr>
-              <a:t>createServer</a:t>
-            </a:r>
-            <a:r>
-              <a:rPr lang="en-US" sz="1200" b="0" dirty="0" smtClean="0">
-                <a:solidFill>
-                  <a:srgbClr val="D4D4D4"/>
-                </a:solidFill>
-                <a:effectLst/>
-                <a:latin typeface="Consolas" panose="020B0609020204030204" pitchFamily="49" charset="0"/>
-              </a:rPr>
-              <a:t>();</a:t>
-            </a:r>
-          </a:p>
-          <a:p>
-            <a:r>
-              <a:rPr lang="en-US" sz="1200" b="0" dirty="0" err="1" smtClean="0">
-                <a:solidFill>
-                  <a:srgbClr val="569CD6"/>
-                </a:solidFill>
-                <a:effectLst/>
-                <a:latin typeface="Consolas" panose="020B0609020204030204" pitchFamily="49" charset="0"/>
-              </a:rPr>
-              <a:t>const</a:t>
-            </a:r>
-            <a:r>
-              <a:rPr lang="en-US" sz="1200" b="0" dirty="0" smtClean="0">
-                <a:solidFill>
-                  <a:srgbClr val="D4D4D4"/>
-                </a:solidFill>
-                <a:effectLst/>
-                <a:latin typeface="Consolas" panose="020B0609020204030204" pitchFamily="49" charset="0"/>
-              </a:rPr>
-              <a:t> </a:t>
-            </a:r>
-            <a:r>
-              <a:rPr lang="en-US" sz="1200" b="0" dirty="0" err="1" smtClean="0">
-                <a:solidFill>
-                  <a:srgbClr val="9CDCFE"/>
-                </a:solidFill>
-                <a:effectLst/>
-                <a:latin typeface="Consolas" panose="020B0609020204030204" pitchFamily="49" charset="0"/>
-              </a:rPr>
-              <a:t>io</a:t>
-            </a:r>
-            <a:r>
-              <a:rPr lang="en-US" sz="1200" b="0" dirty="0" smtClean="0">
-                <a:solidFill>
-                  <a:srgbClr val="D4D4D4"/>
-                </a:solidFill>
-                <a:effectLst/>
-                <a:latin typeface="Consolas" panose="020B0609020204030204" pitchFamily="49" charset="0"/>
-              </a:rPr>
-              <a:t> = </a:t>
-            </a:r>
-            <a:r>
-              <a:rPr lang="en-US" sz="1200" b="0" dirty="0" smtClean="0">
-                <a:solidFill>
-                  <a:srgbClr val="DCDCAA"/>
-                </a:solidFill>
-                <a:effectLst/>
-                <a:latin typeface="Consolas" panose="020B0609020204030204" pitchFamily="49" charset="0"/>
-              </a:rPr>
-              <a:t>require</a:t>
-            </a:r>
-            <a:r>
-              <a:rPr lang="en-US" sz="1200" b="0" dirty="0" smtClean="0">
-                <a:solidFill>
-                  <a:srgbClr val="D4D4D4"/>
-                </a:solidFill>
-                <a:effectLst/>
-                <a:latin typeface="Consolas" panose="020B0609020204030204" pitchFamily="49" charset="0"/>
-              </a:rPr>
-              <a:t>(</a:t>
-            </a:r>
-            <a:r>
-              <a:rPr lang="en-US" sz="1200" b="0" dirty="0" smtClean="0">
-                <a:solidFill>
-                  <a:srgbClr val="CE9178"/>
-                </a:solidFill>
-                <a:effectLst/>
-                <a:latin typeface="Consolas" panose="020B0609020204030204" pitchFamily="49" charset="0"/>
-              </a:rPr>
-              <a:t>"socket.io"</a:t>
-            </a:r>
-            <a:r>
-              <a:rPr lang="en-US" sz="1200" b="0" dirty="0" smtClean="0">
-                <a:solidFill>
-                  <a:srgbClr val="D4D4D4"/>
-                </a:solidFill>
-                <a:effectLst/>
-                <a:latin typeface="Consolas" panose="020B0609020204030204" pitchFamily="49" charset="0"/>
-              </a:rPr>
-              <a:t>)(</a:t>
-            </a:r>
-            <a:r>
-              <a:rPr lang="en-US" sz="1200" b="0" dirty="0" smtClean="0">
-                <a:solidFill>
-                  <a:srgbClr val="9CDCFE"/>
-                </a:solidFill>
-                <a:effectLst/>
-                <a:latin typeface="Consolas" panose="020B0609020204030204" pitchFamily="49" charset="0"/>
-              </a:rPr>
-              <a:t>server</a:t>
-            </a:r>
-            <a:r>
-              <a:rPr lang="en-US" sz="1200" b="0" dirty="0" smtClean="0">
-                <a:solidFill>
-                  <a:srgbClr val="D4D4D4"/>
-                </a:solidFill>
-                <a:effectLst/>
-                <a:latin typeface="Consolas" panose="020B0609020204030204" pitchFamily="49" charset="0"/>
-              </a:rPr>
-              <a:t>);</a:t>
-            </a:r>
-          </a:p>
-          <a:p>
-            <a:r>
-              <a:rPr lang="en-US" sz="1200" b="0" dirty="0" smtClean="0">
-                <a:solidFill>
-                  <a:srgbClr val="D4D4D4"/>
-                </a:solidFill>
-                <a:effectLst/>
-                <a:latin typeface="Consolas" panose="020B0609020204030204" pitchFamily="49" charset="0"/>
-              </a:rPr>
-              <a:t/>
-            </a:r>
-            <a:br>
-              <a:rPr lang="en-US" sz="1200" b="0" dirty="0" smtClean="0">
-                <a:solidFill>
-                  <a:srgbClr val="D4D4D4"/>
-                </a:solidFill>
-                <a:effectLst/>
-                <a:latin typeface="Consolas" panose="020B0609020204030204" pitchFamily="49" charset="0"/>
-              </a:rPr>
-            </a:br>
-            <a:r>
-              <a:rPr lang="en-US" sz="1200" b="0" dirty="0" err="1" smtClean="0">
-                <a:solidFill>
-                  <a:srgbClr val="9CDCFE"/>
-                </a:solidFill>
-                <a:effectLst/>
-                <a:latin typeface="Consolas" panose="020B0609020204030204" pitchFamily="49" charset="0"/>
-              </a:rPr>
-              <a:t>io</a:t>
-            </a:r>
-            <a:r>
-              <a:rPr lang="en-US" sz="1200" b="0" dirty="0" err="1" smtClean="0">
-                <a:solidFill>
-                  <a:srgbClr val="D4D4D4"/>
-                </a:solidFill>
-                <a:effectLst/>
-                <a:latin typeface="Consolas" panose="020B0609020204030204" pitchFamily="49" charset="0"/>
-              </a:rPr>
-              <a:t>.</a:t>
-            </a:r>
-            <a:r>
-              <a:rPr lang="en-US" sz="1200" b="0" dirty="0" err="1" smtClean="0">
-                <a:solidFill>
-                  <a:srgbClr val="DCDCAA"/>
-                </a:solidFill>
-                <a:effectLst/>
-                <a:latin typeface="Consolas" panose="020B0609020204030204" pitchFamily="49" charset="0"/>
-              </a:rPr>
-              <a:t>on</a:t>
-            </a:r>
-            <a:r>
-              <a:rPr lang="en-US" sz="1200" b="0" dirty="0" smtClean="0">
-                <a:solidFill>
-                  <a:srgbClr val="D4D4D4"/>
-                </a:solidFill>
-                <a:effectLst/>
-                <a:latin typeface="Consolas" panose="020B0609020204030204" pitchFamily="49" charset="0"/>
-              </a:rPr>
-              <a:t>(</a:t>
-            </a:r>
-            <a:r>
-              <a:rPr lang="en-US" sz="1200" b="0" dirty="0" smtClean="0">
-                <a:solidFill>
-                  <a:srgbClr val="CE9178"/>
-                </a:solidFill>
-                <a:effectLst/>
-                <a:latin typeface="Consolas" panose="020B0609020204030204" pitchFamily="49" charset="0"/>
-              </a:rPr>
-              <a:t>"connection"</a:t>
-            </a:r>
-            <a:r>
-              <a:rPr lang="en-US" sz="1200" b="0" dirty="0" smtClean="0">
-                <a:solidFill>
-                  <a:srgbClr val="D4D4D4"/>
-                </a:solidFill>
-                <a:effectLst/>
-                <a:latin typeface="Consolas" panose="020B0609020204030204" pitchFamily="49" charset="0"/>
-              </a:rPr>
-              <a:t>, </a:t>
-            </a:r>
-            <a:r>
-              <a:rPr lang="en-US" sz="1200" b="0" dirty="0" smtClean="0">
-                <a:solidFill>
-                  <a:srgbClr val="569CD6"/>
-                </a:solidFill>
-                <a:effectLst/>
-                <a:latin typeface="Consolas" panose="020B0609020204030204" pitchFamily="49" charset="0"/>
-              </a:rPr>
-              <a:t>function</a:t>
-            </a:r>
-            <a:r>
-              <a:rPr lang="en-US" sz="1200" b="0" dirty="0" smtClean="0">
-                <a:solidFill>
-                  <a:srgbClr val="D4D4D4"/>
-                </a:solidFill>
-                <a:effectLst/>
-                <a:latin typeface="Consolas" panose="020B0609020204030204" pitchFamily="49" charset="0"/>
-              </a:rPr>
-              <a:t>(</a:t>
-            </a:r>
-            <a:r>
-              <a:rPr lang="en-US" sz="1200" b="0" dirty="0" smtClean="0">
-                <a:solidFill>
-                  <a:srgbClr val="9CDCFE"/>
-                </a:solidFill>
-                <a:effectLst/>
-                <a:latin typeface="Consolas" panose="020B0609020204030204" pitchFamily="49" charset="0"/>
-              </a:rPr>
-              <a:t>socket</a:t>
-            </a:r>
-            <a:r>
-              <a:rPr lang="en-US" sz="1200" b="0" dirty="0" smtClean="0">
-                <a:solidFill>
-                  <a:srgbClr val="D4D4D4"/>
-                </a:solidFill>
-                <a:effectLst/>
-                <a:latin typeface="Consolas" panose="020B0609020204030204" pitchFamily="49" charset="0"/>
-              </a:rPr>
-              <a:t>){</a:t>
-            </a:r>
-          </a:p>
-          <a:p>
-            <a:r>
-              <a:rPr lang="en-US" sz="1200" b="0" dirty="0" err="1" smtClean="0">
-                <a:solidFill>
-                  <a:srgbClr val="9CDCFE"/>
-                </a:solidFill>
-                <a:effectLst/>
-                <a:latin typeface="Consolas" panose="020B0609020204030204" pitchFamily="49" charset="0"/>
-              </a:rPr>
-              <a:t>socket</a:t>
-            </a:r>
-            <a:r>
-              <a:rPr lang="en-US" sz="1200" b="0" dirty="0" err="1" smtClean="0">
-                <a:solidFill>
-                  <a:srgbClr val="D4D4D4"/>
-                </a:solidFill>
-                <a:effectLst/>
-                <a:latin typeface="Consolas" panose="020B0609020204030204" pitchFamily="49" charset="0"/>
-              </a:rPr>
-              <a:t>.</a:t>
-            </a:r>
-            <a:r>
-              <a:rPr lang="en-US" sz="1200" b="0" dirty="0" err="1" smtClean="0">
-                <a:solidFill>
-                  <a:srgbClr val="DCDCAA"/>
-                </a:solidFill>
-                <a:effectLst/>
-                <a:latin typeface="Consolas" panose="020B0609020204030204" pitchFamily="49" charset="0"/>
-              </a:rPr>
-              <a:t>on</a:t>
-            </a:r>
-            <a:r>
-              <a:rPr lang="en-US" sz="1200" b="0" dirty="0" smtClean="0">
-                <a:solidFill>
-                  <a:srgbClr val="D4D4D4"/>
-                </a:solidFill>
-                <a:effectLst/>
-                <a:latin typeface="Consolas" panose="020B0609020204030204" pitchFamily="49" charset="0"/>
-              </a:rPr>
-              <a:t>(</a:t>
-            </a:r>
-            <a:r>
-              <a:rPr lang="en-US" sz="1200" b="0" dirty="0" smtClean="0">
-                <a:solidFill>
-                  <a:srgbClr val="CE9178"/>
-                </a:solidFill>
-                <a:effectLst/>
-                <a:latin typeface="Consolas" panose="020B0609020204030204" pitchFamily="49" charset="0"/>
-              </a:rPr>
-              <a:t>"emit"</a:t>
-            </a:r>
-            <a:r>
-              <a:rPr lang="en-US" sz="1200" b="0" dirty="0" smtClean="0">
-                <a:solidFill>
-                  <a:srgbClr val="D4D4D4"/>
-                </a:solidFill>
-                <a:effectLst/>
-                <a:latin typeface="Consolas" panose="020B0609020204030204" pitchFamily="49" charset="0"/>
-              </a:rPr>
-              <a:t>, </a:t>
-            </a:r>
-            <a:r>
-              <a:rPr lang="en-US" sz="1200" b="0" dirty="0" smtClean="0">
-                <a:solidFill>
-                  <a:srgbClr val="569CD6"/>
-                </a:solidFill>
-                <a:effectLst/>
-                <a:latin typeface="Consolas" panose="020B0609020204030204" pitchFamily="49" charset="0"/>
-              </a:rPr>
-              <a:t>function</a:t>
-            </a:r>
-            <a:r>
-              <a:rPr lang="en-US" sz="1200" b="0" dirty="0" smtClean="0">
-                <a:solidFill>
-                  <a:srgbClr val="D4D4D4"/>
-                </a:solidFill>
-                <a:effectLst/>
-                <a:latin typeface="Consolas" panose="020B0609020204030204" pitchFamily="49" charset="0"/>
-              </a:rPr>
-              <a:t>(</a:t>
-            </a:r>
-            <a:r>
-              <a:rPr lang="en-US" sz="1200" b="0" dirty="0" smtClean="0">
-                <a:solidFill>
-                  <a:srgbClr val="9CDCFE"/>
-                </a:solidFill>
-                <a:effectLst/>
-                <a:latin typeface="Consolas" panose="020B0609020204030204" pitchFamily="49" charset="0"/>
-              </a:rPr>
-              <a:t>Data</a:t>
-            </a:r>
-            <a:r>
-              <a:rPr lang="en-US" sz="1200" b="0" dirty="0" smtClean="0">
-                <a:solidFill>
-                  <a:srgbClr val="D4D4D4"/>
-                </a:solidFill>
-                <a:effectLst/>
-                <a:latin typeface="Consolas" panose="020B0609020204030204" pitchFamily="49" charset="0"/>
-              </a:rPr>
-              <a:t>){</a:t>
-            </a:r>
-          </a:p>
-          <a:p>
-            <a:r>
-              <a:rPr lang="en-US" sz="1200" b="0" dirty="0" smtClean="0">
-                <a:solidFill>
-                  <a:srgbClr val="6A9955"/>
-                </a:solidFill>
-                <a:effectLst/>
-                <a:latin typeface="Consolas" panose="020B0609020204030204" pitchFamily="49" charset="0"/>
-              </a:rPr>
-              <a:t>// console.log("Receive Data");</a:t>
-            </a:r>
-            <a:endParaRPr lang="en-US" sz="1200" b="0" dirty="0" smtClean="0">
-              <a:solidFill>
-                <a:srgbClr val="D4D4D4"/>
-              </a:solidFill>
-              <a:effectLst/>
-              <a:latin typeface="Consolas" panose="020B0609020204030204" pitchFamily="49" charset="0"/>
-            </a:endParaRPr>
-          </a:p>
-          <a:p>
-            <a:r>
-              <a:rPr lang="en-US" sz="1200" b="0" dirty="0" smtClean="0">
-                <a:solidFill>
-                  <a:srgbClr val="4EC9B0"/>
-                </a:solidFill>
-                <a:effectLst/>
-                <a:latin typeface="Consolas" panose="020B0609020204030204" pitchFamily="49" charset="0"/>
-              </a:rPr>
-              <a:t>console</a:t>
-            </a:r>
-            <a:r>
-              <a:rPr lang="en-US" sz="1200" b="0" dirty="0" smtClean="0">
-                <a:solidFill>
-                  <a:srgbClr val="D4D4D4"/>
-                </a:solidFill>
-                <a:effectLst/>
-                <a:latin typeface="Consolas" panose="020B0609020204030204" pitchFamily="49" charset="0"/>
-              </a:rPr>
-              <a:t>.</a:t>
-            </a:r>
-            <a:r>
-              <a:rPr lang="en-US" sz="1200" b="0" dirty="0" smtClean="0">
-                <a:solidFill>
-                  <a:srgbClr val="DCDCAA"/>
-                </a:solidFill>
-                <a:effectLst/>
-                <a:latin typeface="Consolas" panose="020B0609020204030204" pitchFamily="49" charset="0"/>
-              </a:rPr>
-              <a:t>log</a:t>
-            </a:r>
-            <a:r>
-              <a:rPr lang="en-US" sz="1200" b="0" dirty="0" smtClean="0">
-                <a:solidFill>
-                  <a:srgbClr val="D4D4D4"/>
-                </a:solidFill>
-                <a:effectLst/>
-                <a:latin typeface="Consolas" panose="020B0609020204030204" pitchFamily="49" charset="0"/>
-              </a:rPr>
-              <a:t>(</a:t>
-            </a:r>
-            <a:r>
-              <a:rPr lang="en-US" sz="1200" b="0" dirty="0" smtClean="0">
-                <a:solidFill>
-                  <a:srgbClr val="9CDCFE"/>
-                </a:solidFill>
-                <a:effectLst/>
-                <a:latin typeface="Consolas" panose="020B0609020204030204" pitchFamily="49" charset="0"/>
-              </a:rPr>
-              <a:t>Data</a:t>
-            </a:r>
-            <a:r>
-              <a:rPr lang="en-US" sz="1200" b="0" dirty="0" smtClean="0">
-                <a:solidFill>
-                  <a:srgbClr val="D4D4D4"/>
-                </a:solidFill>
-                <a:effectLst/>
-                <a:latin typeface="Consolas" panose="020B0609020204030204" pitchFamily="49" charset="0"/>
-              </a:rPr>
-              <a:t>);</a:t>
-            </a:r>
-          </a:p>
-          <a:p>
-            <a:r>
-              <a:rPr lang="en-US" sz="1200" b="0" dirty="0" err="1" smtClean="0">
-                <a:solidFill>
-                  <a:srgbClr val="9CDCFE"/>
-                </a:solidFill>
-                <a:effectLst/>
-                <a:latin typeface="Consolas" panose="020B0609020204030204" pitchFamily="49" charset="0"/>
-              </a:rPr>
-              <a:t>socket</a:t>
-            </a:r>
-            <a:r>
-              <a:rPr lang="en-US" sz="1200" b="0" dirty="0" err="1" smtClean="0">
-                <a:solidFill>
-                  <a:srgbClr val="D4D4D4"/>
-                </a:solidFill>
-                <a:effectLst/>
-                <a:latin typeface="Consolas" panose="020B0609020204030204" pitchFamily="49" charset="0"/>
-              </a:rPr>
-              <a:t>.</a:t>
-            </a:r>
-            <a:r>
-              <a:rPr lang="en-US" sz="1200" b="0" dirty="0" err="1" smtClean="0">
-                <a:solidFill>
-                  <a:srgbClr val="9CDCFE"/>
-                </a:solidFill>
-                <a:effectLst/>
-                <a:latin typeface="Consolas" panose="020B0609020204030204" pitchFamily="49" charset="0"/>
-              </a:rPr>
-              <a:t>broadcast</a:t>
-            </a:r>
-            <a:r>
-              <a:rPr lang="en-US" sz="1200" b="0" dirty="0" err="1" smtClean="0">
-                <a:solidFill>
-                  <a:srgbClr val="D4D4D4"/>
-                </a:solidFill>
-                <a:effectLst/>
-                <a:latin typeface="Consolas" panose="020B0609020204030204" pitchFamily="49" charset="0"/>
-              </a:rPr>
-              <a:t>.</a:t>
-            </a:r>
-            <a:r>
-              <a:rPr lang="en-US" sz="1200" b="0" dirty="0" err="1" smtClean="0">
-                <a:solidFill>
-                  <a:srgbClr val="DCDCAA"/>
-                </a:solidFill>
-                <a:effectLst/>
-                <a:latin typeface="Consolas" panose="020B0609020204030204" pitchFamily="49" charset="0"/>
-              </a:rPr>
-              <a:t>emit</a:t>
-            </a:r>
-            <a:r>
-              <a:rPr lang="en-US" sz="1200" b="0" dirty="0" smtClean="0">
-                <a:solidFill>
-                  <a:srgbClr val="D4D4D4"/>
-                </a:solidFill>
-                <a:effectLst/>
-                <a:latin typeface="Consolas" panose="020B0609020204030204" pitchFamily="49" charset="0"/>
-              </a:rPr>
-              <a:t>(</a:t>
-            </a:r>
-            <a:r>
-              <a:rPr lang="en-US" sz="1200" b="0" dirty="0" smtClean="0">
-                <a:solidFill>
-                  <a:srgbClr val="CE9178"/>
-                </a:solidFill>
-                <a:effectLst/>
-                <a:latin typeface="Consolas" panose="020B0609020204030204" pitchFamily="49" charset="0"/>
-              </a:rPr>
-              <a:t>"count"</a:t>
-            </a:r>
-            <a:r>
-              <a:rPr lang="en-US" sz="1200" b="0" dirty="0" smtClean="0">
-                <a:solidFill>
-                  <a:srgbClr val="D4D4D4"/>
-                </a:solidFill>
-                <a:effectLst/>
-                <a:latin typeface="Consolas" panose="020B0609020204030204" pitchFamily="49" charset="0"/>
-              </a:rPr>
-              <a:t>, {</a:t>
-            </a:r>
-            <a:r>
-              <a:rPr lang="en-US" sz="1200" b="0" dirty="0" err="1" smtClean="0">
-                <a:solidFill>
-                  <a:srgbClr val="9CDCFE"/>
-                </a:solidFill>
-                <a:effectLst/>
-                <a:latin typeface="Consolas" panose="020B0609020204030204" pitchFamily="49" charset="0"/>
-              </a:rPr>
-              <a:t>count:Data</a:t>
-            </a:r>
-            <a:r>
-              <a:rPr lang="en-US" sz="1200" b="0" dirty="0" err="1" smtClean="0">
-                <a:solidFill>
-                  <a:srgbClr val="D4D4D4"/>
-                </a:solidFill>
-                <a:effectLst/>
-                <a:latin typeface="Consolas" panose="020B0609020204030204" pitchFamily="49" charset="0"/>
-              </a:rPr>
-              <a:t>.</a:t>
-            </a:r>
-            <a:r>
-              <a:rPr lang="en-US" sz="1200" b="0" dirty="0" err="1" smtClean="0">
-                <a:solidFill>
-                  <a:srgbClr val="9CDCFE"/>
-                </a:solidFill>
-                <a:effectLst/>
-                <a:latin typeface="Consolas" panose="020B0609020204030204" pitchFamily="49" charset="0"/>
-              </a:rPr>
-              <a:t>count</a:t>
-            </a:r>
-            <a:r>
-              <a:rPr lang="en-US" sz="1200" b="0" dirty="0" smtClean="0">
-                <a:solidFill>
-                  <a:srgbClr val="D4D4D4"/>
-                </a:solidFill>
-                <a:effectLst/>
-                <a:latin typeface="Consolas" panose="020B0609020204030204" pitchFamily="49" charset="0"/>
-              </a:rPr>
-              <a:t>});</a:t>
-            </a:r>
-          </a:p>
-          <a:p>
-            <a:r>
-              <a:rPr lang="en-US" sz="1200" b="0" dirty="0" smtClean="0">
-                <a:solidFill>
-                  <a:srgbClr val="D4D4D4"/>
-                </a:solidFill>
-                <a:effectLst/>
-                <a:latin typeface="Consolas" panose="020B0609020204030204" pitchFamily="49" charset="0"/>
-              </a:rPr>
-              <a:t>});</a:t>
-            </a:r>
-          </a:p>
-          <a:p>
-            <a:r>
-              <a:rPr lang="en-US" sz="1200" b="0" dirty="0" smtClean="0">
-                <a:solidFill>
-                  <a:srgbClr val="D4D4D4"/>
-                </a:solidFill>
-                <a:effectLst/>
-                <a:latin typeface="Consolas" panose="020B0609020204030204" pitchFamily="49" charset="0"/>
-              </a:rPr>
-              <a:t>});</a:t>
-            </a:r>
-          </a:p>
-          <a:p>
-            <a:r>
-              <a:rPr lang="en-US" sz="1200" b="0" dirty="0" smtClean="0">
-                <a:solidFill>
-                  <a:srgbClr val="D4D4D4"/>
-                </a:solidFill>
-                <a:effectLst/>
-                <a:latin typeface="Consolas" panose="020B0609020204030204" pitchFamily="49" charset="0"/>
-              </a:rPr>
-              <a:t/>
-            </a:r>
-            <a:br>
-              <a:rPr lang="en-US" sz="1200" b="0" dirty="0" smtClean="0">
-                <a:solidFill>
-                  <a:srgbClr val="D4D4D4"/>
-                </a:solidFill>
-                <a:effectLst/>
-                <a:latin typeface="Consolas" panose="020B0609020204030204" pitchFamily="49" charset="0"/>
-              </a:rPr>
-            </a:br>
-            <a:r>
-              <a:rPr lang="en-US" sz="1200" b="0" dirty="0" err="1" smtClean="0">
-                <a:solidFill>
-                  <a:srgbClr val="9CDCFE"/>
-                </a:solidFill>
-                <a:effectLst/>
-                <a:latin typeface="Consolas" panose="020B0609020204030204" pitchFamily="49" charset="0"/>
-              </a:rPr>
-              <a:t>server</a:t>
-            </a:r>
-            <a:r>
-              <a:rPr lang="en-US" sz="1200" b="0" dirty="0" err="1" smtClean="0">
-                <a:solidFill>
-                  <a:srgbClr val="D4D4D4"/>
-                </a:solidFill>
-                <a:effectLst/>
-                <a:latin typeface="Consolas" panose="020B0609020204030204" pitchFamily="49" charset="0"/>
-              </a:rPr>
-              <a:t>.</a:t>
-            </a:r>
-            <a:r>
-              <a:rPr lang="en-US" sz="1200" b="0" dirty="0" err="1" smtClean="0">
-                <a:solidFill>
-                  <a:srgbClr val="DCDCAA"/>
-                </a:solidFill>
-                <a:effectLst/>
-                <a:latin typeface="Consolas" panose="020B0609020204030204" pitchFamily="49" charset="0"/>
-              </a:rPr>
-              <a:t>listen</a:t>
-            </a:r>
-            <a:r>
-              <a:rPr lang="en-US" sz="1200" b="0" dirty="0" smtClean="0">
-                <a:solidFill>
-                  <a:srgbClr val="D4D4D4"/>
-                </a:solidFill>
-                <a:effectLst/>
-                <a:latin typeface="Consolas" panose="020B0609020204030204" pitchFamily="49" charset="0"/>
-              </a:rPr>
-              <a:t>(</a:t>
-            </a:r>
-            <a:r>
-              <a:rPr lang="en-US" sz="1200" b="0" dirty="0" smtClean="0">
-                <a:solidFill>
-                  <a:srgbClr val="B5CEA8"/>
-                </a:solidFill>
-                <a:effectLst/>
-                <a:latin typeface="Consolas" panose="020B0609020204030204" pitchFamily="49" charset="0"/>
-              </a:rPr>
-              <a:t>8080</a:t>
-            </a:r>
-            <a:r>
-              <a:rPr lang="en-US" sz="1200" b="0" dirty="0" smtClean="0">
-                <a:solidFill>
-                  <a:srgbClr val="D4D4D4"/>
-                </a:solidFill>
-                <a:effectLst/>
-                <a:latin typeface="Consolas" panose="020B0609020204030204" pitchFamily="49" charset="0"/>
-              </a:rPr>
-              <a:t>, </a:t>
-            </a:r>
-            <a:r>
-              <a:rPr lang="en-US" sz="1200" b="0" dirty="0" smtClean="0">
-                <a:solidFill>
-                  <a:srgbClr val="569CD6"/>
-                </a:solidFill>
-                <a:effectLst/>
-                <a:latin typeface="Consolas" panose="020B0609020204030204" pitchFamily="49" charset="0"/>
-              </a:rPr>
-              <a:t>function</a:t>
-            </a:r>
-            <a:r>
-              <a:rPr lang="en-US" sz="1200" b="0" dirty="0" smtClean="0">
-                <a:solidFill>
-                  <a:srgbClr val="D4D4D4"/>
-                </a:solidFill>
-                <a:effectLst/>
-                <a:latin typeface="Consolas" panose="020B0609020204030204" pitchFamily="49" charset="0"/>
-              </a:rPr>
-              <a:t>(</a:t>
-            </a:r>
-            <a:r>
-              <a:rPr lang="en-US" sz="1200" b="0" dirty="0" smtClean="0">
-                <a:solidFill>
-                  <a:srgbClr val="9CDCFE"/>
-                </a:solidFill>
-                <a:effectLst/>
-                <a:latin typeface="Consolas" panose="020B0609020204030204" pitchFamily="49" charset="0"/>
-              </a:rPr>
-              <a:t>err</a:t>
-            </a:r>
-            <a:r>
-              <a:rPr lang="en-US" sz="1200" b="0" dirty="0" smtClean="0">
-                <a:solidFill>
-                  <a:srgbClr val="D4D4D4"/>
-                </a:solidFill>
-                <a:effectLst/>
-                <a:latin typeface="Consolas" panose="020B0609020204030204" pitchFamily="49" charset="0"/>
-              </a:rPr>
-              <a:t>) {</a:t>
-            </a:r>
-          </a:p>
-          <a:p>
-            <a:r>
-              <a:rPr lang="en-US" sz="1200" b="0" dirty="0" smtClean="0">
-                <a:solidFill>
-                  <a:srgbClr val="C586C0"/>
-                </a:solidFill>
-                <a:effectLst/>
-                <a:latin typeface="Consolas" panose="020B0609020204030204" pitchFamily="49" charset="0"/>
-              </a:rPr>
-              <a:t>if</a:t>
-            </a:r>
-            <a:r>
-              <a:rPr lang="en-US" sz="1200" b="0" dirty="0" smtClean="0">
-                <a:solidFill>
-                  <a:srgbClr val="D4D4D4"/>
-                </a:solidFill>
-                <a:effectLst/>
-                <a:latin typeface="Consolas" panose="020B0609020204030204" pitchFamily="49" charset="0"/>
-              </a:rPr>
-              <a:t> (</a:t>
-            </a:r>
-            <a:r>
-              <a:rPr lang="en-US" sz="1200" b="0" dirty="0" smtClean="0">
-                <a:solidFill>
-                  <a:srgbClr val="9CDCFE"/>
-                </a:solidFill>
-                <a:effectLst/>
-                <a:latin typeface="Consolas" panose="020B0609020204030204" pitchFamily="49" charset="0"/>
-              </a:rPr>
-              <a:t>err</a:t>
-            </a:r>
-            <a:r>
-              <a:rPr lang="en-US" sz="1200" b="0" dirty="0" smtClean="0">
-                <a:solidFill>
-                  <a:srgbClr val="D4D4D4"/>
-                </a:solidFill>
-                <a:effectLst/>
-                <a:latin typeface="Consolas" panose="020B0609020204030204" pitchFamily="49" charset="0"/>
-              </a:rPr>
-              <a:t>) </a:t>
-            </a:r>
-            <a:r>
-              <a:rPr lang="en-US" sz="1200" b="0" dirty="0" smtClean="0">
-                <a:solidFill>
-                  <a:srgbClr val="C586C0"/>
-                </a:solidFill>
-                <a:effectLst/>
-                <a:latin typeface="Consolas" panose="020B0609020204030204" pitchFamily="49" charset="0"/>
-              </a:rPr>
-              <a:t>throw</a:t>
-            </a:r>
-            <a:r>
-              <a:rPr lang="en-US" sz="1200" b="0" dirty="0" smtClean="0">
-                <a:solidFill>
-                  <a:srgbClr val="D4D4D4"/>
-                </a:solidFill>
-                <a:effectLst/>
-                <a:latin typeface="Consolas" panose="020B0609020204030204" pitchFamily="49" charset="0"/>
-              </a:rPr>
-              <a:t> </a:t>
-            </a:r>
-            <a:r>
-              <a:rPr lang="en-US" sz="1200" b="0" dirty="0" smtClean="0">
-                <a:solidFill>
-                  <a:srgbClr val="9CDCFE"/>
-                </a:solidFill>
-                <a:effectLst/>
-                <a:latin typeface="Consolas" panose="020B0609020204030204" pitchFamily="49" charset="0"/>
-              </a:rPr>
-              <a:t>err</a:t>
-            </a:r>
-            <a:r>
-              <a:rPr lang="en-US" sz="1200" b="0" dirty="0" smtClean="0">
-                <a:solidFill>
-                  <a:srgbClr val="D4D4D4"/>
-                </a:solidFill>
-                <a:effectLst/>
-                <a:latin typeface="Consolas" panose="020B0609020204030204" pitchFamily="49" charset="0"/>
-              </a:rPr>
-              <a:t>;</a:t>
-            </a:r>
-          </a:p>
-          <a:p>
-            <a:r>
-              <a:rPr lang="en-US" sz="1200" b="0" dirty="0" smtClean="0">
-                <a:solidFill>
-                  <a:srgbClr val="4EC9B0"/>
-                </a:solidFill>
-                <a:effectLst/>
-                <a:latin typeface="Consolas" panose="020B0609020204030204" pitchFamily="49" charset="0"/>
-              </a:rPr>
-              <a:t>console</a:t>
-            </a:r>
-            <a:r>
-              <a:rPr lang="en-US" sz="1200" b="0" dirty="0" smtClean="0">
-                <a:solidFill>
-                  <a:srgbClr val="D4D4D4"/>
-                </a:solidFill>
-                <a:effectLst/>
-                <a:latin typeface="Consolas" panose="020B0609020204030204" pitchFamily="49" charset="0"/>
-              </a:rPr>
-              <a:t>.</a:t>
-            </a:r>
-            <a:r>
-              <a:rPr lang="en-US" sz="1200" b="0" dirty="0" smtClean="0">
-                <a:solidFill>
-                  <a:srgbClr val="DCDCAA"/>
-                </a:solidFill>
-                <a:effectLst/>
-                <a:latin typeface="Consolas" panose="020B0609020204030204" pitchFamily="49" charset="0"/>
-              </a:rPr>
-              <a:t>log</a:t>
-            </a:r>
-            <a:r>
-              <a:rPr lang="en-US" sz="1200" b="0" dirty="0" smtClean="0">
-                <a:solidFill>
-                  <a:srgbClr val="D4D4D4"/>
-                </a:solidFill>
-                <a:effectLst/>
-                <a:latin typeface="Consolas" panose="020B0609020204030204" pitchFamily="49" charset="0"/>
-              </a:rPr>
-              <a:t>(</a:t>
-            </a:r>
-            <a:r>
-              <a:rPr lang="en-US" sz="1200" b="0" dirty="0" smtClean="0">
-                <a:solidFill>
-                  <a:srgbClr val="CE9178"/>
-                </a:solidFill>
-                <a:effectLst/>
-                <a:latin typeface="Consolas" panose="020B0609020204030204" pitchFamily="49" charset="0"/>
-              </a:rPr>
-              <a:t>"Server is listening to port 8080"</a:t>
-            </a:r>
-            <a:r>
-              <a:rPr lang="en-US" sz="1200" b="0" dirty="0" smtClean="0">
-                <a:solidFill>
-                  <a:srgbClr val="D4D4D4"/>
-                </a:solidFill>
-                <a:effectLst/>
-                <a:latin typeface="Consolas" panose="020B0609020204030204" pitchFamily="49" charset="0"/>
-              </a:rPr>
-              <a:t>)</a:t>
-            </a:r>
-          </a:p>
-          <a:p>
-            <a:r>
-              <a:rPr lang="en-US" sz="1200" b="0" dirty="0" smtClean="0">
-                <a:solidFill>
-                  <a:srgbClr val="D4D4D4"/>
-                </a:solidFill>
-                <a:effectLst/>
-                <a:latin typeface="Consolas" panose="020B0609020204030204" pitchFamily="49" charset="0"/>
-              </a:rPr>
-              <a:t>});</a:t>
-            </a:r>
-            <a:endParaRPr lang="en-US" sz="1200" b="0" dirty="0">
-              <a:solidFill>
-                <a:srgbClr val="D4D4D4"/>
-              </a:solidFill>
-              <a:effectLst/>
-              <a:latin typeface="Consolas" panose="020B0609020204030204" pitchFamily="49" charset="0"/>
-            </a:endParaRPr>
-          </a:p>
-        </p:txBody>
-      </p:sp>
-    </p:spTree>
-    <p:extLst>
-      <p:ext uri="{BB962C8B-B14F-4D97-AF65-F5344CB8AC3E}">
-        <p14:creationId xmlns:p14="http://schemas.microsoft.com/office/powerpoint/2010/main" val="1921765369"/>
       </p:ext>
     </p:extLst>
   </p:cSld>
@@ -10259,7 +10541,2209 @@
     </p:spTree>
     <p:extLst>
       <p:ext uri="{BB962C8B-B14F-4D97-AF65-F5344CB8AC3E}">
+        <p14:creationId xmlns:p14="http://schemas.microsoft.com/office/powerpoint/2010/main" val="1921765369"/>
+      </p:ext>
+    </p:extLst>
+  </p:cSld>
+  <p:clrMapOvr>
+    <a:masterClrMapping/>
+  </p:clrMapOvr>
+</p:sld>
+</file>
+
+<file path=ppt/slides/slide7.xml><?xml version="1.0" encoding="utf-8"?>
+<p:sld xmlns:a="http://schemas.openxmlformats.org/drawingml/2006/main" xmlns:r="http://schemas.openxmlformats.org/officeDocument/2006/relationships" xmlns:p="http://schemas.openxmlformats.org/presentationml/2006/main">
+  <p:cSld>
+    <p:spTree>
+      <p:nvGrpSpPr>
+        <p:cNvPr id="1" name=""/>
+        <p:cNvGrpSpPr/>
+        <p:nvPr/>
+      </p:nvGrpSpPr>
+      <p:grpSpPr>
+        <a:xfrm>
+          <a:off x="0" y="0"/>
+          <a:ext cx="0" cy="0"/>
+          <a:chOff x="0" y="0"/>
+          <a:chExt cx="0" cy="0"/>
+        </a:xfrm>
+      </p:grpSpPr>
+      <p:sp>
+        <p:nvSpPr>
+          <p:cNvPr id="5" name="สี่เหลี่ยมผืนผ้า 4"/>
+          <p:cNvSpPr/>
+          <p:nvPr/>
+        </p:nvSpPr>
+        <p:spPr>
+          <a:xfrm>
+            <a:off x="205648" y="109224"/>
+            <a:ext cx="6096000" cy="3046988"/>
+          </a:xfrm>
+          <a:prstGeom prst="rect">
+            <a:avLst/>
+          </a:prstGeom>
+        </p:spPr>
+        <p:txBody>
+          <a:bodyPr>
+            <a:spAutoFit/>
+          </a:bodyPr>
+          <a:lstStyle/>
+          <a:p>
+            <a:r>
+              <a:rPr lang="en-US" sz="1200" b="0" dirty="0" smtClean="0">
+                <a:solidFill>
+                  <a:srgbClr val="569CD6"/>
+                </a:solidFill>
+                <a:effectLst/>
+                <a:latin typeface="Consolas" panose="020B0609020204030204" pitchFamily="49" charset="0"/>
+              </a:rPr>
+              <a:t>#server.js</a:t>
+            </a:r>
+          </a:p>
+          <a:p>
+            <a:r>
+              <a:rPr lang="en-US" sz="1200" b="0" dirty="0" err="1" smtClean="0">
+                <a:solidFill>
+                  <a:srgbClr val="569CD6"/>
+                </a:solidFill>
+                <a:effectLst/>
+                <a:latin typeface="Consolas" panose="020B0609020204030204" pitchFamily="49" charset="0"/>
+              </a:rPr>
+              <a:t>const</a:t>
+            </a:r>
+            <a:r>
+              <a:rPr lang="en-US" sz="1200" b="0" dirty="0" smtClean="0">
+                <a:solidFill>
+                  <a:srgbClr val="D4D4D4"/>
+                </a:solidFill>
+                <a:effectLst/>
+                <a:latin typeface="Consolas" panose="020B0609020204030204" pitchFamily="49" charset="0"/>
+              </a:rPr>
+              <a:t> </a:t>
+            </a:r>
+            <a:r>
+              <a:rPr lang="en-US" sz="1200" b="0" dirty="0" smtClean="0">
+                <a:solidFill>
+                  <a:srgbClr val="9CDCFE"/>
+                </a:solidFill>
+                <a:effectLst/>
+                <a:latin typeface="Consolas" panose="020B0609020204030204" pitchFamily="49" charset="0"/>
+              </a:rPr>
+              <a:t>server</a:t>
+            </a:r>
+            <a:r>
+              <a:rPr lang="en-US" sz="1200" b="0" dirty="0" smtClean="0">
+                <a:solidFill>
+                  <a:srgbClr val="D4D4D4"/>
+                </a:solidFill>
+                <a:effectLst/>
+                <a:latin typeface="Consolas" panose="020B0609020204030204" pitchFamily="49" charset="0"/>
+              </a:rPr>
+              <a:t> = </a:t>
+            </a:r>
+            <a:r>
+              <a:rPr lang="en-US" sz="1200" b="0" dirty="0" smtClean="0">
+                <a:solidFill>
+                  <a:srgbClr val="DCDCAA"/>
+                </a:solidFill>
+                <a:effectLst/>
+                <a:latin typeface="Consolas" panose="020B0609020204030204" pitchFamily="49" charset="0"/>
+              </a:rPr>
+              <a:t>require</a:t>
+            </a:r>
+            <a:r>
+              <a:rPr lang="en-US" sz="1200" b="0" dirty="0" smtClean="0">
+                <a:solidFill>
+                  <a:srgbClr val="D4D4D4"/>
+                </a:solidFill>
+                <a:effectLst/>
+                <a:latin typeface="Consolas" panose="020B0609020204030204" pitchFamily="49" charset="0"/>
+              </a:rPr>
+              <a:t>(</a:t>
+            </a:r>
+            <a:r>
+              <a:rPr lang="en-US" sz="1200" b="0" dirty="0" smtClean="0">
+                <a:solidFill>
+                  <a:srgbClr val="CE9178"/>
+                </a:solidFill>
+                <a:effectLst/>
+                <a:latin typeface="Consolas" panose="020B0609020204030204" pitchFamily="49" charset="0"/>
+              </a:rPr>
+              <a:t>"http"</a:t>
+            </a:r>
+            <a:r>
+              <a:rPr lang="en-US" sz="1200" b="0" dirty="0" smtClean="0">
+                <a:solidFill>
+                  <a:srgbClr val="D4D4D4"/>
+                </a:solidFill>
+                <a:effectLst/>
+                <a:latin typeface="Consolas" panose="020B0609020204030204" pitchFamily="49" charset="0"/>
+              </a:rPr>
+              <a:t>).</a:t>
+            </a:r>
+            <a:r>
+              <a:rPr lang="en-US" sz="1200" b="0" dirty="0" err="1" smtClean="0">
+                <a:solidFill>
+                  <a:srgbClr val="DCDCAA"/>
+                </a:solidFill>
+                <a:effectLst/>
+                <a:latin typeface="Consolas" panose="020B0609020204030204" pitchFamily="49" charset="0"/>
+              </a:rPr>
+              <a:t>createServer</a:t>
+            </a:r>
+            <a:r>
+              <a:rPr lang="en-US" sz="1200" b="0" dirty="0" smtClean="0">
+                <a:solidFill>
+                  <a:srgbClr val="D4D4D4"/>
+                </a:solidFill>
+                <a:effectLst/>
+                <a:latin typeface="Consolas" panose="020B0609020204030204" pitchFamily="49" charset="0"/>
+              </a:rPr>
+              <a:t>();</a:t>
+            </a:r>
+          </a:p>
+          <a:p>
+            <a:r>
+              <a:rPr lang="en-US" sz="1200" b="0" dirty="0" err="1" smtClean="0">
+                <a:solidFill>
+                  <a:srgbClr val="569CD6"/>
+                </a:solidFill>
+                <a:effectLst/>
+                <a:latin typeface="Consolas" panose="020B0609020204030204" pitchFamily="49" charset="0"/>
+              </a:rPr>
+              <a:t>const</a:t>
+            </a:r>
+            <a:r>
+              <a:rPr lang="en-US" sz="1200" b="0" dirty="0" smtClean="0">
+                <a:solidFill>
+                  <a:srgbClr val="D4D4D4"/>
+                </a:solidFill>
+                <a:effectLst/>
+                <a:latin typeface="Consolas" panose="020B0609020204030204" pitchFamily="49" charset="0"/>
+              </a:rPr>
+              <a:t> </a:t>
+            </a:r>
+            <a:r>
+              <a:rPr lang="en-US" sz="1200" b="0" dirty="0" err="1" smtClean="0">
+                <a:solidFill>
+                  <a:srgbClr val="9CDCFE"/>
+                </a:solidFill>
+                <a:effectLst/>
+                <a:latin typeface="Consolas" panose="020B0609020204030204" pitchFamily="49" charset="0"/>
+              </a:rPr>
+              <a:t>io</a:t>
+            </a:r>
+            <a:r>
+              <a:rPr lang="en-US" sz="1200" b="0" dirty="0" smtClean="0">
+                <a:solidFill>
+                  <a:srgbClr val="D4D4D4"/>
+                </a:solidFill>
+                <a:effectLst/>
+                <a:latin typeface="Consolas" panose="020B0609020204030204" pitchFamily="49" charset="0"/>
+              </a:rPr>
+              <a:t> = </a:t>
+            </a:r>
+            <a:r>
+              <a:rPr lang="en-US" sz="1200" b="0" dirty="0" smtClean="0">
+                <a:solidFill>
+                  <a:srgbClr val="DCDCAA"/>
+                </a:solidFill>
+                <a:effectLst/>
+                <a:latin typeface="Consolas" panose="020B0609020204030204" pitchFamily="49" charset="0"/>
+              </a:rPr>
+              <a:t>require</a:t>
+            </a:r>
+            <a:r>
+              <a:rPr lang="en-US" sz="1200" b="0" dirty="0" smtClean="0">
+                <a:solidFill>
+                  <a:srgbClr val="D4D4D4"/>
+                </a:solidFill>
+                <a:effectLst/>
+                <a:latin typeface="Consolas" panose="020B0609020204030204" pitchFamily="49" charset="0"/>
+              </a:rPr>
+              <a:t>(</a:t>
+            </a:r>
+            <a:r>
+              <a:rPr lang="en-US" sz="1200" b="0" dirty="0" smtClean="0">
+                <a:solidFill>
+                  <a:srgbClr val="CE9178"/>
+                </a:solidFill>
+                <a:effectLst/>
+                <a:latin typeface="Consolas" panose="020B0609020204030204" pitchFamily="49" charset="0"/>
+              </a:rPr>
+              <a:t>"socket.io"</a:t>
+            </a:r>
+            <a:r>
+              <a:rPr lang="en-US" sz="1200" b="0" dirty="0" smtClean="0">
+                <a:solidFill>
+                  <a:srgbClr val="D4D4D4"/>
+                </a:solidFill>
+                <a:effectLst/>
+                <a:latin typeface="Consolas" panose="020B0609020204030204" pitchFamily="49" charset="0"/>
+              </a:rPr>
+              <a:t>)(</a:t>
+            </a:r>
+            <a:r>
+              <a:rPr lang="en-US" sz="1200" b="0" dirty="0" smtClean="0">
+                <a:solidFill>
+                  <a:srgbClr val="9CDCFE"/>
+                </a:solidFill>
+                <a:effectLst/>
+                <a:latin typeface="Consolas" panose="020B0609020204030204" pitchFamily="49" charset="0"/>
+              </a:rPr>
+              <a:t>server</a:t>
+            </a:r>
+            <a:r>
+              <a:rPr lang="en-US" sz="1200" b="0" dirty="0" smtClean="0">
+                <a:solidFill>
+                  <a:srgbClr val="D4D4D4"/>
+                </a:solidFill>
+                <a:effectLst/>
+                <a:latin typeface="Consolas" panose="020B0609020204030204" pitchFamily="49" charset="0"/>
+              </a:rPr>
+              <a:t>);</a:t>
+            </a:r>
+          </a:p>
+          <a:p>
+            <a:r>
+              <a:rPr lang="en-US" sz="1200" b="0" dirty="0" smtClean="0">
+                <a:solidFill>
+                  <a:srgbClr val="D4D4D4"/>
+                </a:solidFill>
+                <a:effectLst/>
+                <a:latin typeface="Consolas" panose="020B0609020204030204" pitchFamily="49" charset="0"/>
+              </a:rPr>
+              <a:t/>
+            </a:r>
+            <a:br>
+              <a:rPr lang="en-US" sz="1200" b="0" dirty="0" smtClean="0">
+                <a:solidFill>
+                  <a:srgbClr val="D4D4D4"/>
+                </a:solidFill>
+                <a:effectLst/>
+                <a:latin typeface="Consolas" panose="020B0609020204030204" pitchFamily="49" charset="0"/>
+              </a:rPr>
+            </a:br>
+            <a:r>
+              <a:rPr lang="en-US" sz="1200" b="0" dirty="0" err="1" smtClean="0">
+                <a:solidFill>
+                  <a:srgbClr val="9CDCFE"/>
+                </a:solidFill>
+                <a:effectLst/>
+                <a:latin typeface="Consolas" panose="020B0609020204030204" pitchFamily="49" charset="0"/>
+              </a:rPr>
+              <a:t>io</a:t>
+            </a:r>
+            <a:r>
+              <a:rPr lang="en-US" sz="1200" b="0" dirty="0" err="1" smtClean="0">
+                <a:solidFill>
+                  <a:srgbClr val="D4D4D4"/>
+                </a:solidFill>
+                <a:effectLst/>
+                <a:latin typeface="Consolas" panose="020B0609020204030204" pitchFamily="49" charset="0"/>
+              </a:rPr>
+              <a:t>.</a:t>
+            </a:r>
+            <a:r>
+              <a:rPr lang="en-US" sz="1200" b="0" dirty="0" err="1" smtClean="0">
+                <a:solidFill>
+                  <a:srgbClr val="DCDCAA"/>
+                </a:solidFill>
+                <a:effectLst/>
+                <a:latin typeface="Consolas" panose="020B0609020204030204" pitchFamily="49" charset="0"/>
+              </a:rPr>
+              <a:t>on</a:t>
+            </a:r>
+            <a:r>
+              <a:rPr lang="en-US" sz="1200" b="0" dirty="0" smtClean="0">
+                <a:solidFill>
+                  <a:srgbClr val="D4D4D4"/>
+                </a:solidFill>
+                <a:effectLst/>
+                <a:latin typeface="Consolas" panose="020B0609020204030204" pitchFamily="49" charset="0"/>
+              </a:rPr>
+              <a:t>(</a:t>
+            </a:r>
+            <a:r>
+              <a:rPr lang="en-US" sz="1200" b="0" dirty="0" smtClean="0">
+                <a:solidFill>
+                  <a:srgbClr val="CE9178"/>
+                </a:solidFill>
+                <a:effectLst/>
+                <a:latin typeface="Consolas" panose="020B0609020204030204" pitchFamily="49" charset="0"/>
+              </a:rPr>
+              <a:t>"connection"</a:t>
+            </a:r>
+            <a:r>
+              <a:rPr lang="en-US" sz="1200" b="0" dirty="0" smtClean="0">
+                <a:solidFill>
+                  <a:srgbClr val="D4D4D4"/>
+                </a:solidFill>
+                <a:effectLst/>
+                <a:latin typeface="Consolas" panose="020B0609020204030204" pitchFamily="49" charset="0"/>
+              </a:rPr>
+              <a:t>, </a:t>
+            </a:r>
+            <a:r>
+              <a:rPr lang="en-US" sz="1200" b="0" dirty="0" smtClean="0">
+                <a:solidFill>
+                  <a:srgbClr val="569CD6"/>
+                </a:solidFill>
+                <a:effectLst/>
+                <a:latin typeface="Consolas" panose="020B0609020204030204" pitchFamily="49" charset="0"/>
+              </a:rPr>
+              <a:t>function</a:t>
+            </a:r>
+            <a:r>
+              <a:rPr lang="en-US" sz="1200" b="0" dirty="0" smtClean="0">
+                <a:solidFill>
+                  <a:srgbClr val="D4D4D4"/>
+                </a:solidFill>
+                <a:effectLst/>
+                <a:latin typeface="Consolas" panose="020B0609020204030204" pitchFamily="49" charset="0"/>
+              </a:rPr>
+              <a:t>(</a:t>
+            </a:r>
+            <a:r>
+              <a:rPr lang="en-US" sz="1200" b="0" dirty="0" smtClean="0">
+                <a:solidFill>
+                  <a:srgbClr val="9CDCFE"/>
+                </a:solidFill>
+                <a:effectLst/>
+                <a:latin typeface="Consolas" panose="020B0609020204030204" pitchFamily="49" charset="0"/>
+              </a:rPr>
+              <a:t>socket</a:t>
+            </a:r>
+            <a:r>
+              <a:rPr lang="en-US" sz="1200" b="0" dirty="0" smtClean="0">
+                <a:solidFill>
+                  <a:srgbClr val="D4D4D4"/>
+                </a:solidFill>
+                <a:effectLst/>
+                <a:latin typeface="Consolas" panose="020B0609020204030204" pitchFamily="49" charset="0"/>
+              </a:rPr>
+              <a:t>){</a:t>
+            </a:r>
+          </a:p>
+          <a:p>
+            <a:r>
+              <a:rPr lang="en-US" sz="1200" b="0" dirty="0" err="1" smtClean="0">
+                <a:solidFill>
+                  <a:srgbClr val="9CDCFE"/>
+                </a:solidFill>
+                <a:effectLst/>
+                <a:latin typeface="Consolas" panose="020B0609020204030204" pitchFamily="49" charset="0"/>
+              </a:rPr>
+              <a:t>socket</a:t>
+            </a:r>
+            <a:r>
+              <a:rPr lang="en-US" sz="1200" b="0" dirty="0" err="1" smtClean="0">
+                <a:solidFill>
+                  <a:srgbClr val="D4D4D4"/>
+                </a:solidFill>
+                <a:effectLst/>
+                <a:latin typeface="Consolas" panose="020B0609020204030204" pitchFamily="49" charset="0"/>
+              </a:rPr>
+              <a:t>.</a:t>
+            </a:r>
+            <a:r>
+              <a:rPr lang="en-US" sz="1200" b="0" dirty="0" err="1" smtClean="0">
+                <a:solidFill>
+                  <a:srgbClr val="DCDCAA"/>
+                </a:solidFill>
+                <a:effectLst/>
+                <a:latin typeface="Consolas" panose="020B0609020204030204" pitchFamily="49" charset="0"/>
+              </a:rPr>
+              <a:t>on</a:t>
+            </a:r>
+            <a:r>
+              <a:rPr lang="en-US" sz="1200" b="0" dirty="0" smtClean="0">
+                <a:solidFill>
+                  <a:srgbClr val="D4D4D4"/>
+                </a:solidFill>
+                <a:effectLst/>
+                <a:latin typeface="Consolas" panose="020B0609020204030204" pitchFamily="49" charset="0"/>
+              </a:rPr>
+              <a:t>(</a:t>
+            </a:r>
+            <a:r>
+              <a:rPr lang="en-US" sz="1200" b="0" dirty="0" smtClean="0">
+                <a:solidFill>
+                  <a:srgbClr val="CE9178"/>
+                </a:solidFill>
+                <a:effectLst/>
+                <a:latin typeface="Consolas" panose="020B0609020204030204" pitchFamily="49" charset="0"/>
+              </a:rPr>
+              <a:t>"emit"</a:t>
+            </a:r>
+            <a:r>
+              <a:rPr lang="en-US" sz="1200" b="0" dirty="0" smtClean="0">
+                <a:solidFill>
+                  <a:srgbClr val="D4D4D4"/>
+                </a:solidFill>
+                <a:effectLst/>
+                <a:latin typeface="Consolas" panose="020B0609020204030204" pitchFamily="49" charset="0"/>
+              </a:rPr>
+              <a:t>, </a:t>
+            </a:r>
+            <a:r>
+              <a:rPr lang="en-US" sz="1200" b="0" dirty="0" smtClean="0">
+                <a:solidFill>
+                  <a:srgbClr val="569CD6"/>
+                </a:solidFill>
+                <a:effectLst/>
+                <a:latin typeface="Consolas" panose="020B0609020204030204" pitchFamily="49" charset="0"/>
+              </a:rPr>
+              <a:t>function</a:t>
+            </a:r>
+            <a:r>
+              <a:rPr lang="en-US" sz="1200" b="0" dirty="0" smtClean="0">
+                <a:solidFill>
+                  <a:srgbClr val="D4D4D4"/>
+                </a:solidFill>
+                <a:effectLst/>
+                <a:latin typeface="Consolas" panose="020B0609020204030204" pitchFamily="49" charset="0"/>
+              </a:rPr>
+              <a:t>(</a:t>
+            </a:r>
+            <a:r>
+              <a:rPr lang="en-US" sz="1200" b="0" dirty="0" smtClean="0">
+                <a:solidFill>
+                  <a:srgbClr val="9CDCFE"/>
+                </a:solidFill>
+                <a:effectLst/>
+                <a:latin typeface="Consolas" panose="020B0609020204030204" pitchFamily="49" charset="0"/>
+              </a:rPr>
+              <a:t>Data</a:t>
+            </a:r>
+            <a:r>
+              <a:rPr lang="en-US" sz="1200" b="0" dirty="0" smtClean="0">
+                <a:solidFill>
+                  <a:srgbClr val="D4D4D4"/>
+                </a:solidFill>
+                <a:effectLst/>
+                <a:latin typeface="Consolas" panose="020B0609020204030204" pitchFamily="49" charset="0"/>
+              </a:rPr>
+              <a:t>){</a:t>
+            </a:r>
+          </a:p>
+          <a:p>
+            <a:r>
+              <a:rPr lang="en-US" sz="1200" b="0" dirty="0" smtClean="0">
+                <a:solidFill>
+                  <a:srgbClr val="6A9955"/>
+                </a:solidFill>
+                <a:effectLst/>
+                <a:latin typeface="Consolas" panose="020B0609020204030204" pitchFamily="49" charset="0"/>
+              </a:rPr>
+              <a:t>// console.log("Receive Data");</a:t>
+            </a:r>
+            <a:endParaRPr lang="en-US" sz="1200" b="0" dirty="0" smtClean="0">
+              <a:solidFill>
+                <a:srgbClr val="D4D4D4"/>
+              </a:solidFill>
+              <a:effectLst/>
+              <a:latin typeface="Consolas" panose="020B0609020204030204" pitchFamily="49" charset="0"/>
+            </a:endParaRPr>
+          </a:p>
+          <a:p>
+            <a:r>
+              <a:rPr lang="en-US" sz="1200" b="0" dirty="0" smtClean="0">
+                <a:solidFill>
+                  <a:srgbClr val="4EC9B0"/>
+                </a:solidFill>
+                <a:effectLst/>
+                <a:latin typeface="Consolas" panose="020B0609020204030204" pitchFamily="49" charset="0"/>
+              </a:rPr>
+              <a:t>console</a:t>
+            </a:r>
+            <a:r>
+              <a:rPr lang="en-US" sz="1200" b="0" dirty="0" smtClean="0">
+                <a:solidFill>
+                  <a:srgbClr val="D4D4D4"/>
+                </a:solidFill>
+                <a:effectLst/>
+                <a:latin typeface="Consolas" panose="020B0609020204030204" pitchFamily="49" charset="0"/>
+              </a:rPr>
+              <a:t>.</a:t>
+            </a:r>
+            <a:r>
+              <a:rPr lang="en-US" sz="1200" b="0" dirty="0" smtClean="0">
+                <a:solidFill>
+                  <a:srgbClr val="DCDCAA"/>
+                </a:solidFill>
+                <a:effectLst/>
+                <a:latin typeface="Consolas" panose="020B0609020204030204" pitchFamily="49" charset="0"/>
+              </a:rPr>
+              <a:t>log</a:t>
+            </a:r>
+            <a:r>
+              <a:rPr lang="en-US" sz="1200" b="0" dirty="0" smtClean="0">
+                <a:solidFill>
+                  <a:srgbClr val="D4D4D4"/>
+                </a:solidFill>
+                <a:effectLst/>
+                <a:latin typeface="Consolas" panose="020B0609020204030204" pitchFamily="49" charset="0"/>
+              </a:rPr>
+              <a:t>(</a:t>
+            </a:r>
+            <a:r>
+              <a:rPr lang="en-US" sz="1200" b="0" dirty="0" smtClean="0">
+                <a:solidFill>
+                  <a:srgbClr val="9CDCFE"/>
+                </a:solidFill>
+                <a:effectLst/>
+                <a:latin typeface="Consolas" panose="020B0609020204030204" pitchFamily="49" charset="0"/>
+              </a:rPr>
+              <a:t>Data</a:t>
+            </a:r>
+            <a:r>
+              <a:rPr lang="en-US" sz="1200" b="0" dirty="0" smtClean="0">
+                <a:solidFill>
+                  <a:srgbClr val="D4D4D4"/>
+                </a:solidFill>
+                <a:effectLst/>
+                <a:latin typeface="Consolas" panose="020B0609020204030204" pitchFamily="49" charset="0"/>
+              </a:rPr>
+              <a:t>);</a:t>
+            </a:r>
+          </a:p>
+          <a:p>
+            <a:r>
+              <a:rPr lang="en-US" sz="1200" b="0" dirty="0" err="1" smtClean="0">
+                <a:solidFill>
+                  <a:srgbClr val="9CDCFE"/>
+                </a:solidFill>
+                <a:effectLst/>
+                <a:latin typeface="Consolas" panose="020B0609020204030204" pitchFamily="49" charset="0"/>
+              </a:rPr>
+              <a:t>socket</a:t>
+            </a:r>
+            <a:r>
+              <a:rPr lang="en-US" sz="1200" b="0" dirty="0" err="1" smtClean="0">
+                <a:solidFill>
+                  <a:srgbClr val="D4D4D4"/>
+                </a:solidFill>
+                <a:effectLst/>
+                <a:latin typeface="Consolas" panose="020B0609020204030204" pitchFamily="49" charset="0"/>
+              </a:rPr>
+              <a:t>.</a:t>
+            </a:r>
+            <a:r>
+              <a:rPr lang="en-US" sz="1200" b="0" dirty="0" err="1" smtClean="0">
+                <a:solidFill>
+                  <a:srgbClr val="9CDCFE"/>
+                </a:solidFill>
+                <a:effectLst/>
+                <a:latin typeface="Consolas" panose="020B0609020204030204" pitchFamily="49" charset="0"/>
+              </a:rPr>
+              <a:t>broadcast</a:t>
+            </a:r>
+            <a:r>
+              <a:rPr lang="en-US" sz="1200" b="0" dirty="0" err="1" smtClean="0">
+                <a:solidFill>
+                  <a:srgbClr val="D4D4D4"/>
+                </a:solidFill>
+                <a:effectLst/>
+                <a:latin typeface="Consolas" panose="020B0609020204030204" pitchFamily="49" charset="0"/>
+              </a:rPr>
+              <a:t>.</a:t>
+            </a:r>
+            <a:r>
+              <a:rPr lang="en-US" sz="1200" b="0" dirty="0" err="1" smtClean="0">
+                <a:solidFill>
+                  <a:srgbClr val="DCDCAA"/>
+                </a:solidFill>
+                <a:effectLst/>
+                <a:latin typeface="Consolas" panose="020B0609020204030204" pitchFamily="49" charset="0"/>
+              </a:rPr>
+              <a:t>emit</a:t>
+            </a:r>
+            <a:r>
+              <a:rPr lang="en-US" sz="1200" b="0" dirty="0" smtClean="0">
+                <a:solidFill>
+                  <a:srgbClr val="D4D4D4"/>
+                </a:solidFill>
+                <a:effectLst/>
+                <a:latin typeface="Consolas" panose="020B0609020204030204" pitchFamily="49" charset="0"/>
+              </a:rPr>
+              <a:t>(</a:t>
+            </a:r>
+            <a:r>
+              <a:rPr lang="en-US" sz="1200" b="0" dirty="0" smtClean="0">
+                <a:solidFill>
+                  <a:srgbClr val="CE9178"/>
+                </a:solidFill>
+                <a:effectLst/>
+                <a:latin typeface="Consolas" panose="020B0609020204030204" pitchFamily="49" charset="0"/>
+              </a:rPr>
+              <a:t>"count"</a:t>
+            </a:r>
+            <a:r>
+              <a:rPr lang="en-US" sz="1200" b="0" dirty="0" smtClean="0">
+                <a:solidFill>
+                  <a:srgbClr val="D4D4D4"/>
+                </a:solidFill>
+                <a:effectLst/>
+                <a:latin typeface="Consolas" panose="020B0609020204030204" pitchFamily="49" charset="0"/>
+              </a:rPr>
+              <a:t>, {</a:t>
+            </a:r>
+            <a:r>
+              <a:rPr lang="en-US" sz="1200" b="0" dirty="0" err="1" smtClean="0">
+                <a:solidFill>
+                  <a:srgbClr val="9CDCFE"/>
+                </a:solidFill>
+                <a:effectLst/>
+                <a:latin typeface="Consolas" panose="020B0609020204030204" pitchFamily="49" charset="0"/>
+              </a:rPr>
+              <a:t>count:Data</a:t>
+            </a:r>
+            <a:r>
+              <a:rPr lang="en-US" sz="1200" b="0" dirty="0" err="1" smtClean="0">
+                <a:solidFill>
+                  <a:srgbClr val="D4D4D4"/>
+                </a:solidFill>
+                <a:effectLst/>
+                <a:latin typeface="Consolas" panose="020B0609020204030204" pitchFamily="49" charset="0"/>
+              </a:rPr>
+              <a:t>.</a:t>
+            </a:r>
+            <a:r>
+              <a:rPr lang="en-US" sz="1200" b="0" dirty="0" err="1" smtClean="0">
+                <a:solidFill>
+                  <a:srgbClr val="9CDCFE"/>
+                </a:solidFill>
+                <a:effectLst/>
+                <a:latin typeface="Consolas" panose="020B0609020204030204" pitchFamily="49" charset="0"/>
+              </a:rPr>
+              <a:t>count</a:t>
+            </a:r>
+            <a:r>
+              <a:rPr lang="en-US" sz="1200" b="0" dirty="0" smtClean="0">
+                <a:solidFill>
+                  <a:srgbClr val="D4D4D4"/>
+                </a:solidFill>
+                <a:effectLst/>
+                <a:latin typeface="Consolas" panose="020B0609020204030204" pitchFamily="49" charset="0"/>
+              </a:rPr>
+              <a:t>});</a:t>
+            </a:r>
+          </a:p>
+          <a:p>
+            <a:r>
+              <a:rPr lang="en-US" sz="1200" b="0" dirty="0" smtClean="0">
+                <a:solidFill>
+                  <a:srgbClr val="D4D4D4"/>
+                </a:solidFill>
+                <a:effectLst/>
+                <a:latin typeface="Consolas" panose="020B0609020204030204" pitchFamily="49" charset="0"/>
+              </a:rPr>
+              <a:t>});</a:t>
+            </a:r>
+          </a:p>
+          <a:p>
+            <a:r>
+              <a:rPr lang="en-US" sz="1200" b="0" dirty="0" smtClean="0">
+                <a:solidFill>
+                  <a:srgbClr val="D4D4D4"/>
+                </a:solidFill>
+                <a:effectLst/>
+                <a:latin typeface="Consolas" panose="020B0609020204030204" pitchFamily="49" charset="0"/>
+              </a:rPr>
+              <a:t>});</a:t>
+            </a:r>
+          </a:p>
+          <a:p>
+            <a:r>
+              <a:rPr lang="en-US" sz="1200" b="0" dirty="0" smtClean="0">
+                <a:solidFill>
+                  <a:srgbClr val="D4D4D4"/>
+                </a:solidFill>
+                <a:effectLst/>
+                <a:latin typeface="Consolas" panose="020B0609020204030204" pitchFamily="49" charset="0"/>
+              </a:rPr>
+              <a:t/>
+            </a:r>
+            <a:br>
+              <a:rPr lang="en-US" sz="1200" b="0" dirty="0" smtClean="0">
+                <a:solidFill>
+                  <a:srgbClr val="D4D4D4"/>
+                </a:solidFill>
+                <a:effectLst/>
+                <a:latin typeface="Consolas" panose="020B0609020204030204" pitchFamily="49" charset="0"/>
+              </a:rPr>
+            </a:br>
+            <a:r>
+              <a:rPr lang="en-US" sz="1200" b="0" dirty="0" err="1" smtClean="0">
+                <a:solidFill>
+                  <a:srgbClr val="9CDCFE"/>
+                </a:solidFill>
+                <a:effectLst/>
+                <a:latin typeface="Consolas" panose="020B0609020204030204" pitchFamily="49" charset="0"/>
+              </a:rPr>
+              <a:t>server</a:t>
+            </a:r>
+            <a:r>
+              <a:rPr lang="en-US" sz="1200" b="0" dirty="0" err="1" smtClean="0">
+                <a:solidFill>
+                  <a:srgbClr val="D4D4D4"/>
+                </a:solidFill>
+                <a:effectLst/>
+                <a:latin typeface="Consolas" panose="020B0609020204030204" pitchFamily="49" charset="0"/>
+              </a:rPr>
+              <a:t>.</a:t>
+            </a:r>
+            <a:r>
+              <a:rPr lang="en-US" sz="1200" b="0" dirty="0" err="1" smtClean="0">
+                <a:solidFill>
+                  <a:srgbClr val="DCDCAA"/>
+                </a:solidFill>
+                <a:effectLst/>
+                <a:latin typeface="Consolas" panose="020B0609020204030204" pitchFamily="49" charset="0"/>
+              </a:rPr>
+              <a:t>listen</a:t>
+            </a:r>
+            <a:r>
+              <a:rPr lang="en-US" sz="1200" b="0" dirty="0" smtClean="0">
+                <a:solidFill>
+                  <a:srgbClr val="D4D4D4"/>
+                </a:solidFill>
+                <a:effectLst/>
+                <a:latin typeface="Consolas" panose="020B0609020204030204" pitchFamily="49" charset="0"/>
+              </a:rPr>
+              <a:t>(</a:t>
+            </a:r>
+            <a:r>
+              <a:rPr lang="en-US" sz="1200" b="0" dirty="0" smtClean="0">
+                <a:solidFill>
+                  <a:srgbClr val="B5CEA8"/>
+                </a:solidFill>
+                <a:effectLst/>
+                <a:latin typeface="Consolas" panose="020B0609020204030204" pitchFamily="49" charset="0"/>
+              </a:rPr>
+              <a:t>8080</a:t>
+            </a:r>
+            <a:r>
+              <a:rPr lang="en-US" sz="1200" b="0" dirty="0" smtClean="0">
+                <a:solidFill>
+                  <a:srgbClr val="D4D4D4"/>
+                </a:solidFill>
+                <a:effectLst/>
+                <a:latin typeface="Consolas" panose="020B0609020204030204" pitchFamily="49" charset="0"/>
+              </a:rPr>
+              <a:t>, </a:t>
+            </a:r>
+            <a:r>
+              <a:rPr lang="en-US" sz="1200" b="0" dirty="0" smtClean="0">
+                <a:solidFill>
+                  <a:srgbClr val="569CD6"/>
+                </a:solidFill>
+                <a:effectLst/>
+                <a:latin typeface="Consolas" panose="020B0609020204030204" pitchFamily="49" charset="0"/>
+              </a:rPr>
+              <a:t>function</a:t>
+            </a:r>
+            <a:r>
+              <a:rPr lang="en-US" sz="1200" b="0" dirty="0" smtClean="0">
+                <a:solidFill>
+                  <a:srgbClr val="D4D4D4"/>
+                </a:solidFill>
+                <a:effectLst/>
+                <a:latin typeface="Consolas" panose="020B0609020204030204" pitchFamily="49" charset="0"/>
+              </a:rPr>
+              <a:t>(</a:t>
+            </a:r>
+            <a:r>
+              <a:rPr lang="en-US" sz="1200" b="0" dirty="0" smtClean="0">
+                <a:solidFill>
+                  <a:srgbClr val="9CDCFE"/>
+                </a:solidFill>
+                <a:effectLst/>
+                <a:latin typeface="Consolas" panose="020B0609020204030204" pitchFamily="49" charset="0"/>
+              </a:rPr>
+              <a:t>err</a:t>
+            </a:r>
+            <a:r>
+              <a:rPr lang="en-US" sz="1200" b="0" dirty="0" smtClean="0">
+                <a:solidFill>
+                  <a:srgbClr val="D4D4D4"/>
+                </a:solidFill>
+                <a:effectLst/>
+                <a:latin typeface="Consolas" panose="020B0609020204030204" pitchFamily="49" charset="0"/>
+              </a:rPr>
+              <a:t>) {</a:t>
+            </a:r>
+          </a:p>
+          <a:p>
+            <a:r>
+              <a:rPr lang="en-US" sz="1200" b="0" dirty="0" smtClean="0">
+                <a:solidFill>
+                  <a:srgbClr val="C586C0"/>
+                </a:solidFill>
+                <a:effectLst/>
+                <a:latin typeface="Consolas" panose="020B0609020204030204" pitchFamily="49" charset="0"/>
+              </a:rPr>
+              <a:t>if</a:t>
+            </a:r>
+            <a:r>
+              <a:rPr lang="en-US" sz="1200" b="0" dirty="0" smtClean="0">
+                <a:solidFill>
+                  <a:srgbClr val="D4D4D4"/>
+                </a:solidFill>
+                <a:effectLst/>
+                <a:latin typeface="Consolas" panose="020B0609020204030204" pitchFamily="49" charset="0"/>
+              </a:rPr>
+              <a:t> (</a:t>
+            </a:r>
+            <a:r>
+              <a:rPr lang="en-US" sz="1200" b="0" dirty="0" smtClean="0">
+                <a:solidFill>
+                  <a:srgbClr val="9CDCFE"/>
+                </a:solidFill>
+                <a:effectLst/>
+                <a:latin typeface="Consolas" panose="020B0609020204030204" pitchFamily="49" charset="0"/>
+              </a:rPr>
+              <a:t>err</a:t>
+            </a:r>
+            <a:r>
+              <a:rPr lang="en-US" sz="1200" b="0" dirty="0" smtClean="0">
+                <a:solidFill>
+                  <a:srgbClr val="D4D4D4"/>
+                </a:solidFill>
+                <a:effectLst/>
+                <a:latin typeface="Consolas" panose="020B0609020204030204" pitchFamily="49" charset="0"/>
+              </a:rPr>
+              <a:t>) </a:t>
+            </a:r>
+            <a:r>
+              <a:rPr lang="en-US" sz="1200" b="0" dirty="0" smtClean="0">
+                <a:solidFill>
+                  <a:srgbClr val="C586C0"/>
+                </a:solidFill>
+                <a:effectLst/>
+                <a:latin typeface="Consolas" panose="020B0609020204030204" pitchFamily="49" charset="0"/>
+              </a:rPr>
+              <a:t>throw</a:t>
+            </a:r>
+            <a:r>
+              <a:rPr lang="en-US" sz="1200" b="0" dirty="0" smtClean="0">
+                <a:solidFill>
+                  <a:srgbClr val="D4D4D4"/>
+                </a:solidFill>
+                <a:effectLst/>
+                <a:latin typeface="Consolas" panose="020B0609020204030204" pitchFamily="49" charset="0"/>
+              </a:rPr>
+              <a:t> </a:t>
+            </a:r>
+            <a:r>
+              <a:rPr lang="en-US" sz="1200" b="0" dirty="0" smtClean="0">
+                <a:solidFill>
+                  <a:srgbClr val="9CDCFE"/>
+                </a:solidFill>
+                <a:effectLst/>
+                <a:latin typeface="Consolas" panose="020B0609020204030204" pitchFamily="49" charset="0"/>
+              </a:rPr>
+              <a:t>err</a:t>
+            </a:r>
+            <a:r>
+              <a:rPr lang="en-US" sz="1200" b="0" dirty="0" smtClean="0">
+                <a:solidFill>
+                  <a:srgbClr val="D4D4D4"/>
+                </a:solidFill>
+                <a:effectLst/>
+                <a:latin typeface="Consolas" panose="020B0609020204030204" pitchFamily="49" charset="0"/>
+              </a:rPr>
+              <a:t>;</a:t>
+            </a:r>
+          </a:p>
+          <a:p>
+            <a:r>
+              <a:rPr lang="en-US" sz="1200" b="0" dirty="0" smtClean="0">
+                <a:solidFill>
+                  <a:srgbClr val="4EC9B0"/>
+                </a:solidFill>
+                <a:effectLst/>
+                <a:latin typeface="Consolas" panose="020B0609020204030204" pitchFamily="49" charset="0"/>
+              </a:rPr>
+              <a:t>console</a:t>
+            </a:r>
+            <a:r>
+              <a:rPr lang="en-US" sz="1200" b="0" dirty="0" smtClean="0">
+                <a:solidFill>
+                  <a:srgbClr val="D4D4D4"/>
+                </a:solidFill>
+                <a:effectLst/>
+                <a:latin typeface="Consolas" panose="020B0609020204030204" pitchFamily="49" charset="0"/>
+              </a:rPr>
+              <a:t>.</a:t>
+            </a:r>
+            <a:r>
+              <a:rPr lang="en-US" sz="1200" b="0" dirty="0" smtClean="0">
+                <a:solidFill>
+                  <a:srgbClr val="DCDCAA"/>
+                </a:solidFill>
+                <a:effectLst/>
+                <a:latin typeface="Consolas" panose="020B0609020204030204" pitchFamily="49" charset="0"/>
+              </a:rPr>
+              <a:t>log</a:t>
+            </a:r>
+            <a:r>
+              <a:rPr lang="en-US" sz="1200" b="0" dirty="0" smtClean="0">
+                <a:solidFill>
+                  <a:srgbClr val="D4D4D4"/>
+                </a:solidFill>
+                <a:effectLst/>
+                <a:latin typeface="Consolas" panose="020B0609020204030204" pitchFamily="49" charset="0"/>
+              </a:rPr>
+              <a:t>(</a:t>
+            </a:r>
+            <a:r>
+              <a:rPr lang="en-US" sz="1200" b="0" dirty="0" smtClean="0">
+                <a:solidFill>
+                  <a:srgbClr val="CE9178"/>
+                </a:solidFill>
+                <a:effectLst/>
+                <a:latin typeface="Consolas" panose="020B0609020204030204" pitchFamily="49" charset="0"/>
+              </a:rPr>
+              <a:t>"Server is listening to port 8080"</a:t>
+            </a:r>
+            <a:r>
+              <a:rPr lang="en-US" sz="1200" b="0" dirty="0" smtClean="0">
+                <a:solidFill>
+                  <a:srgbClr val="D4D4D4"/>
+                </a:solidFill>
+                <a:effectLst/>
+                <a:latin typeface="Consolas" panose="020B0609020204030204" pitchFamily="49" charset="0"/>
+              </a:rPr>
+              <a:t>)</a:t>
+            </a:r>
+          </a:p>
+          <a:p>
+            <a:r>
+              <a:rPr lang="en-US" sz="1200" b="0" dirty="0" smtClean="0">
+                <a:solidFill>
+                  <a:srgbClr val="D4D4D4"/>
+                </a:solidFill>
+                <a:effectLst/>
+                <a:latin typeface="Consolas" panose="020B0609020204030204" pitchFamily="49" charset="0"/>
+              </a:rPr>
+              <a:t>});</a:t>
+            </a:r>
+            <a:endParaRPr lang="en-US" sz="1200" b="0" dirty="0">
+              <a:solidFill>
+                <a:srgbClr val="D4D4D4"/>
+              </a:solidFill>
+              <a:effectLst/>
+              <a:latin typeface="Consolas" panose="020B0609020204030204" pitchFamily="49" charset="0"/>
+            </a:endParaRPr>
+          </a:p>
+        </p:txBody>
+      </p:sp>
+    </p:spTree>
+    <p:extLst>
+      <p:ext uri="{BB962C8B-B14F-4D97-AF65-F5344CB8AC3E}">
         <p14:creationId xmlns:p14="http://schemas.microsoft.com/office/powerpoint/2010/main" val="1835635178"/>
+      </p:ext>
+    </p:extLst>
+  </p:cSld>
+  <p:clrMapOvr>
+    <a:masterClrMapping/>
+  </p:clrMapOvr>
+</p:sld>
+</file>
+
+<file path=ppt/slides/slide8.xml><?xml version="1.0" encoding="utf-8"?>
+<p:sld xmlns:a="http://schemas.openxmlformats.org/drawingml/2006/main" xmlns:r="http://schemas.openxmlformats.org/officeDocument/2006/relationships" xmlns:p="http://schemas.openxmlformats.org/presentationml/2006/main">
+  <p:cSld>
+    <p:spTree>
+      <p:nvGrpSpPr>
+        <p:cNvPr id="1" name=""/>
+        <p:cNvGrpSpPr/>
+        <p:nvPr/>
+      </p:nvGrpSpPr>
+      <p:grpSpPr>
+        <a:xfrm>
+          <a:off x="0" y="0"/>
+          <a:ext cx="0" cy="0"/>
+          <a:chOff x="0" y="0"/>
+          <a:chExt cx="0" cy="0"/>
+        </a:xfrm>
+      </p:grpSpPr>
+      <p:sp>
+        <p:nvSpPr>
+          <p:cNvPr id="2" name="ชื่อเรื่อง 1"/>
+          <p:cNvSpPr>
+            <a:spLocks noGrp="1"/>
+          </p:cNvSpPr>
+          <p:nvPr>
+            <p:ph type="title"/>
+          </p:nvPr>
+        </p:nvSpPr>
+        <p:spPr>
+          <a:xfrm>
+            <a:off x="424542" y="180068"/>
+            <a:ext cx="10515600" cy="1325563"/>
+          </a:xfrm>
+        </p:spPr>
+        <p:txBody>
+          <a:bodyPr/>
+          <a:lstStyle/>
+          <a:p>
+            <a:r>
+              <a:rPr lang="th-TH" dirty="0" smtClean="0"/>
+              <a:t>ใช้ </a:t>
+            </a:r>
+            <a:r>
+              <a:rPr lang="en-US" dirty="0" smtClean="0"/>
+              <a:t>Arduino </a:t>
+            </a:r>
+            <a:r>
+              <a:rPr lang="th-TH" dirty="0" smtClean="0"/>
+              <a:t>เป็นตัว รับ-ส่ง</a:t>
+            </a:r>
+            <a:endParaRPr lang="en-US" dirty="0"/>
+          </a:p>
+        </p:txBody>
+      </p:sp>
+      <p:sp>
+        <p:nvSpPr>
+          <p:cNvPr id="4" name="สี่เหลี่ยมผืนผ้า 3"/>
+          <p:cNvSpPr/>
+          <p:nvPr/>
+        </p:nvSpPr>
+        <p:spPr>
+          <a:xfrm>
+            <a:off x="424542" y="1077686"/>
+            <a:ext cx="11669487" cy="646331"/>
+          </a:xfrm>
+          <a:prstGeom prst="rect">
+            <a:avLst/>
+          </a:prstGeom>
+        </p:spPr>
+        <p:txBody>
+          <a:bodyPr wrap="square">
+            <a:spAutoFit/>
+          </a:bodyPr>
+          <a:lstStyle/>
+          <a:p>
+            <a:pPr marL="342900" indent="-342900">
+              <a:buAutoNum type="arabicPeriod"/>
+            </a:pPr>
+            <a:r>
+              <a:rPr lang="th-TH" dirty="0" smtClean="0"/>
+              <a:t>ใช้</a:t>
+            </a:r>
+            <a:r>
+              <a:rPr lang="th-TH" dirty="0" err="1" smtClean="0"/>
+              <a:t>ไลบรา</a:t>
+            </a:r>
+            <a:r>
+              <a:rPr lang="th-TH" dirty="0" smtClean="0"/>
+              <a:t>รี่ในไฟล์เท่านั้น ร่วมกับ </a:t>
+            </a:r>
+            <a:r>
+              <a:rPr lang="en-US" dirty="0" smtClean="0"/>
+              <a:t>ESP8266</a:t>
+            </a:r>
+          </a:p>
+          <a:p>
+            <a:pPr marL="342900" indent="-342900">
+              <a:buAutoNum type="arabicPeriod"/>
+            </a:pPr>
+            <a:r>
+              <a:rPr lang="th-TH" dirty="0" smtClean="0"/>
+              <a:t>เปิด </a:t>
+            </a:r>
+            <a:r>
+              <a:rPr lang="en-US" dirty="0" smtClean="0"/>
+              <a:t>Python</a:t>
+            </a:r>
+            <a:r>
+              <a:rPr lang="th-TH" dirty="0" smtClean="0"/>
+              <a:t> </a:t>
+            </a:r>
+            <a:r>
+              <a:rPr lang="en-US" dirty="0" smtClean="0"/>
+              <a:t>Read </a:t>
+            </a:r>
+            <a:r>
+              <a:rPr lang="th-TH" dirty="0" smtClean="0"/>
+              <a:t>หรือ </a:t>
+            </a:r>
+            <a:r>
+              <a:rPr lang="en-US" dirty="0" smtClean="0"/>
+              <a:t>Monitor </a:t>
+            </a:r>
+            <a:r>
+              <a:rPr lang="th-TH" dirty="0" smtClean="0"/>
+              <a:t>ที่ฝั่ง </a:t>
+            </a:r>
+            <a:r>
+              <a:rPr lang="en-US" dirty="0" smtClean="0"/>
+              <a:t>Server </a:t>
+            </a:r>
+            <a:r>
+              <a:rPr lang="th-TH" dirty="0" smtClean="0"/>
+              <a:t>ไว้</a:t>
+            </a:r>
+            <a:r>
+              <a:rPr lang="en-US" dirty="0" smtClean="0"/>
+              <a:t> (Debug)</a:t>
+            </a:r>
+            <a:endParaRPr lang="en-US" dirty="0"/>
+          </a:p>
+        </p:txBody>
+      </p:sp>
+      <p:sp>
+        <p:nvSpPr>
+          <p:cNvPr id="5" name="สี่เหลี่ยมผืนผ้า 4"/>
+          <p:cNvSpPr/>
+          <p:nvPr/>
+        </p:nvSpPr>
+        <p:spPr>
+          <a:xfrm>
+            <a:off x="4365170" y="1924949"/>
+            <a:ext cx="2634343" cy="1634680"/>
+          </a:xfrm>
+          <a:prstGeom prst="rect">
+            <a:avLst/>
+          </a:prstGeom>
+        </p:spPr>
+        <p:style>
+          <a:lnRef idx="2">
+            <a:schemeClr val="accent1">
+              <a:shade val="50000"/>
+            </a:schemeClr>
+          </a:lnRef>
+          <a:fillRef idx="1">
+            <a:schemeClr val="accent1"/>
+          </a:fillRef>
+          <a:effectRef idx="0">
+            <a:schemeClr val="accent1"/>
+          </a:effectRef>
+          <a:fontRef idx="minor">
+            <a:schemeClr val="lt1"/>
+          </a:fontRef>
+        </p:style>
+        <p:txBody>
+          <a:bodyPr rtlCol="0" anchor="ctr"/>
+          <a:lstStyle/>
+          <a:p>
+            <a:r>
+              <a:rPr lang="en-US" sz="1400" dirty="0" smtClean="0"/>
+              <a:t>GCP</a:t>
+            </a:r>
+          </a:p>
+          <a:p>
+            <a:r>
+              <a:rPr lang="en-US" sz="1400" dirty="0" smtClean="0"/>
+              <a:t>Socket.IO </a:t>
+            </a:r>
+          </a:p>
+          <a:p>
+            <a:r>
+              <a:rPr lang="en-US" sz="1400" dirty="0" smtClean="0">
+                <a:solidFill>
+                  <a:srgbClr val="FF0000"/>
+                </a:solidFill>
+              </a:rPr>
+              <a:t>Server.js</a:t>
+            </a:r>
+          </a:p>
+          <a:p>
+            <a:r>
+              <a:rPr lang="en-US" sz="1400" dirty="0" smtClean="0"/>
+              <a:t>34.87.86.224:3001</a:t>
+            </a:r>
+          </a:p>
+          <a:p>
+            <a:r>
+              <a:rPr lang="en-US" sz="1400" dirty="0"/>
+              <a:t>Broadcast : </a:t>
+            </a:r>
+            <a:r>
+              <a:rPr lang="en-US" sz="1400" dirty="0" smtClean="0"/>
+              <a:t>count</a:t>
+            </a:r>
+          </a:p>
+          <a:p>
+            <a:r>
+              <a:rPr lang="en-US" sz="1400" dirty="0" smtClean="0"/>
+              <a:t>Emit : (‘emit’,{count:1})</a:t>
+            </a:r>
+          </a:p>
+          <a:p>
+            <a:endParaRPr lang="en-US" sz="1400" dirty="0"/>
+          </a:p>
+        </p:txBody>
+      </p:sp>
+      <p:sp>
+        <p:nvSpPr>
+          <p:cNvPr id="6" name="สี่เหลี่ยมผืนผ้า 5"/>
+          <p:cNvSpPr/>
+          <p:nvPr/>
+        </p:nvSpPr>
+        <p:spPr>
+          <a:xfrm>
+            <a:off x="424542" y="4506686"/>
+            <a:ext cx="2634343" cy="1937657"/>
+          </a:xfrm>
+          <a:prstGeom prst="rect">
+            <a:avLst/>
+          </a:prstGeom>
+        </p:spPr>
+        <p:style>
+          <a:lnRef idx="2">
+            <a:schemeClr val="accent1">
+              <a:shade val="50000"/>
+            </a:schemeClr>
+          </a:lnRef>
+          <a:fillRef idx="1">
+            <a:schemeClr val="accent1"/>
+          </a:fillRef>
+          <a:effectRef idx="0">
+            <a:schemeClr val="accent1"/>
+          </a:effectRef>
+          <a:fontRef idx="minor">
+            <a:schemeClr val="lt1"/>
+          </a:fontRef>
+        </p:style>
+        <p:txBody>
+          <a:bodyPr rtlCol="0" anchor="ctr"/>
+          <a:lstStyle/>
+          <a:p>
+            <a:r>
+              <a:rPr lang="en-US" sz="1400" dirty="0" smtClean="0"/>
+              <a:t>Send</a:t>
+            </a:r>
+          </a:p>
+          <a:p>
+            <a:r>
+              <a:rPr lang="en-US" sz="1400" dirty="0" smtClean="0"/>
+              <a:t>NodeMcu</a:t>
+            </a:r>
+          </a:p>
+          <a:p>
+            <a:r>
+              <a:rPr lang="en-US" sz="1400" dirty="0" smtClean="0">
+                <a:solidFill>
+                  <a:srgbClr val="FF0000"/>
+                </a:solidFill>
+              </a:rPr>
+              <a:t>ESP8266_WebSocketClientSocketIO_V1.ino</a:t>
+            </a:r>
+          </a:p>
+          <a:p>
+            <a:r>
+              <a:rPr lang="en-US" sz="1400" dirty="0" smtClean="0"/>
+              <a:t>Wifi : </a:t>
+            </a:r>
+          </a:p>
+          <a:p>
+            <a:r>
+              <a:rPr lang="en-US" sz="1400" dirty="0" smtClean="0"/>
+              <a:t>Broadcast </a:t>
+            </a:r>
+            <a:r>
+              <a:rPr lang="en-US" sz="1400" dirty="0"/>
+              <a:t>: </a:t>
+            </a:r>
+            <a:r>
+              <a:rPr lang="en-US" sz="1400" dirty="0" smtClean="0"/>
+              <a:t>count++</a:t>
+            </a:r>
+            <a:endParaRPr lang="en-US" sz="1400" dirty="0"/>
+          </a:p>
+        </p:txBody>
+      </p:sp>
+      <p:sp>
+        <p:nvSpPr>
+          <p:cNvPr id="7" name="สี่เหลี่ยมผืนผ้า 6"/>
+          <p:cNvSpPr/>
+          <p:nvPr/>
+        </p:nvSpPr>
+        <p:spPr>
+          <a:xfrm>
+            <a:off x="9089570" y="4506686"/>
+            <a:ext cx="2634343" cy="1937657"/>
+          </a:xfrm>
+          <a:prstGeom prst="rect">
+            <a:avLst/>
+          </a:prstGeom>
+        </p:spPr>
+        <p:style>
+          <a:lnRef idx="2">
+            <a:schemeClr val="accent1">
+              <a:shade val="50000"/>
+            </a:schemeClr>
+          </a:lnRef>
+          <a:fillRef idx="1">
+            <a:schemeClr val="accent1"/>
+          </a:fillRef>
+          <a:effectRef idx="0">
+            <a:schemeClr val="accent1"/>
+          </a:effectRef>
+          <a:fontRef idx="minor">
+            <a:schemeClr val="lt1"/>
+          </a:fontRef>
+        </p:style>
+        <p:txBody>
+          <a:bodyPr rtlCol="0" anchor="ctr"/>
+          <a:lstStyle/>
+          <a:p>
+            <a:r>
+              <a:rPr lang="en-US" sz="1400" dirty="0" err="1" smtClean="0"/>
+              <a:t>Recieve</a:t>
+            </a:r>
+            <a:endParaRPr lang="en-US" sz="1400" dirty="0" smtClean="0"/>
+          </a:p>
+          <a:p>
+            <a:r>
+              <a:rPr lang="en-US" sz="1400" dirty="0" smtClean="0"/>
+              <a:t>NodeMcu</a:t>
+            </a:r>
+          </a:p>
+          <a:p>
+            <a:r>
+              <a:rPr lang="en-US" sz="1400" dirty="0">
+                <a:solidFill>
+                  <a:srgbClr val="FF0000"/>
+                </a:solidFill>
+              </a:rPr>
+              <a:t>ESP8266_WebSocketClientSocketIO_Read_V1.ino</a:t>
+            </a:r>
+            <a:endParaRPr lang="en-US" sz="1400" dirty="0" smtClean="0">
+              <a:solidFill>
+                <a:srgbClr val="FF0000"/>
+              </a:solidFill>
+            </a:endParaRPr>
+          </a:p>
+          <a:p>
+            <a:r>
+              <a:rPr lang="en-US" sz="1400" dirty="0" smtClean="0"/>
+              <a:t>Wifi : </a:t>
+            </a:r>
+          </a:p>
+          <a:p>
+            <a:r>
+              <a:rPr lang="en-US" sz="1400" dirty="0" smtClean="0"/>
+              <a:t>Emit : (‘emit’,{count})</a:t>
+            </a:r>
+          </a:p>
+          <a:p>
+            <a:endParaRPr lang="en-US" sz="1400" dirty="0"/>
+          </a:p>
+        </p:txBody>
+      </p:sp>
+      <p:cxnSp>
+        <p:nvCxnSpPr>
+          <p:cNvPr id="9" name="ตัวเชื่อมต่อหักมุม 8"/>
+          <p:cNvCxnSpPr>
+            <a:stCxn id="6" idx="0"/>
+            <a:endCxn id="5" idx="1"/>
+          </p:cNvCxnSpPr>
+          <p:nvPr/>
+        </p:nvCxnSpPr>
+        <p:spPr>
+          <a:xfrm rot="5400000" flipH="1" flipV="1">
+            <a:off x="2171244" y="2312760"/>
+            <a:ext cx="1764397" cy="2623456"/>
+          </a:xfrm>
+          <a:prstGeom prst="bentConnector2">
+            <a:avLst/>
+          </a:prstGeom>
+          <a:ln w="38100">
+            <a:tailEnd type="triangle"/>
+          </a:ln>
+        </p:spPr>
+        <p:style>
+          <a:lnRef idx="1">
+            <a:schemeClr val="accent1"/>
+          </a:lnRef>
+          <a:fillRef idx="0">
+            <a:schemeClr val="accent1"/>
+          </a:fillRef>
+          <a:effectRef idx="0">
+            <a:schemeClr val="accent1"/>
+          </a:effectRef>
+          <a:fontRef idx="minor">
+            <a:schemeClr val="tx1"/>
+          </a:fontRef>
+        </p:style>
+      </p:cxnSp>
+      <p:cxnSp>
+        <p:nvCxnSpPr>
+          <p:cNvPr id="10" name="ตัวเชื่อมต่อหักมุม 9"/>
+          <p:cNvCxnSpPr>
+            <a:stCxn id="5" idx="3"/>
+            <a:endCxn id="7" idx="0"/>
+          </p:cNvCxnSpPr>
+          <p:nvPr/>
+        </p:nvCxnSpPr>
+        <p:spPr>
+          <a:xfrm>
+            <a:off x="6999513" y="2742289"/>
+            <a:ext cx="3407229" cy="1764397"/>
+          </a:xfrm>
+          <a:prstGeom prst="bentConnector2">
+            <a:avLst/>
+          </a:prstGeom>
+          <a:ln w="38100">
+            <a:tailEnd type="triangle"/>
+          </a:ln>
+        </p:spPr>
+        <p:style>
+          <a:lnRef idx="1">
+            <a:schemeClr val="accent1"/>
+          </a:lnRef>
+          <a:fillRef idx="0">
+            <a:schemeClr val="accent1"/>
+          </a:fillRef>
+          <a:effectRef idx="0">
+            <a:schemeClr val="accent1"/>
+          </a:effectRef>
+          <a:fontRef idx="minor">
+            <a:schemeClr val="tx1"/>
+          </a:fontRef>
+        </p:style>
+      </p:cxnSp>
+      <p:sp>
+        <p:nvSpPr>
+          <p:cNvPr id="13" name="สี่เหลี่ยมผืนผ้า 12"/>
+          <p:cNvSpPr/>
+          <p:nvPr/>
+        </p:nvSpPr>
+        <p:spPr>
+          <a:xfrm>
+            <a:off x="54426" y="3641969"/>
+            <a:ext cx="11669487" cy="646331"/>
+          </a:xfrm>
+          <a:prstGeom prst="rect">
+            <a:avLst/>
+          </a:prstGeom>
+        </p:spPr>
+        <p:txBody>
+          <a:bodyPr wrap="square">
+            <a:spAutoFit/>
+          </a:bodyPr>
+          <a:lstStyle/>
+          <a:p>
+            <a:pPr marL="342900" indent="-342900">
+              <a:buAutoNum type="arabicPeriod"/>
+            </a:pPr>
+            <a:r>
+              <a:rPr lang="th-TH" dirty="0" smtClean="0"/>
+              <a:t>ใช้</a:t>
+            </a:r>
+            <a:r>
+              <a:rPr lang="th-TH" dirty="0" err="1" smtClean="0"/>
+              <a:t>ไลบรา</a:t>
+            </a:r>
+            <a:r>
+              <a:rPr lang="th-TH" dirty="0" smtClean="0"/>
+              <a:t>รี่ในไฟล์เท่านั้น ร่วมกับ </a:t>
+            </a:r>
+            <a:r>
+              <a:rPr lang="en-US" dirty="0" smtClean="0"/>
+              <a:t>ESP8266</a:t>
+            </a:r>
+          </a:p>
+          <a:p>
+            <a:pPr marL="342900" indent="-342900">
+              <a:buAutoNum type="arabicPeriod"/>
+            </a:pPr>
+            <a:r>
+              <a:rPr lang="th-TH" dirty="0" smtClean="0"/>
+              <a:t>เปิด </a:t>
+            </a:r>
+            <a:r>
+              <a:rPr lang="en-US" dirty="0" smtClean="0"/>
+              <a:t>Python</a:t>
+            </a:r>
+            <a:r>
+              <a:rPr lang="th-TH" dirty="0" smtClean="0"/>
+              <a:t> </a:t>
+            </a:r>
+            <a:r>
+              <a:rPr lang="en-US" dirty="0" smtClean="0"/>
+              <a:t>Read </a:t>
+            </a:r>
+            <a:r>
+              <a:rPr lang="th-TH" dirty="0" smtClean="0"/>
+              <a:t>หรือ </a:t>
+            </a:r>
+            <a:r>
+              <a:rPr lang="en-US" dirty="0" smtClean="0"/>
+              <a:t>Monitor </a:t>
+            </a:r>
+            <a:r>
+              <a:rPr lang="th-TH" dirty="0" smtClean="0"/>
+              <a:t>ที่ฝั่ง </a:t>
+            </a:r>
+            <a:r>
+              <a:rPr lang="en-US" dirty="0" smtClean="0"/>
+              <a:t>Server </a:t>
+            </a:r>
+            <a:r>
+              <a:rPr lang="th-TH" dirty="0" smtClean="0"/>
+              <a:t>ไว้</a:t>
+            </a:r>
+            <a:r>
+              <a:rPr lang="en-US" dirty="0" smtClean="0"/>
+              <a:t> (Debug)</a:t>
+            </a:r>
+          </a:p>
+        </p:txBody>
+      </p:sp>
+    </p:spTree>
+    <p:extLst>
+      <p:ext uri="{BB962C8B-B14F-4D97-AF65-F5344CB8AC3E}">
+        <p14:creationId xmlns:p14="http://schemas.microsoft.com/office/powerpoint/2010/main" val="342110715"/>
+      </p:ext>
+    </p:extLst>
+  </p:cSld>
+  <p:clrMapOvr>
+    <a:masterClrMapping/>
+  </p:clrMapOvr>
+</p:sld>
+</file>
+
+<file path=ppt/slides/slide9.xml><?xml version="1.0" encoding="utf-8"?>
+<p:sld xmlns:a="http://schemas.openxmlformats.org/drawingml/2006/main" xmlns:r="http://schemas.openxmlformats.org/officeDocument/2006/relationships" xmlns:p="http://schemas.openxmlformats.org/presentationml/2006/main">
+  <p:cSld>
+    <p:spTree>
+      <p:nvGrpSpPr>
+        <p:cNvPr id="1" name=""/>
+        <p:cNvGrpSpPr/>
+        <p:nvPr/>
+      </p:nvGrpSpPr>
+      <p:grpSpPr>
+        <a:xfrm>
+          <a:off x="0" y="0"/>
+          <a:ext cx="0" cy="0"/>
+          <a:chOff x="0" y="0"/>
+          <a:chExt cx="0" cy="0"/>
+        </a:xfrm>
+      </p:grpSpPr>
+      <p:sp>
+        <p:nvSpPr>
+          <p:cNvPr id="5" name="สี่เหลี่ยมผืนผ้า 4"/>
+          <p:cNvSpPr/>
+          <p:nvPr/>
+        </p:nvSpPr>
+        <p:spPr>
+          <a:xfrm>
+            <a:off x="4365170" y="1326235"/>
+            <a:ext cx="2634343" cy="1634680"/>
+          </a:xfrm>
+          <a:prstGeom prst="rect">
+            <a:avLst/>
+          </a:prstGeom>
+        </p:spPr>
+        <p:style>
+          <a:lnRef idx="2">
+            <a:schemeClr val="accent1">
+              <a:shade val="50000"/>
+            </a:schemeClr>
+          </a:lnRef>
+          <a:fillRef idx="1">
+            <a:schemeClr val="accent1"/>
+          </a:fillRef>
+          <a:effectRef idx="0">
+            <a:schemeClr val="accent1"/>
+          </a:effectRef>
+          <a:fontRef idx="minor">
+            <a:schemeClr val="lt1"/>
+          </a:fontRef>
+        </p:style>
+        <p:txBody>
+          <a:bodyPr rtlCol="0" anchor="ctr"/>
+          <a:lstStyle/>
+          <a:p>
+            <a:r>
+              <a:rPr lang="en-US" sz="1400" dirty="0" smtClean="0"/>
+              <a:t>GCP</a:t>
+            </a:r>
+          </a:p>
+          <a:p>
+            <a:r>
+              <a:rPr lang="en-US" sz="1400" dirty="0" smtClean="0"/>
+              <a:t>Socket.IO </a:t>
+            </a:r>
+          </a:p>
+          <a:p>
+            <a:r>
+              <a:rPr lang="en-US" sz="1400" dirty="0" smtClean="0">
+                <a:solidFill>
+                  <a:srgbClr val="FF0000"/>
+                </a:solidFill>
+              </a:rPr>
+              <a:t>Server.js</a:t>
+            </a:r>
+          </a:p>
+          <a:p>
+            <a:r>
+              <a:rPr lang="en-US" sz="1400" dirty="0" smtClean="0"/>
+              <a:t>34.87.86.224:3002</a:t>
+            </a:r>
+          </a:p>
+          <a:p>
+            <a:r>
+              <a:rPr lang="en-US" sz="1400" dirty="0"/>
+              <a:t>Broadcast : </a:t>
+            </a:r>
+            <a:r>
+              <a:rPr lang="en-US" sz="1400" dirty="0" smtClean="0"/>
+              <a:t>pulse</a:t>
+            </a:r>
+          </a:p>
+          <a:p>
+            <a:r>
+              <a:rPr lang="en-US" sz="1400" dirty="0" smtClean="0"/>
+              <a:t>Emit : (‘servo’,{</a:t>
+            </a:r>
+            <a:r>
+              <a:rPr lang="en-US" sz="1400" dirty="0"/>
+              <a:t>pulse </a:t>
+            </a:r>
+            <a:r>
+              <a:rPr lang="en-US" sz="1400" dirty="0" smtClean="0"/>
+              <a:t>:90})</a:t>
+            </a:r>
+          </a:p>
+          <a:p>
+            <a:endParaRPr lang="en-US" sz="1400" dirty="0"/>
+          </a:p>
+        </p:txBody>
+      </p:sp>
+      <p:sp>
+        <p:nvSpPr>
+          <p:cNvPr id="6" name="สี่เหลี่ยมผืนผ้า 5"/>
+          <p:cNvSpPr/>
+          <p:nvPr/>
+        </p:nvSpPr>
+        <p:spPr>
+          <a:xfrm>
+            <a:off x="424542" y="3907972"/>
+            <a:ext cx="2634343" cy="1937657"/>
+          </a:xfrm>
+          <a:prstGeom prst="rect">
+            <a:avLst/>
+          </a:prstGeom>
+        </p:spPr>
+        <p:style>
+          <a:lnRef idx="2">
+            <a:schemeClr val="accent1">
+              <a:shade val="50000"/>
+            </a:schemeClr>
+          </a:lnRef>
+          <a:fillRef idx="1">
+            <a:schemeClr val="accent1"/>
+          </a:fillRef>
+          <a:effectRef idx="0">
+            <a:schemeClr val="accent1"/>
+          </a:effectRef>
+          <a:fontRef idx="minor">
+            <a:schemeClr val="lt1"/>
+          </a:fontRef>
+        </p:style>
+        <p:txBody>
+          <a:bodyPr rtlCol="0" anchor="ctr"/>
+          <a:lstStyle/>
+          <a:p>
+            <a:r>
+              <a:rPr lang="en-US" sz="1400" dirty="0" smtClean="0"/>
+              <a:t>Send</a:t>
+            </a:r>
+          </a:p>
+          <a:p>
+            <a:r>
+              <a:rPr lang="en-US" sz="1400" dirty="0" smtClean="0"/>
+              <a:t>NodeMcu</a:t>
+            </a:r>
+          </a:p>
+          <a:p>
+            <a:r>
+              <a:rPr lang="en-US" sz="1400" dirty="0" smtClean="0">
+                <a:solidFill>
+                  <a:srgbClr val="FF0000"/>
+                </a:solidFill>
+              </a:rPr>
+              <a:t>ESP8266_ServoWebSocketClientSocketIO_Send_V1.ino</a:t>
+            </a:r>
+          </a:p>
+          <a:p>
+            <a:r>
+              <a:rPr lang="en-US" sz="1400" dirty="0" smtClean="0"/>
+              <a:t>Wifi : </a:t>
+            </a:r>
+          </a:p>
+          <a:p>
+            <a:r>
+              <a:rPr lang="en-US" sz="1400" dirty="0" smtClean="0"/>
+              <a:t>Broadcast </a:t>
+            </a:r>
+            <a:r>
+              <a:rPr lang="en-US" sz="1400" dirty="0"/>
+              <a:t>: </a:t>
+            </a:r>
+            <a:r>
+              <a:rPr lang="en-US" sz="1400" dirty="0" smtClean="0"/>
+              <a:t>count</a:t>
+            </a:r>
+            <a:endParaRPr lang="en-US" sz="1400" dirty="0"/>
+          </a:p>
+        </p:txBody>
+      </p:sp>
+      <p:sp>
+        <p:nvSpPr>
+          <p:cNvPr id="7" name="สี่เหลี่ยมผืนผ้า 6"/>
+          <p:cNvSpPr/>
+          <p:nvPr/>
+        </p:nvSpPr>
+        <p:spPr>
+          <a:xfrm>
+            <a:off x="9089570" y="3907972"/>
+            <a:ext cx="2634343" cy="1937657"/>
+          </a:xfrm>
+          <a:prstGeom prst="rect">
+            <a:avLst/>
+          </a:prstGeom>
+        </p:spPr>
+        <p:style>
+          <a:lnRef idx="2">
+            <a:schemeClr val="accent1">
+              <a:shade val="50000"/>
+            </a:schemeClr>
+          </a:lnRef>
+          <a:fillRef idx="1">
+            <a:schemeClr val="accent1"/>
+          </a:fillRef>
+          <a:effectRef idx="0">
+            <a:schemeClr val="accent1"/>
+          </a:effectRef>
+          <a:fontRef idx="minor">
+            <a:schemeClr val="lt1"/>
+          </a:fontRef>
+        </p:style>
+        <p:txBody>
+          <a:bodyPr rtlCol="0" anchor="ctr"/>
+          <a:lstStyle/>
+          <a:p>
+            <a:r>
+              <a:rPr lang="en-US" sz="1400" dirty="0" smtClean="0"/>
+              <a:t>Receive</a:t>
+            </a:r>
+          </a:p>
+          <a:p>
+            <a:r>
+              <a:rPr lang="en-US" sz="1400" dirty="0" smtClean="0"/>
+              <a:t>NodeMcu</a:t>
+            </a:r>
+          </a:p>
+          <a:p>
+            <a:r>
+              <a:rPr lang="en-US" sz="1400" dirty="0" smtClean="0">
+                <a:solidFill>
+                  <a:srgbClr val="FF0000"/>
+                </a:solidFill>
+              </a:rPr>
+              <a:t>ESP8266_ServoWebSocketClientSocketIO_Read_V1.ino</a:t>
+            </a:r>
+          </a:p>
+          <a:p>
+            <a:r>
+              <a:rPr lang="en-US" sz="1400" dirty="0" smtClean="0"/>
+              <a:t>Wifi : </a:t>
+            </a:r>
+          </a:p>
+          <a:p>
+            <a:r>
+              <a:rPr lang="en-US" sz="1400" dirty="0" smtClean="0"/>
+              <a:t>Emit : (‘servo’,{</a:t>
+            </a:r>
+            <a:r>
+              <a:rPr lang="en-US" sz="1400" dirty="0"/>
+              <a:t>pulse</a:t>
+            </a:r>
+            <a:r>
+              <a:rPr lang="en-US" sz="1400" dirty="0" smtClean="0"/>
+              <a:t>})</a:t>
+            </a:r>
+          </a:p>
+          <a:p>
+            <a:endParaRPr lang="en-US" sz="1400" dirty="0"/>
+          </a:p>
+        </p:txBody>
+      </p:sp>
+      <p:cxnSp>
+        <p:nvCxnSpPr>
+          <p:cNvPr id="9" name="ตัวเชื่อมต่อหักมุม 8"/>
+          <p:cNvCxnSpPr>
+            <a:stCxn id="6" idx="0"/>
+            <a:endCxn id="5" idx="1"/>
+          </p:cNvCxnSpPr>
+          <p:nvPr/>
+        </p:nvCxnSpPr>
+        <p:spPr>
+          <a:xfrm rot="5400000" flipH="1" flipV="1">
+            <a:off x="2171244" y="1714046"/>
+            <a:ext cx="1764397" cy="2623456"/>
+          </a:xfrm>
+          <a:prstGeom prst="bentConnector2">
+            <a:avLst/>
+          </a:prstGeom>
+          <a:ln w="38100">
+            <a:tailEnd type="triangle"/>
+          </a:ln>
+        </p:spPr>
+        <p:style>
+          <a:lnRef idx="1">
+            <a:schemeClr val="accent1"/>
+          </a:lnRef>
+          <a:fillRef idx="0">
+            <a:schemeClr val="accent1"/>
+          </a:fillRef>
+          <a:effectRef idx="0">
+            <a:schemeClr val="accent1"/>
+          </a:effectRef>
+          <a:fontRef idx="minor">
+            <a:schemeClr val="tx1"/>
+          </a:fontRef>
+        </p:style>
+      </p:cxnSp>
+      <p:cxnSp>
+        <p:nvCxnSpPr>
+          <p:cNvPr id="10" name="ตัวเชื่อมต่อหักมุม 9"/>
+          <p:cNvCxnSpPr>
+            <a:stCxn id="5" idx="3"/>
+            <a:endCxn id="7" idx="0"/>
+          </p:cNvCxnSpPr>
+          <p:nvPr/>
+        </p:nvCxnSpPr>
+        <p:spPr>
+          <a:xfrm>
+            <a:off x="6999513" y="2143575"/>
+            <a:ext cx="3407229" cy="1764397"/>
+          </a:xfrm>
+          <a:prstGeom prst="bentConnector2">
+            <a:avLst/>
+          </a:prstGeom>
+          <a:ln w="38100">
+            <a:tailEnd type="triangle"/>
+          </a:ln>
+        </p:spPr>
+        <p:style>
+          <a:lnRef idx="1">
+            <a:schemeClr val="accent1"/>
+          </a:lnRef>
+          <a:fillRef idx="0">
+            <a:schemeClr val="accent1"/>
+          </a:fillRef>
+          <a:effectRef idx="0">
+            <a:schemeClr val="accent1"/>
+          </a:effectRef>
+          <a:fontRef idx="minor">
+            <a:schemeClr val="tx1"/>
+          </a:fontRef>
+        </p:style>
+      </p:cxnSp>
+      <p:sp>
+        <p:nvSpPr>
+          <p:cNvPr id="11" name="สี่เหลี่ยมผืนผ้า 10"/>
+          <p:cNvSpPr/>
+          <p:nvPr/>
+        </p:nvSpPr>
+        <p:spPr>
+          <a:xfrm>
+            <a:off x="3918854" y="3525148"/>
+            <a:ext cx="3526976" cy="1634680"/>
+          </a:xfrm>
+          <a:prstGeom prst="rect">
+            <a:avLst/>
+          </a:prstGeom>
+          <a:solidFill>
+            <a:srgbClr val="92D050"/>
+          </a:solidFill>
+        </p:spPr>
+        <p:style>
+          <a:lnRef idx="2">
+            <a:schemeClr val="accent1">
+              <a:shade val="50000"/>
+            </a:schemeClr>
+          </a:lnRef>
+          <a:fillRef idx="1">
+            <a:schemeClr val="accent1"/>
+          </a:fillRef>
+          <a:effectRef idx="0">
+            <a:schemeClr val="accent1"/>
+          </a:effectRef>
+          <a:fontRef idx="minor">
+            <a:schemeClr val="lt1"/>
+          </a:fontRef>
+        </p:style>
+        <p:txBody>
+          <a:bodyPr rtlCol="0" anchor="ctr"/>
+          <a:lstStyle/>
+          <a:p>
+            <a:r>
+              <a:rPr lang="en-US" sz="1400" dirty="0" smtClean="0">
+                <a:solidFill>
+                  <a:schemeClr val="tx2">
+                    <a:lumMod val="75000"/>
+                  </a:schemeClr>
+                </a:solidFill>
+              </a:rPr>
+              <a:t>Web Control on GCP</a:t>
+            </a:r>
+          </a:p>
+          <a:p>
+            <a:r>
+              <a:rPr lang="en-US" sz="1400" dirty="0" smtClean="0">
+                <a:solidFill>
+                  <a:srgbClr val="C00000"/>
+                </a:solidFill>
+              </a:rPr>
+              <a:t>ReactJS</a:t>
+            </a:r>
+          </a:p>
+          <a:p>
+            <a:r>
+              <a:rPr lang="en-US" sz="1400" dirty="0" smtClean="0">
+                <a:solidFill>
+                  <a:schemeClr val="tx2">
+                    <a:lumMod val="75000"/>
+                  </a:schemeClr>
+                </a:solidFill>
+              </a:rPr>
+              <a:t>http</a:t>
+            </a:r>
+            <a:r>
+              <a:rPr lang="en-US" sz="1400" dirty="0">
+                <a:solidFill>
+                  <a:schemeClr val="tx2">
+                    <a:lumMod val="75000"/>
+                  </a:schemeClr>
+                </a:solidFill>
+              </a:rPr>
+              <a:t>://</a:t>
+            </a:r>
+            <a:r>
+              <a:rPr lang="en-US" sz="1400" dirty="0" smtClean="0">
+                <a:solidFill>
+                  <a:schemeClr val="tx2">
+                    <a:lumMod val="75000"/>
+                  </a:schemeClr>
+                </a:solidFill>
+              </a:rPr>
+              <a:t>34.87.86.224:8001/socket </a:t>
+            </a:r>
+            <a:br>
+              <a:rPr lang="en-US" sz="1400" dirty="0" smtClean="0">
+                <a:solidFill>
+                  <a:schemeClr val="tx2">
+                    <a:lumMod val="75000"/>
+                  </a:schemeClr>
+                </a:solidFill>
+              </a:rPr>
+            </a:br>
+            <a:r>
+              <a:rPr lang="en-US" sz="1400" dirty="0" smtClean="0">
+                <a:solidFill>
+                  <a:schemeClr val="tx2">
+                    <a:lumMod val="75000"/>
+                  </a:schemeClr>
+                </a:solidFill>
+              </a:rPr>
+              <a:t>Broadcast : pulse</a:t>
+            </a:r>
+          </a:p>
+          <a:p>
+            <a:r>
+              <a:rPr lang="en-US" sz="1400" dirty="0" smtClean="0">
+                <a:solidFill>
+                  <a:schemeClr val="tx2">
+                    <a:lumMod val="75000"/>
+                  </a:schemeClr>
+                </a:solidFill>
+              </a:rPr>
+              <a:t>Emit : (‘servo’,{</a:t>
+            </a:r>
+            <a:r>
+              <a:rPr lang="en-US" sz="1400" dirty="0">
+                <a:solidFill>
+                  <a:schemeClr val="tx2">
+                    <a:lumMod val="75000"/>
+                  </a:schemeClr>
+                </a:solidFill>
+              </a:rPr>
+              <a:t>pulse </a:t>
+            </a:r>
+            <a:r>
+              <a:rPr lang="en-US" sz="1400" dirty="0" smtClean="0">
+                <a:solidFill>
+                  <a:schemeClr val="tx2">
+                    <a:lumMod val="75000"/>
+                  </a:schemeClr>
+                </a:solidFill>
+              </a:rPr>
+              <a:t>:90})</a:t>
+            </a:r>
+          </a:p>
+          <a:p>
+            <a:endParaRPr lang="en-US" sz="1400" dirty="0">
+              <a:solidFill>
+                <a:schemeClr val="tx2">
+                  <a:lumMod val="75000"/>
+                </a:schemeClr>
+              </a:solidFill>
+            </a:endParaRPr>
+          </a:p>
+        </p:txBody>
+      </p:sp>
+      <p:cxnSp>
+        <p:nvCxnSpPr>
+          <p:cNvPr id="13" name="ลูกศรเชื่อมต่อแบบตรง 12"/>
+          <p:cNvCxnSpPr/>
+          <p:nvPr/>
+        </p:nvCxnSpPr>
+        <p:spPr>
+          <a:xfrm>
+            <a:off x="5257800" y="2960915"/>
+            <a:ext cx="0" cy="564233"/>
+          </a:xfrm>
+          <a:prstGeom prst="straightConnector1">
+            <a:avLst/>
+          </a:prstGeom>
+          <a:ln w="57150">
+            <a:solidFill>
+              <a:schemeClr val="accent2">
+                <a:lumMod val="75000"/>
+              </a:schemeClr>
+            </a:solidFill>
+            <a:tailEnd type="triangle"/>
+          </a:ln>
+        </p:spPr>
+        <p:style>
+          <a:lnRef idx="1">
+            <a:schemeClr val="accent1"/>
+          </a:lnRef>
+          <a:fillRef idx="0">
+            <a:schemeClr val="accent1"/>
+          </a:fillRef>
+          <a:effectRef idx="0">
+            <a:schemeClr val="accent1"/>
+          </a:effectRef>
+          <a:fontRef idx="minor">
+            <a:schemeClr val="tx1"/>
+          </a:fontRef>
+        </p:style>
+      </p:cxnSp>
+      <p:cxnSp>
+        <p:nvCxnSpPr>
+          <p:cNvPr id="15" name="ลูกศรเชื่อมต่อแบบตรง 14"/>
+          <p:cNvCxnSpPr/>
+          <p:nvPr/>
+        </p:nvCxnSpPr>
+        <p:spPr>
+          <a:xfrm flipV="1">
+            <a:off x="5910943" y="2960915"/>
+            <a:ext cx="0" cy="564233"/>
+          </a:xfrm>
+          <a:prstGeom prst="straightConnector1">
+            <a:avLst/>
+          </a:prstGeom>
+          <a:ln w="57150">
+            <a:solidFill>
+              <a:schemeClr val="accent2">
+                <a:lumMod val="75000"/>
+              </a:schemeClr>
+            </a:solidFill>
+            <a:tailEnd type="triangle"/>
+          </a:ln>
+        </p:spPr>
+        <p:style>
+          <a:lnRef idx="1">
+            <a:schemeClr val="accent1"/>
+          </a:lnRef>
+          <a:fillRef idx="0">
+            <a:schemeClr val="accent1"/>
+          </a:fillRef>
+          <a:effectRef idx="0">
+            <a:schemeClr val="accent1"/>
+          </a:effectRef>
+          <a:fontRef idx="minor">
+            <a:schemeClr val="tx1"/>
+          </a:fontRef>
+        </p:style>
+      </p:cxnSp>
+      <p:sp>
+        <p:nvSpPr>
+          <p:cNvPr id="18" name="สี่เหลี่ยมผืนผ้า 17"/>
+          <p:cNvSpPr/>
+          <p:nvPr/>
+        </p:nvSpPr>
+        <p:spPr>
+          <a:xfrm>
+            <a:off x="326571" y="261257"/>
+            <a:ext cx="3058886" cy="729343"/>
+          </a:xfrm>
+          <a:prstGeom prst="rect">
+            <a:avLst/>
+          </a:prstGeom>
+          <a:solidFill>
+            <a:srgbClr val="00B050"/>
+          </a:solidFill>
+          <a:ln>
+            <a:solidFill>
+              <a:schemeClr val="accent2">
+                <a:lumMod val="75000"/>
+              </a:schemeClr>
+            </a:solidFill>
+          </a:ln>
+        </p:spPr>
+        <p:style>
+          <a:lnRef idx="2">
+            <a:schemeClr val="accent1">
+              <a:shade val="50000"/>
+            </a:schemeClr>
+          </a:lnRef>
+          <a:fillRef idx="1">
+            <a:schemeClr val="accent1"/>
+          </a:fillRef>
+          <a:effectRef idx="0">
+            <a:schemeClr val="accent1"/>
+          </a:effectRef>
+          <a:fontRef idx="minor">
+            <a:schemeClr val="lt1"/>
+          </a:fontRef>
+        </p:style>
+        <p:txBody>
+          <a:bodyPr rtlCol="0" anchor="ctr"/>
+          <a:lstStyle/>
+          <a:p>
+            <a:pPr algn="ctr"/>
+            <a:r>
+              <a:rPr lang="en-US" dirty="0" smtClean="0">
+                <a:solidFill>
+                  <a:srgbClr val="C00000"/>
+                </a:solidFill>
+              </a:rPr>
+              <a:t>Transection Model</a:t>
+            </a:r>
+            <a:endParaRPr lang="en-US" dirty="0">
+              <a:solidFill>
+                <a:srgbClr val="C00000"/>
+              </a:solidFill>
+            </a:endParaRPr>
+          </a:p>
+        </p:txBody>
+      </p:sp>
+    </p:spTree>
+    <p:extLst>
+      <p:ext uri="{BB962C8B-B14F-4D97-AF65-F5344CB8AC3E}">
+        <p14:creationId xmlns:p14="http://schemas.microsoft.com/office/powerpoint/2010/main" val="4264533200"/>
       </p:ext>
     </p:extLst>
   </p:cSld>

</xml_diff>